<commit_message>
Slides da Aula 00 atualizados
</commit_message>
<xml_diff>
--- a/Slides/00. Introdução.pptx
+++ b/Slides/00. Introdução.pptx
@@ -164,13 +164,1011 @@
 <file path=ppt/revisionInfo.xml><?xml version="1.0" encoding="utf-8"?>
 <p1510:revInfo xmlns:a="http://schemas.openxmlformats.org/drawingml/2006/main" xmlns:r="http://schemas.openxmlformats.org/officeDocument/2006/relationships" xmlns:p1510="http://schemas.microsoft.com/office/powerpoint/2015/10/main">
   <p1510:revLst>
-    <p1510:client id="{44735F1B-1BE7-4BE4-8BEF-EDD725D21DD4}" v="26" dt="2019-04-20T18:37:32.709"/>
+    <p1510:client id="{892A6213-B575-4955-849D-E82EBCE1248D}" v="20" dt="2021-07-06T04:09:30.210"/>
   </p1510:revLst>
 </p1510:revInfo>
 </file>
 
 <file path=ppt/changesInfos/changesInfo1.xml><?xml version="1.0" encoding="utf-8"?>
 <pc:chgInfo xmlns:a="http://schemas.openxmlformats.org/drawingml/2006/main" xmlns:r="http://schemas.openxmlformats.org/officeDocument/2006/relationships" xmlns:ac="http://schemas.microsoft.com/office/drawing/2013/main/command" xmlns:pc="http://schemas.microsoft.com/office/powerpoint/2013/main/command">
+  <pc:docChgLst>
+    <pc:chgData name="Judson Santiago" userId="ebb108da2f256286" providerId="LiveId" clId="{892A6213-B575-4955-849D-E82EBCE1248D}"/>
+    <pc:docChg chg="undo redo custSel modSld modMainMaster">
+      <pc:chgData name="Judson Santiago" userId="ebb108da2f256286" providerId="LiveId" clId="{892A6213-B575-4955-849D-E82EBCE1248D}" dt="2021-07-06T04:09:32.239" v="533" actId="21"/>
+      <pc:docMkLst>
+        <pc:docMk/>
+      </pc:docMkLst>
+      <pc:sldChg chg="modSp mod">
+        <pc:chgData name="Judson Santiago" userId="ebb108da2f256286" providerId="LiveId" clId="{892A6213-B575-4955-849D-E82EBCE1248D}" dt="2021-07-06T04:08:19.309" v="531" actId="20577"/>
+        <pc:sldMkLst>
+          <pc:docMk/>
+          <pc:sldMk cId="0" sldId="256"/>
+        </pc:sldMkLst>
+        <pc:spChg chg="mod">
+          <ac:chgData name="Judson Santiago" userId="ebb108da2f256286" providerId="LiveId" clId="{892A6213-B575-4955-849D-E82EBCE1248D}" dt="2021-07-06T04:08:19.309" v="531" actId="20577"/>
+          <ac:spMkLst>
+            <pc:docMk/>
+            <pc:sldMk cId="0" sldId="256"/>
+            <ac:spMk id="2" creationId="{00000000-0000-0000-0000-000000000000}"/>
+          </ac:spMkLst>
+        </pc:spChg>
+      </pc:sldChg>
+      <pc:sldChg chg="modSp mod">
+        <pc:chgData name="Judson Santiago" userId="ebb108da2f256286" providerId="LiveId" clId="{892A6213-B575-4955-849D-E82EBCE1248D}" dt="2021-07-06T02:29:57.491" v="21" actId="1076"/>
+        <pc:sldMkLst>
+          <pc:docMk/>
+          <pc:sldMk cId="1646120797" sldId="257"/>
+        </pc:sldMkLst>
+        <pc:picChg chg="mod">
+          <ac:chgData name="Judson Santiago" userId="ebb108da2f256286" providerId="LiveId" clId="{892A6213-B575-4955-849D-E82EBCE1248D}" dt="2021-07-06T02:29:07.255" v="18" actId="1076"/>
+          <ac:picMkLst>
+            <pc:docMk/>
+            <pc:sldMk cId="1646120797" sldId="257"/>
+            <ac:picMk id="7" creationId="{00000000-0000-0000-0000-000000000000}"/>
+          </ac:picMkLst>
+        </pc:picChg>
+        <pc:picChg chg="mod">
+          <ac:chgData name="Judson Santiago" userId="ebb108da2f256286" providerId="LiveId" clId="{892A6213-B575-4955-849D-E82EBCE1248D}" dt="2021-07-06T02:29:57.491" v="21" actId="1076"/>
+          <ac:picMkLst>
+            <pc:docMk/>
+            <pc:sldMk cId="1646120797" sldId="257"/>
+            <ac:picMk id="8" creationId="{00000000-0000-0000-0000-000000000000}"/>
+          </ac:picMkLst>
+        </pc:picChg>
+        <pc:picChg chg="mod">
+          <ac:chgData name="Judson Santiago" userId="ebb108da2f256286" providerId="LiveId" clId="{892A6213-B575-4955-849D-E82EBCE1248D}" dt="2021-07-06T02:28:49.546" v="16" actId="1076"/>
+          <ac:picMkLst>
+            <pc:docMk/>
+            <pc:sldMk cId="1646120797" sldId="257"/>
+            <ac:picMk id="9" creationId="{00000000-0000-0000-0000-000000000000}"/>
+          </ac:picMkLst>
+        </pc:picChg>
+        <pc:picChg chg="mod">
+          <ac:chgData name="Judson Santiago" userId="ebb108da2f256286" providerId="LiveId" clId="{892A6213-B575-4955-849D-E82EBCE1248D}" dt="2021-07-06T02:29:28.505" v="20" actId="1076"/>
+          <ac:picMkLst>
+            <pc:docMk/>
+            <pc:sldMk cId="1646120797" sldId="257"/>
+            <ac:picMk id="10" creationId="{00000000-0000-0000-0000-000000000000}"/>
+          </ac:picMkLst>
+        </pc:picChg>
+        <pc:picChg chg="mod">
+          <ac:chgData name="Judson Santiago" userId="ebb108da2f256286" providerId="LiveId" clId="{892A6213-B575-4955-849D-E82EBCE1248D}" dt="2021-07-06T02:29:01.481" v="17" actId="1076"/>
+          <ac:picMkLst>
+            <pc:docMk/>
+            <pc:sldMk cId="1646120797" sldId="257"/>
+            <ac:picMk id="11" creationId="{00000000-0000-0000-0000-000000000000}"/>
+          </ac:picMkLst>
+        </pc:picChg>
+      </pc:sldChg>
+      <pc:sldChg chg="modSp mod">
+        <pc:chgData name="Judson Santiago" userId="ebb108da2f256286" providerId="LiveId" clId="{892A6213-B575-4955-849D-E82EBCE1248D}" dt="2021-07-06T02:31:26.821" v="22" actId="20577"/>
+        <pc:sldMkLst>
+          <pc:docMk/>
+          <pc:sldMk cId="3825172895" sldId="258"/>
+        </pc:sldMkLst>
+        <pc:spChg chg="mod">
+          <ac:chgData name="Judson Santiago" userId="ebb108da2f256286" providerId="LiveId" clId="{892A6213-B575-4955-849D-E82EBCE1248D}" dt="2021-07-06T02:31:26.821" v="22" actId="20577"/>
+          <ac:spMkLst>
+            <pc:docMk/>
+            <pc:sldMk cId="3825172895" sldId="258"/>
+            <ac:spMk id="2" creationId="{00000000-0000-0000-0000-000000000000}"/>
+          </ac:spMkLst>
+        </pc:spChg>
+      </pc:sldChg>
+      <pc:sldChg chg="addSp delSp modSp mod modNotesTx">
+        <pc:chgData name="Judson Santiago" userId="ebb108da2f256286" providerId="LiveId" clId="{892A6213-B575-4955-849D-E82EBCE1248D}" dt="2021-07-06T02:56:25.418" v="178" actId="1076"/>
+        <pc:sldMkLst>
+          <pc:docMk/>
+          <pc:sldMk cId="229696289" sldId="259"/>
+        </pc:sldMkLst>
+        <pc:spChg chg="mod">
+          <ac:chgData name="Judson Santiago" userId="ebb108da2f256286" providerId="LiveId" clId="{892A6213-B575-4955-849D-E82EBCE1248D}" dt="2021-07-06T02:55:20.753" v="173" actId="404"/>
+          <ac:spMkLst>
+            <pc:docMk/>
+            <pc:sldMk cId="229696289" sldId="259"/>
+            <ac:spMk id="2" creationId="{00000000-0000-0000-0000-000000000000}"/>
+          </ac:spMkLst>
+        </pc:spChg>
+        <pc:spChg chg="mod">
+          <ac:chgData name="Judson Santiago" userId="ebb108da2f256286" providerId="LiveId" clId="{892A6213-B575-4955-849D-E82EBCE1248D}" dt="2021-07-06T02:34:39.745" v="29" actId="1076"/>
+          <ac:spMkLst>
+            <pc:docMk/>
+            <pc:sldMk cId="229696289" sldId="259"/>
+            <ac:spMk id="3" creationId="{00000000-0000-0000-0000-000000000000}"/>
+          </ac:spMkLst>
+        </pc:spChg>
+        <pc:spChg chg="add del mod ord">
+          <ac:chgData name="Judson Santiago" userId="ebb108da2f256286" providerId="LiveId" clId="{892A6213-B575-4955-849D-E82EBCE1248D}" dt="2021-07-06T02:55:48.598" v="176" actId="14100"/>
+          <ac:spMkLst>
+            <pc:docMk/>
+            <pc:sldMk cId="229696289" sldId="259"/>
+            <ac:spMk id="6" creationId="{10467B17-1DE6-4369-AE55-98696AAE2236}"/>
+          </ac:spMkLst>
+        </pc:spChg>
+        <pc:graphicFrameChg chg="add del mod modGraphic">
+          <ac:chgData name="Judson Santiago" userId="ebb108da2f256286" providerId="LiveId" clId="{892A6213-B575-4955-849D-E82EBCE1248D}" dt="2021-07-06T02:39:12.028" v="64" actId="3680"/>
+          <ac:graphicFrameMkLst>
+            <pc:docMk/>
+            <pc:sldMk cId="229696289" sldId="259"/>
+            <ac:graphicFrameMk id="4" creationId="{2CDED309-8319-4C79-BB2B-94E539BE9688}"/>
+          </ac:graphicFrameMkLst>
+        </pc:graphicFrameChg>
+        <pc:graphicFrameChg chg="add mod modGraphic">
+          <ac:chgData name="Judson Santiago" userId="ebb108da2f256286" providerId="LiveId" clId="{892A6213-B575-4955-849D-E82EBCE1248D}" dt="2021-07-06T02:56:25.418" v="178" actId="1076"/>
+          <ac:graphicFrameMkLst>
+            <pc:docMk/>
+            <pc:sldMk cId="229696289" sldId="259"/>
+            <ac:graphicFrameMk id="5" creationId="{31E1DB1B-0778-4F4C-9140-0A21A28EF4DA}"/>
+          </ac:graphicFrameMkLst>
+        </pc:graphicFrameChg>
+      </pc:sldChg>
+      <pc:sldChg chg="modSp mod">
+        <pc:chgData name="Judson Santiago" userId="ebb108da2f256286" providerId="LiveId" clId="{892A6213-B575-4955-849D-E82EBCE1248D}" dt="2021-07-06T02:57:36.449" v="188" actId="6549"/>
+        <pc:sldMkLst>
+          <pc:docMk/>
+          <pc:sldMk cId="950544423" sldId="260"/>
+        </pc:sldMkLst>
+        <pc:spChg chg="mod">
+          <ac:chgData name="Judson Santiago" userId="ebb108da2f256286" providerId="LiveId" clId="{892A6213-B575-4955-849D-E82EBCE1248D}" dt="2021-07-06T02:57:36.449" v="188" actId="6549"/>
+          <ac:spMkLst>
+            <pc:docMk/>
+            <pc:sldMk cId="950544423" sldId="260"/>
+            <ac:spMk id="2" creationId="{00000000-0000-0000-0000-000000000000}"/>
+          </ac:spMkLst>
+        </pc:spChg>
+      </pc:sldChg>
+      <pc:sldChg chg="modSp mod">
+        <pc:chgData name="Judson Santiago" userId="ebb108da2f256286" providerId="LiveId" clId="{892A6213-B575-4955-849D-E82EBCE1248D}" dt="2021-07-06T03:02:17.453" v="220" actId="692"/>
+        <pc:sldMkLst>
+          <pc:docMk/>
+          <pc:sldMk cId="926871459" sldId="261"/>
+        </pc:sldMkLst>
+        <pc:spChg chg="mod">
+          <ac:chgData name="Judson Santiago" userId="ebb108da2f256286" providerId="LiveId" clId="{892A6213-B575-4955-849D-E82EBCE1248D}" dt="2021-07-06T03:00:24.964" v="204" actId="1037"/>
+          <ac:spMkLst>
+            <pc:docMk/>
+            <pc:sldMk cId="926871459" sldId="261"/>
+            <ac:spMk id="10" creationId="{00000000-0000-0000-0000-000000000000}"/>
+          </ac:spMkLst>
+        </pc:spChg>
+        <pc:spChg chg="mod">
+          <ac:chgData name="Judson Santiago" userId="ebb108da2f256286" providerId="LiveId" clId="{892A6213-B575-4955-849D-E82EBCE1248D}" dt="2021-07-06T03:00:24.964" v="204" actId="1037"/>
+          <ac:spMkLst>
+            <pc:docMk/>
+            <pc:sldMk cId="926871459" sldId="261"/>
+            <ac:spMk id="16" creationId="{00000000-0000-0000-0000-000000000000}"/>
+          </ac:spMkLst>
+        </pc:spChg>
+        <pc:spChg chg="mod">
+          <ac:chgData name="Judson Santiago" userId="ebb108da2f256286" providerId="LiveId" clId="{892A6213-B575-4955-849D-E82EBCE1248D}" dt="2021-07-06T03:00:24.964" v="204" actId="1037"/>
+          <ac:spMkLst>
+            <pc:docMk/>
+            <pc:sldMk cId="926871459" sldId="261"/>
+            <ac:spMk id="17" creationId="{00000000-0000-0000-0000-000000000000}"/>
+          </ac:spMkLst>
+        </pc:spChg>
+        <pc:spChg chg="mod">
+          <ac:chgData name="Judson Santiago" userId="ebb108da2f256286" providerId="LiveId" clId="{892A6213-B575-4955-849D-E82EBCE1248D}" dt="2021-07-06T03:00:24.964" v="204" actId="1037"/>
+          <ac:spMkLst>
+            <pc:docMk/>
+            <pc:sldMk cId="926871459" sldId="261"/>
+            <ac:spMk id="18" creationId="{00000000-0000-0000-0000-000000000000}"/>
+          </ac:spMkLst>
+        </pc:spChg>
+        <pc:grpChg chg="mod">
+          <ac:chgData name="Judson Santiago" userId="ebb108da2f256286" providerId="LiveId" clId="{892A6213-B575-4955-849D-E82EBCE1248D}" dt="2021-07-06T03:01:52.656" v="218" actId="1037"/>
+          <ac:grpSpMkLst>
+            <pc:docMk/>
+            <pc:sldMk cId="926871459" sldId="261"/>
+            <ac:grpSpMk id="11" creationId="{00000000-0000-0000-0000-000000000000}"/>
+          </ac:grpSpMkLst>
+        </pc:grpChg>
+        <pc:cxnChg chg="mod">
+          <ac:chgData name="Judson Santiago" userId="ebb108da2f256286" providerId="LiveId" clId="{892A6213-B575-4955-849D-E82EBCE1248D}" dt="2021-07-06T03:02:17.453" v="220" actId="692"/>
+          <ac:cxnSpMkLst>
+            <pc:docMk/>
+            <pc:sldMk cId="926871459" sldId="261"/>
+            <ac:cxnSpMk id="12" creationId="{00000000-0000-0000-0000-000000000000}"/>
+          </ac:cxnSpMkLst>
+        </pc:cxnChg>
+        <pc:cxnChg chg="mod">
+          <ac:chgData name="Judson Santiago" userId="ebb108da2f256286" providerId="LiveId" clId="{892A6213-B575-4955-849D-E82EBCE1248D}" dt="2021-07-06T03:02:17.453" v="220" actId="692"/>
+          <ac:cxnSpMkLst>
+            <pc:docMk/>
+            <pc:sldMk cId="926871459" sldId="261"/>
+            <ac:cxnSpMk id="13" creationId="{00000000-0000-0000-0000-000000000000}"/>
+          </ac:cxnSpMkLst>
+        </pc:cxnChg>
+        <pc:cxnChg chg="mod">
+          <ac:chgData name="Judson Santiago" userId="ebb108da2f256286" providerId="LiveId" clId="{892A6213-B575-4955-849D-E82EBCE1248D}" dt="2021-07-06T03:02:17.453" v="220" actId="692"/>
+          <ac:cxnSpMkLst>
+            <pc:docMk/>
+            <pc:sldMk cId="926871459" sldId="261"/>
+            <ac:cxnSpMk id="14" creationId="{00000000-0000-0000-0000-000000000000}"/>
+          </ac:cxnSpMkLst>
+        </pc:cxnChg>
+        <pc:cxnChg chg="mod">
+          <ac:chgData name="Judson Santiago" userId="ebb108da2f256286" providerId="LiveId" clId="{892A6213-B575-4955-849D-E82EBCE1248D}" dt="2021-07-06T03:02:17.453" v="220" actId="692"/>
+          <ac:cxnSpMkLst>
+            <pc:docMk/>
+            <pc:sldMk cId="926871459" sldId="261"/>
+            <ac:cxnSpMk id="15" creationId="{00000000-0000-0000-0000-000000000000}"/>
+          </ac:cxnSpMkLst>
+        </pc:cxnChg>
+      </pc:sldChg>
+      <pc:sldChg chg="modSp mod">
+        <pc:chgData name="Judson Santiago" userId="ebb108da2f256286" providerId="LiveId" clId="{892A6213-B575-4955-849D-E82EBCE1248D}" dt="2021-07-06T03:53:28.497" v="497" actId="1036"/>
+        <pc:sldMkLst>
+          <pc:docMk/>
+          <pc:sldMk cId="2964675404" sldId="263"/>
+        </pc:sldMkLst>
+        <pc:spChg chg="mod">
+          <ac:chgData name="Judson Santiago" userId="ebb108da2f256286" providerId="LiveId" clId="{892A6213-B575-4955-849D-E82EBCE1248D}" dt="2021-07-06T03:53:21.177" v="493" actId="948"/>
+          <ac:spMkLst>
+            <pc:docMk/>
+            <pc:sldMk cId="2964675404" sldId="263"/>
+            <ac:spMk id="2" creationId="{00000000-0000-0000-0000-000000000000}"/>
+          </ac:spMkLst>
+        </pc:spChg>
+        <pc:grpChg chg="mod">
+          <ac:chgData name="Judson Santiago" userId="ebb108da2f256286" providerId="LiveId" clId="{892A6213-B575-4955-849D-E82EBCE1248D}" dt="2021-07-06T03:53:28.497" v="497" actId="1036"/>
+          <ac:grpSpMkLst>
+            <pc:docMk/>
+            <pc:sldMk cId="2964675404" sldId="263"/>
+            <ac:grpSpMk id="5" creationId="{00000000-0000-0000-0000-000000000000}"/>
+          </ac:grpSpMkLst>
+        </pc:grpChg>
+      </pc:sldChg>
+      <pc:sldChg chg="modSp mod">
+        <pc:chgData name="Judson Santiago" userId="ebb108da2f256286" providerId="LiveId" clId="{892A6213-B575-4955-849D-E82EBCE1248D}" dt="2021-07-06T03:50:45.146" v="470" actId="20577"/>
+        <pc:sldMkLst>
+          <pc:docMk/>
+          <pc:sldMk cId="2507631774" sldId="264"/>
+        </pc:sldMkLst>
+        <pc:spChg chg="mod">
+          <ac:chgData name="Judson Santiago" userId="ebb108da2f256286" providerId="LiveId" clId="{892A6213-B575-4955-849D-E82EBCE1248D}" dt="2021-07-06T03:50:45.146" v="470" actId="20577"/>
+          <ac:spMkLst>
+            <pc:docMk/>
+            <pc:sldMk cId="2507631774" sldId="264"/>
+            <ac:spMk id="2" creationId="{00000000-0000-0000-0000-000000000000}"/>
+          </ac:spMkLst>
+        </pc:spChg>
+      </pc:sldChg>
+      <pc:sldChg chg="modSp mod">
+        <pc:chgData name="Judson Santiago" userId="ebb108da2f256286" providerId="LiveId" clId="{892A6213-B575-4955-849D-E82EBCE1248D}" dt="2021-07-06T03:55:44.841" v="509" actId="20577"/>
+        <pc:sldMkLst>
+          <pc:docMk/>
+          <pc:sldMk cId="1844711731" sldId="265"/>
+        </pc:sldMkLst>
+        <pc:spChg chg="mod">
+          <ac:chgData name="Judson Santiago" userId="ebb108da2f256286" providerId="LiveId" clId="{892A6213-B575-4955-849D-E82EBCE1248D}" dt="2021-07-06T03:55:44.841" v="509" actId="20577"/>
+          <ac:spMkLst>
+            <pc:docMk/>
+            <pc:sldMk cId="1844711731" sldId="265"/>
+            <ac:spMk id="2" creationId="{00000000-0000-0000-0000-000000000000}"/>
+          </ac:spMkLst>
+        </pc:spChg>
+      </pc:sldChg>
+      <pc:sldChg chg="modSp mod">
+        <pc:chgData name="Judson Santiago" userId="ebb108da2f256286" providerId="LiveId" clId="{892A6213-B575-4955-849D-E82EBCE1248D}" dt="2021-07-06T03:54:45.457" v="498" actId="20577"/>
+        <pc:sldMkLst>
+          <pc:docMk/>
+          <pc:sldMk cId="4187815433" sldId="266"/>
+        </pc:sldMkLst>
+        <pc:spChg chg="mod">
+          <ac:chgData name="Judson Santiago" userId="ebb108da2f256286" providerId="LiveId" clId="{892A6213-B575-4955-849D-E82EBCE1248D}" dt="2021-07-06T03:54:45.457" v="498" actId="20577"/>
+          <ac:spMkLst>
+            <pc:docMk/>
+            <pc:sldMk cId="4187815433" sldId="266"/>
+            <ac:spMk id="2" creationId="{00000000-0000-0000-0000-000000000000}"/>
+          </ac:spMkLst>
+        </pc:spChg>
+      </pc:sldChg>
+      <pc:sldChg chg="modSp mod">
+        <pc:chgData name="Judson Santiago" userId="ebb108da2f256286" providerId="LiveId" clId="{892A6213-B575-4955-849D-E82EBCE1248D}" dt="2021-07-06T03:04:09.538" v="224" actId="6549"/>
+        <pc:sldMkLst>
+          <pc:docMk/>
+          <pc:sldMk cId="457963254" sldId="267"/>
+        </pc:sldMkLst>
+        <pc:spChg chg="mod">
+          <ac:chgData name="Judson Santiago" userId="ebb108da2f256286" providerId="LiveId" clId="{892A6213-B575-4955-849D-E82EBCE1248D}" dt="2021-07-06T03:04:09.538" v="224" actId="6549"/>
+          <ac:spMkLst>
+            <pc:docMk/>
+            <pc:sldMk cId="457963254" sldId="267"/>
+            <ac:spMk id="2" creationId="{00000000-0000-0000-0000-000000000000}"/>
+          </ac:spMkLst>
+        </pc:spChg>
+      </pc:sldChg>
+      <pc:sldChg chg="modSp mod">
+        <pc:chgData name="Judson Santiago" userId="ebb108da2f256286" providerId="LiveId" clId="{892A6213-B575-4955-849D-E82EBCE1248D}" dt="2021-07-06T03:05:13.495" v="225" actId="20577"/>
+        <pc:sldMkLst>
+          <pc:docMk/>
+          <pc:sldMk cId="20598424" sldId="268"/>
+        </pc:sldMkLst>
+        <pc:spChg chg="mod">
+          <ac:chgData name="Judson Santiago" userId="ebb108da2f256286" providerId="LiveId" clId="{892A6213-B575-4955-849D-E82EBCE1248D}" dt="2021-07-06T03:05:13.495" v="225" actId="20577"/>
+          <ac:spMkLst>
+            <pc:docMk/>
+            <pc:sldMk cId="20598424" sldId="268"/>
+            <ac:spMk id="2" creationId="{00000000-0000-0000-0000-000000000000}"/>
+          </ac:spMkLst>
+        </pc:spChg>
+      </pc:sldChg>
+      <pc:sldChg chg="modSp mod">
+        <pc:chgData name="Judson Santiago" userId="ebb108da2f256286" providerId="LiveId" clId="{892A6213-B575-4955-849D-E82EBCE1248D}" dt="2021-07-06T03:23:32.937" v="300" actId="1037"/>
+        <pc:sldMkLst>
+          <pc:docMk/>
+          <pc:sldMk cId="447932897" sldId="269"/>
+        </pc:sldMkLst>
+        <pc:spChg chg="mod">
+          <ac:chgData name="Judson Santiago" userId="ebb108da2f256286" providerId="LiveId" clId="{892A6213-B575-4955-849D-E82EBCE1248D}" dt="2021-07-06T03:11:25.405" v="235" actId="20577"/>
+          <ac:spMkLst>
+            <pc:docMk/>
+            <pc:sldMk cId="447932897" sldId="269"/>
+            <ac:spMk id="2" creationId="{00000000-0000-0000-0000-000000000000}"/>
+          </ac:spMkLst>
+        </pc:spChg>
+        <pc:grpChg chg="mod">
+          <ac:chgData name="Judson Santiago" userId="ebb108da2f256286" providerId="LiveId" clId="{892A6213-B575-4955-849D-E82EBCE1248D}" dt="2021-07-06T03:23:32.937" v="300" actId="1037"/>
+          <ac:grpSpMkLst>
+            <pc:docMk/>
+            <pc:sldMk cId="447932897" sldId="269"/>
+            <ac:grpSpMk id="7" creationId="{00000000-0000-0000-0000-000000000000}"/>
+          </ac:grpSpMkLst>
+        </pc:grpChg>
+      </pc:sldChg>
+      <pc:sldChg chg="modSp mod">
+        <pc:chgData name="Judson Santiago" userId="ebb108da2f256286" providerId="LiveId" clId="{892A6213-B575-4955-849D-E82EBCE1248D}" dt="2021-07-06T03:27:37.194" v="319" actId="1076"/>
+        <pc:sldMkLst>
+          <pc:docMk/>
+          <pc:sldMk cId="951175386" sldId="270"/>
+        </pc:sldMkLst>
+        <pc:spChg chg="mod">
+          <ac:chgData name="Judson Santiago" userId="ebb108da2f256286" providerId="LiveId" clId="{892A6213-B575-4955-849D-E82EBCE1248D}" dt="2021-07-06T03:24:32.378" v="305" actId="20577"/>
+          <ac:spMkLst>
+            <pc:docMk/>
+            <pc:sldMk cId="951175386" sldId="270"/>
+            <ac:spMk id="2" creationId="{00000000-0000-0000-0000-000000000000}"/>
+          </ac:spMkLst>
+        </pc:spChg>
+        <pc:spChg chg="mod">
+          <ac:chgData name="Judson Santiago" userId="ebb108da2f256286" providerId="LiveId" clId="{892A6213-B575-4955-849D-E82EBCE1248D}" dt="2021-07-06T03:27:37.194" v="319" actId="1076"/>
+          <ac:spMkLst>
+            <pc:docMk/>
+            <pc:sldMk cId="951175386" sldId="270"/>
+            <ac:spMk id="9" creationId="{00000000-0000-0000-0000-000000000000}"/>
+          </ac:spMkLst>
+        </pc:spChg>
+        <pc:picChg chg="mod">
+          <ac:chgData name="Judson Santiago" userId="ebb108da2f256286" providerId="LiveId" clId="{892A6213-B575-4955-849D-E82EBCE1248D}" dt="2021-07-06T03:27:31.705" v="318" actId="14100"/>
+          <ac:picMkLst>
+            <pc:docMk/>
+            <pc:sldMk cId="951175386" sldId="270"/>
+            <ac:picMk id="8" creationId="{00000000-0000-0000-0000-000000000000}"/>
+          </ac:picMkLst>
+        </pc:picChg>
+      </pc:sldChg>
+      <pc:sldChg chg="modSp mod">
+        <pc:chgData name="Judson Santiago" userId="ebb108da2f256286" providerId="LiveId" clId="{892A6213-B575-4955-849D-E82EBCE1248D}" dt="2021-07-06T03:27:02.001" v="317" actId="1036"/>
+        <pc:sldMkLst>
+          <pc:docMk/>
+          <pc:sldMk cId="3254275499" sldId="271"/>
+        </pc:sldMkLst>
+        <pc:spChg chg="mod">
+          <ac:chgData name="Judson Santiago" userId="ebb108da2f256286" providerId="LiveId" clId="{892A6213-B575-4955-849D-E82EBCE1248D}" dt="2021-07-06T03:26:04.873" v="312" actId="20577"/>
+          <ac:spMkLst>
+            <pc:docMk/>
+            <pc:sldMk cId="3254275499" sldId="271"/>
+            <ac:spMk id="2" creationId="{00000000-0000-0000-0000-000000000000}"/>
+          </ac:spMkLst>
+        </pc:spChg>
+        <pc:spChg chg="mod">
+          <ac:chgData name="Judson Santiago" userId="ebb108da2f256286" providerId="LiveId" clId="{892A6213-B575-4955-849D-E82EBCE1248D}" dt="2021-07-06T03:26:47.235" v="314" actId="1076"/>
+          <ac:spMkLst>
+            <pc:docMk/>
+            <pc:sldMk cId="3254275499" sldId="271"/>
+            <ac:spMk id="6" creationId="{00000000-0000-0000-0000-000000000000}"/>
+          </ac:spMkLst>
+        </pc:spChg>
+        <pc:grpChg chg="mod">
+          <ac:chgData name="Judson Santiago" userId="ebb108da2f256286" providerId="LiveId" clId="{892A6213-B575-4955-849D-E82EBCE1248D}" dt="2021-07-06T03:27:02.001" v="317" actId="1036"/>
+          <ac:grpSpMkLst>
+            <pc:docMk/>
+            <pc:sldMk cId="3254275499" sldId="271"/>
+            <ac:grpSpMk id="4" creationId="{00000000-0000-0000-0000-000000000000}"/>
+          </ac:grpSpMkLst>
+        </pc:grpChg>
+        <pc:picChg chg="mod">
+          <ac:chgData name="Judson Santiago" userId="ebb108da2f256286" providerId="LiveId" clId="{892A6213-B575-4955-849D-E82EBCE1248D}" dt="2021-07-06T03:26:34.677" v="313" actId="1440"/>
+          <ac:picMkLst>
+            <pc:docMk/>
+            <pc:sldMk cId="3254275499" sldId="271"/>
+            <ac:picMk id="5" creationId="{00000000-0000-0000-0000-000000000000}"/>
+          </ac:picMkLst>
+        </pc:picChg>
+        <pc:picChg chg="mod">
+          <ac:chgData name="Judson Santiago" userId="ebb108da2f256286" providerId="LiveId" clId="{892A6213-B575-4955-849D-E82EBCE1248D}" dt="2021-07-06T03:26:34.677" v="313" actId="1440"/>
+          <ac:picMkLst>
+            <pc:docMk/>
+            <pc:sldMk cId="3254275499" sldId="271"/>
+            <ac:picMk id="7" creationId="{00000000-0000-0000-0000-000000000000}"/>
+          </ac:picMkLst>
+        </pc:picChg>
+      </pc:sldChg>
+      <pc:sldChg chg="modSp mod">
+        <pc:chgData name="Judson Santiago" userId="ebb108da2f256286" providerId="LiveId" clId="{892A6213-B575-4955-849D-E82EBCE1248D}" dt="2021-07-06T03:32:31.728" v="349" actId="6549"/>
+        <pc:sldMkLst>
+          <pc:docMk/>
+          <pc:sldMk cId="814443891" sldId="273"/>
+        </pc:sldMkLst>
+        <pc:spChg chg="mod">
+          <ac:chgData name="Judson Santiago" userId="ebb108da2f256286" providerId="LiveId" clId="{892A6213-B575-4955-849D-E82EBCE1248D}" dt="2021-07-06T03:32:31.728" v="349" actId="6549"/>
+          <ac:spMkLst>
+            <pc:docMk/>
+            <pc:sldMk cId="814443891" sldId="273"/>
+            <ac:spMk id="2" creationId="{00000000-0000-0000-0000-000000000000}"/>
+          </ac:spMkLst>
+        </pc:spChg>
+      </pc:sldChg>
+      <pc:sldChg chg="modSp mod">
+        <pc:chgData name="Judson Santiago" userId="ebb108da2f256286" providerId="LiveId" clId="{892A6213-B575-4955-849D-E82EBCE1248D}" dt="2021-07-06T03:32:20.529" v="346" actId="27636"/>
+        <pc:sldMkLst>
+          <pc:docMk/>
+          <pc:sldMk cId="899213688" sldId="274"/>
+        </pc:sldMkLst>
+        <pc:spChg chg="mod">
+          <ac:chgData name="Judson Santiago" userId="ebb108da2f256286" providerId="LiveId" clId="{892A6213-B575-4955-849D-E82EBCE1248D}" dt="2021-07-06T03:32:20.529" v="346" actId="27636"/>
+          <ac:spMkLst>
+            <pc:docMk/>
+            <pc:sldMk cId="899213688" sldId="274"/>
+            <ac:spMk id="2" creationId="{00000000-0000-0000-0000-000000000000}"/>
+          </ac:spMkLst>
+        </pc:spChg>
+      </pc:sldChg>
+      <pc:sldChg chg="modSp mod">
+        <pc:chgData name="Judson Santiago" userId="ebb108da2f256286" providerId="LiveId" clId="{892A6213-B575-4955-849D-E82EBCE1248D}" dt="2021-07-06T03:33:27.894" v="357" actId="1037"/>
+        <pc:sldMkLst>
+          <pc:docMk/>
+          <pc:sldMk cId="3970567385" sldId="275"/>
+        </pc:sldMkLst>
+        <pc:spChg chg="mod">
+          <ac:chgData name="Judson Santiago" userId="ebb108da2f256286" providerId="LiveId" clId="{892A6213-B575-4955-849D-E82EBCE1248D}" dt="2021-07-06T03:33:10.847" v="351" actId="20577"/>
+          <ac:spMkLst>
+            <pc:docMk/>
+            <pc:sldMk cId="3970567385" sldId="275"/>
+            <ac:spMk id="2" creationId="{00000000-0000-0000-0000-000000000000}"/>
+          </ac:spMkLst>
+        </pc:spChg>
+        <pc:spChg chg="mod">
+          <ac:chgData name="Judson Santiago" userId="ebb108da2f256286" providerId="LiveId" clId="{892A6213-B575-4955-849D-E82EBCE1248D}" dt="2021-07-06T03:33:27.894" v="357" actId="1037"/>
+          <ac:spMkLst>
+            <pc:docMk/>
+            <pc:sldMk cId="3970567385" sldId="275"/>
+            <ac:spMk id="6" creationId="{00000000-0000-0000-0000-000000000000}"/>
+          </ac:spMkLst>
+        </pc:spChg>
+        <pc:picChg chg="mod">
+          <ac:chgData name="Judson Santiago" userId="ebb108da2f256286" providerId="LiveId" clId="{892A6213-B575-4955-849D-E82EBCE1248D}" dt="2021-07-06T03:33:27.894" v="357" actId="1037"/>
+          <ac:picMkLst>
+            <pc:docMk/>
+            <pc:sldMk cId="3970567385" sldId="275"/>
+            <ac:picMk id="4" creationId="{00000000-0000-0000-0000-000000000000}"/>
+          </ac:picMkLst>
+        </pc:picChg>
+      </pc:sldChg>
+      <pc:sldChg chg="modSp mod">
+        <pc:chgData name="Judson Santiago" userId="ebb108da2f256286" providerId="LiveId" clId="{892A6213-B575-4955-849D-E82EBCE1248D}" dt="2021-07-06T03:34:17.223" v="359" actId="20577"/>
+        <pc:sldMkLst>
+          <pc:docMk/>
+          <pc:sldMk cId="3605239944" sldId="276"/>
+        </pc:sldMkLst>
+        <pc:spChg chg="mod">
+          <ac:chgData name="Judson Santiago" userId="ebb108da2f256286" providerId="LiveId" clId="{892A6213-B575-4955-849D-E82EBCE1248D}" dt="2021-07-06T03:34:17.223" v="359" actId="20577"/>
+          <ac:spMkLst>
+            <pc:docMk/>
+            <pc:sldMk cId="3605239944" sldId="276"/>
+            <ac:spMk id="2" creationId="{00000000-0000-0000-0000-000000000000}"/>
+          </ac:spMkLst>
+        </pc:spChg>
+      </pc:sldChg>
+      <pc:sldChg chg="modSp mod">
+        <pc:chgData name="Judson Santiago" userId="ebb108da2f256286" providerId="LiveId" clId="{892A6213-B575-4955-849D-E82EBCE1248D}" dt="2021-07-06T03:34:59.303" v="370" actId="20577"/>
+        <pc:sldMkLst>
+          <pc:docMk/>
+          <pc:sldMk cId="1255073804" sldId="278"/>
+        </pc:sldMkLst>
+        <pc:spChg chg="mod">
+          <ac:chgData name="Judson Santiago" userId="ebb108da2f256286" providerId="LiveId" clId="{892A6213-B575-4955-849D-E82EBCE1248D}" dt="2021-07-06T03:34:59.303" v="370" actId="20577"/>
+          <ac:spMkLst>
+            <pc:docMk/>
+            <pc:sldMk cId="1255073804" sldId="278"/>
+            <ac:spMk id="2" creationId="{00000000-0000-0000-0000-000000000000}"/>
+          </ac:spMkLst>
+        </pc:spChg>
+      </pc:sldChg>
+      <pc:sldChg chg="modSp mod">
+        <pc:chgData name="Judson Santiago" userId="ebb108da2f256286" providerId="LiveId" clId="{892A6213-B575-4955-849D-E82EBCE1248D}" dt="2021-07-06T03:37:51.486" v="389" actId="6549"/>
+        <pc:sldMkLst>
+          <pc:docMk/>
+          <pc:sldMk cId="727786704" sldId="279"/>
+        </pc:sldMkLst>
+        <pc:spChg chg="mod">
+          <ac:chgData name="Judson Santiago" userId="ebb108da2f256286" providerId="LiveId" clId="{892A6213-B575-4955-849D-E82EBCE1248D}" dt="2021-07-06T03:37:51.486" v="389" actId="6549"/>
+          <ac:spMkLst>
+            <pc:docMk/>
+            <pc:sldMk cId="727786704" sldId="279"/>
+            <ac:spMk id="2" creationId="{00000000-0000-0000-0000-000000000000}"/>
+          </ac:spMkLst>
+        </pc:spChg>
+      </pc:sldChg>
+      <pc:sldChg chg="modSp mod">
+        <pc:chgData name="Judson Santiago" userId="ebb108da2f256286" providerId="LiveId" clId="{892A6213-B575-4955-849D-E82EBCE1248D}" dt="2021-07-06T03:38:31.097" v="393" actId="27636"/>
+        <pc:sldMkLst>
+          <pc:docMk/>
+          <pc:sldMk cId="3611717784" sldId="280"/>
+        </pc:sldMkLst>
+        <pc:spChg chg="mod">
+          <ac:chgData name="Judson Santiago" userId="ebb108da2f256286" providerId="LiveId" clId="{892A6213-B575-4955-849D-E82EBCE1248D}" dt="2021-07-06T03:38:31.097" v="393" actId="27636"/>
+          <ac:spMkLst>
+            <pc:docMk/>
+            <pc:sldMk cId="3611717784" sldId="280"/>
+            <ac:spMk id="2" creationId="{00000000-0000-0000-0000-000000000000}"/>
+          </ac:spMkLst>
+        </pc:spChg>
+      </pc:sldChg>
+      <pc:sldChg chg="modSp mod">
+        <pc:chgData name="Judson Santiago" userId="ebb108da2f256286" providerId="LiveId" clId="{892A6213-B575-4955-849D-E82EBCE1248D}" dt="2021-07-06T04:04:50.587" v="520" actId="1582"/>
+        <pc:sldMkLst>
+          <pc:docMk/>
+          <pc:sldMk cId="12527219" sldId="285"/>
+        </pc:sldMkLst>
+        <pc:spChg chg="mod">
+          <ac:chgData name="Judson Santiago" userId="ebb108da2f256286" providerId="LiveId" clId="{892A6213-B575-4955-849D-E82EBCE1248D}" dt="2021-07-06T03:42:56.724" v="417" actId="6549"/>
+          <ac:spMkLst>
+            <pc:docMk/>
+            <pc:sldMk cId="12527219" sldId="285"/>
+            <ac:spMk id="2" creationId="{00000000-0000-0000-0000-000000000000}"/>
+          </ac:spMkLst>
+        </pc:spChg>
+        <pc:spChg chg="mod">
+          <ac:chgData name="Judson Santiago" userId="ebb108da2f256286" providerId="LiveId" clId="{892A6213-B575-4955-849D-E82EBCE1248D}" dt="2021-07-06T04:04:50.587" v="520" actId="1582"/>
+          <ac:spMkLst>
+            <pc:docMk/>
+            <pc:sldMk cId="12527219" sldId="285"/>
+            <ac:spMk id="8" creationId="{00000000-0000-0000-0000-000000000000}"/>
+          </ac:spMkLst>
+        </pc:spChg>
+        <pc:spChg chg="mod">
+          <ac:chgData name="Judson Santiago" userId="ebb108da2f256286" providerId="LiveId" clId="{892A6213-B575-4955-849D-E82EBCE1248D}" dt="2021-07-06T04:04:50.587" v="520" actId="1582"/>
+          <ac:spMkLst>
+            <pc:docMk/>
+            <pc:sldMk cId="12527219" sldId="285"/>
+            <ac:spMk id="13" creationId="{00000000-0000-0000-0000-000000000000}"/>
+          </ac:spMkLst>
+        </pc:spChg>
+        <pc:spChg chg="mod">
+          <ac:chgData name="Judson Santiago" userId="ebb108da2f256286" providerId="LiveId" clId="{892A6213-B575-4955-849D-E82EBCE1248D}" dt="2021-07-06T04:04:50.587" v="520" actId="1582"/>
+          <ac:spMkLst>
+            <pc:docMk/>
+            <pc:sldMk cId="12527219" sldId="285"/>
+            <ac:spMk id="18" creationId="{00000000-0000-0000-0000-000000000000}"/>
+          </ac:spMkLst>
+        </pc:spChg>
+        <pc:spChg chg="mod">
+          <ac:chgData name="Judson Santiago" userId="ebb108da2f256286" providerId="LiveId" clId="{892A6213-B575-4955-849D-E82EBCE1248D}" dt="2021-07-06T04:04:50.587" v="520" actId="1582"/>
+          <ac:spMkLst>
+            <pc:docMk/>
+            <pc:sldMk cId="12527219" sldId="285"/>
+            <ac:spMk id="21" creationId="{00000000-0000-0000-0000-000000000000}"/>
+          </ac:spMkLst>
+        </pc:spChg>
+        <pc:spChg chg="mod">
+          <ac:chgData name="Judson Santiago" userId="ebb108da2f256286" providerId="LiveId" clId="{892A6213-B575-4955-849D-E82EBCE1248D}" dt="2021-07-06T04:04:50.587" v="520" actId="1582"/>
+          <ac:spMkLst>
+            <pc:docMk/>
+            <pc:sldMk cId="12527219" sldId="285"/>
+            <ac:spMk id="23" creationId="{00000000-0000-0000-0000-000000000000}"/>
+          </ac:spMkLst>
+        </pc:spChg>
+        <pc:spChg chg="mod">
+          <ac:chgData name="Judson Santiago" userId="ebb108da2f256286" providerId="LiveId" clId="{892A6213-B575-4955-849D-E82EBCE1248D}" dt="2021-07-06T04:04:50.587" v="520" actId="1582"/>
+          <ac:spMkLst>
+            <pc:docMk/>
+            <pc:sldMk cId="12527219" sldId="285"/>
+            <ac:spMk id="27" creationId="{00000000-0000-0000-0000-000000000000}"/>
+          </ac:spMkLst>
+        </pc:spChg>
+        <pc:spChg chg="mod">
+          <ac:chgData name="Judson Santiago" userId="ebb108da2f256286" providerId="LiveId" clId="{892A6213-B575-4955-849D-E82EBCE1248D}" dt="2021-07-06T04:04:50.587" v="520" actId="1582"/>
+          <ac:spMkLst>
+            <pc:docMk/>
+            <pc:sldMk cId="12527219" sldId="285"/>
+            <ac:spMk id="38" creationId="{00000000-0000-0000-0000-000000000000}"/>
+          </ac:spMkLst>
+        </pc:spChg>
+        <pc:spChg chg="mod">
+          <ac:chgData name="Judson Santiago" userId="ebb108da2f256286" providerId="LiveId" clId="{892A6213-B575-4955-849D-E82EBCE1248D}" dt="2021-07-06T04:04:50.587" v="520" actId="1582"/>
+          <ac:spMkLst>
+            <pc:docMk/>
+            <pc:sldMk cId="12527219" sldId="285"/>
+            <ac:spMk id="41" creationId="{00000000-0000-0000-0000-000000000000}"/>
+          </ac:spMkLst>
+        </pc:spChg>
+        <pc:spChg chg="mod">
+          <ac:chgData name="Judson Santiago" userId="ebb108da2f256286" providerId="LiveId" clId="{892A6213-B575-4955-849D-E82EBCE1248D}" dt="2021-07-06T04:04:50.587" v="520" actId="1582"/>
+          <ac:spMkLst>
+            <pc:docMk/>
+            <pc:sldMk cId="12527219" sldId="285"/>
+            <ac:spMk id="42" creationId="{00000000-0000-0000-0000-000000000000}"/>
+          </ac:spMkLst>
+        </pc:spChg>
+        <pc:spChg chg="mod">
+          <ac:chgData name="Judson Santiago" userId="ebb108da2f256286" providerId="LiveId" clId="{892A6213-B575-4955-849D-E82EBCE1248D}" dt="2021-07-06T04:04:50.587" v="520" actId="1582"/>
+          <ac:spMkLst>
+            <pc:docMk/>
+            <pc:sldMk cId="12527219" sldId="285"/>
+            <ac:spMk id="45" creationId="{00000000-0000-0000-0000-000000000000}"/>
+          </ac:spMkLst>
+        </pc:spChg>
+        <pc:spChg chg="mod">
+          <ac:chgData name="Judson Santiago" userId="ebb108da2f256286" providerId="LiveId" clId="{892A6213-B575-4955-849D-E82EBCE1248D}" dt="2021-07-06T04:04:50.587" v="520" actId="1582"/>
+          <ac:spMkLst>
+            <pc:docMk/>
+            <pc:sldMk cId="12527219" sldId="285"/>
+            <ac:spMk id="49" creationId="{00000000-0000-0000-0000-000000000000}"/>
+          </ac:spMkLst>
+        </pc:spChg>
+        <pc:grpChg chg="mod">
+          <ac:chgData name="Judson Santiago" userId="ebb108da2f256286" providerId="LiveId" clId="{892A6213-B575-4955-849D-E82EBCE1248D}" dt="2021-07-06T03:43:04.534" v="418" actId="1076"/>
+          <ac:grpSpMkLst>
+            <pc:docMk/>
+            <pc:sldMk cId="12527219" sldId="285"/>
+            <ac:grpSpMk id="4" creationId="{00000000-0000-0000-0000-000000000000}"/>
+          </ac:grpSpMkLst>
+        </pc:grpChg>
+        <pc:cxnChg chg="mod">
+          <ac:chgData name="Judson Santiago" userId="ebb108da2f256286" providerId="LiveId" clId="{892A6213-B575-4955-849D-E82EBCE1248D}" dt="2021-07-06T04:04:31.857" v="519" actId="1582"/>
+          <ac:cxnSpMkLst>
+            <pc:docMk/>
+            <pc:sldMk cId="12527219" sldId="285"/>
+            <ac:cxnSpMk id="15" creationId="{00000000-0000-0000-0000-000000000000}"/>
+          </ac:cxnSpMkLst>
+        </pc:cxnChg>
+        <pc:cxnChg chg="mod">
+          <ac:chgData name="Judson Santiago" userId="ebb108da2f256286" providerId="LiveId" clId="{892A6213-B575-4955-849D-E82EBCE1248D}" dt="2021-07-06T04:04:31.857" v="519" actId="1582"/>
+          <ac:cxnSpMkLst>
+            <pc:docMk/>
+            <pc:sldMk cId="12527219" sldId="285"/>
+            <ac:cxnSpMk id="16" creationId="{00000000-0000-0000-0000-000000000000}"/>
+          </ac:cxnSpMkLst>
+        </pc:cxnChg>
+        <pc:cxnChg chg="mod">
+          <ac:chgData name="Judson Santiago" userId="ebb108da2f256286" providerId="LiveId" clId="{892A6213-B575-4955-849D-E82EBCE1248D}" dt="2021-07-06T04:04:31.857" v="519" actId="1582"/>
+          <ac:cxnSpMkLst>
+            <pc:docMk/>
+            <pc:sldMk cId="12527219" sldId="285"/>
+            <ac:cxnSpMk id="17" creationId="{00000000-0000-0000-0000-000000000000}"/>
+          </ac:cxnSpMkLst>
+        </pc:cxnChg>
+        <pc:cxnChg chg="mod">
+          <ac:chgData name="Judson Santiago" userId="ebb108da2f256286" providerId="LiveId" clId="{892A6213-B575-4955-849D-E82EBCE1248D}" dt="2021-07-06T04:04:31.857" v="519" actId="1582"/>
+          <ac:cxnSpMkLst>
+            <pc:docMk/>
+            <pc:sldMk cId="12527219" sldId="285"/>
+            <ac:cxnSpMk id="19" creationId="{00000000-0000-0000-0000-000000000000}"/>
+          </ac:cxnSpMkLst>
+        </pc:cxnChg>
+        <pc:cxnChg chg="mod">
+          <ac:chgData name="Judson Santiago" userId="ebb108da2f256286" providerId="LiveId" clId="{892A6213-B575-4955-849D-E82EBCE1248D}" dt="2021-07-06T04:04:31.857" v="519" actId="1582"/>
+          <ac:cxnSpMkLst>
+            <pc:docMk/>
+            <pc:sldMk cId="12527219" sldId="285"/>
+            <ac:cxnSpMk id="22" creationId="{00000000-0000-0000-0000-000000000000}"/>
+          </ac:cxnSpMkLst>
+        </pc:cxnChg>
+        <pc:cxnChg chg="mod">
+          <ac:chgData name="Judson Santiago" userId="ebb108da2f256286" providerId="LiveId" clId="{892A6213-B575-4955-849D-E82EBCE1248D}" dt="2021-07-06T04:04:31.857" v="519" actId="1582"/>
+          <ac:cxnSpMkLst>
+            <pc:docMk/>
+            <pc:sldMk cId="12527219" sldId="285"/>
+            <ac:cxnSpMk id="32" creationId="{00000000-0000-0000-0000-000000000000}"/>
+          </ac:cxnSpMkLst>
+        </pc:cxnChg>
+        <pc:cxnChg chg="mod">
+          <ac:chgData name="Judson Santiago" userId="ebb108da2f256286" providerId="LiveId" clId="{892A6213-B575-4955-849D-E82EBCE1248D}" dt="2021-07-06T04:04:31.857" v="519" actId="1582"/>
+          <ac:cxnSpMkLst>
+            <pc:docMk/>
+            <pc:sldMk cId="12527219" sldId="285"/>
+            <ac:cxnSpMk id="35" creationId="{00000000-0000-0000-0000-000000000000}"/>
+          </ac:cxnSpMkLst>
+        </pc:cxnChg>
+        <pc:cxnChg chg="mod">
+          <ac:chgData name="Judson Santiago" userId="ebb108da2f256286" providerId="LiveId" clId="{892A6213-B575-4955-849D-E82EBCE1248D}" dt="2021-07-06T04:04:31.857" v="519" actId="1582"/>
+          <ac:cxnSpMkLst>
+            <pc:docMk/>
+            <pc:sldMk cId="12527219" sldId="285"/>
+            <ac:cxnSpMk id="39" creationId="{00000000-0000-0000-0000-000000000000}"/>
+          </ac:cxnSpMkLst>
+        </pc:cxnChg>
+        <pc:cxnChg chg="mod">
+          <ac:chgData name="Judson Santiago" userId="ebb108da2f256286" providerId="LiveId" clId="{892A6213-B575-4955-849D-E82EBCE1248D}" dt="2021-07-06T04:04:31.857" v="519" actId="1582"/>
+          <ac:cxnSpMkLst>
+            <pc:docMk/>
+            <pc:sldMk cId="12527219" sldId="285"/>
+            <ac:cxnSpMk id="40" creationId="{00000000-0000-0000-0000-000000000000}"/>
+          </ac:cxnSpMkLst>
+        </pc:cxnChg>
+        <pc:cxnChg chg="mod">
+          <ac:chgData name="Judson Santiago" userId="ebb108da2f256286" providerId="LiveId" clId="{892A6213-B575-4955-849D-E82EBCE1248D}" dt="2021-07-06T04:04:31.857" v="519" actId="1582"/>
+          <ac:cxnSpMkLst>
+            <pc:docMk/>
+            <pc:sldMk cId="12527219" sldId="285"/>
+            <ac:cxnSpMk id="43" creationId="{00000000-0000-0000-0000-000000000000}"/>
+          </ac:cxnSpMkLst>
+        </pc:cxnChg>
+        <pc:cxnChg chg="mod">
+          <ac:chgData name="Judson Santiago" userId="ebb108da2f256286" providerId="LiveId" clId="{892A6213-B575-4955-849D-E82EBCE1248D}" dt="2021-07-06T04:04:31.857" v="519" actId="1582"/>
+          <ac:cxnSpMkLst>
+            <pc:docMk/>
+            <pc:sldMk cId="12527219" sldId="285"/>
+            <ac:cxnSpMk id="46" creationId="{00000000-0000-0000-0000-000000000000}"/>
+          </ac:cxnSpMkLst>
+        </pc:cxnChg>
+        <pc:cxnChg chg="mod">
+          <ac:chgData name="Judson Santiago" userId="ebb108da2f256286" providerId="LiveId" clId="{892A6213-B575-4955-849D-E82EBCE1248D}" dt="2021-07-06T04:04:31.857" v="519" actId="1582"/>
+          <ac:cxnSpMkLst>
+            <pc:docMk/>
+            <pc:sldMk cId="12527219" sldId="285"/>
+            <ac:cxnSpMk id="48" creationId="{00000000-0000-0000-0000-000000000000}"/>
+          </ac:cxnSpMkLst>
+        </pc:cxnChg>
+        <pc:cxnChg chg="mod">
+          <ac:chgData name="Judson Santiago" userId="ebb108da2f256286" providerId="LiveId" clId="{892A6213-B575-4955-849D-E82EBCE1248D}" dt="2021-07-06T04:04:31.857" v="519" actId="1582"/>
+          <ac:cxnSpMkLst>
+            <pc:docMk/>
+            <pc:sldMk cId="12527219" sldId="285"/>
+            <ac:cxnSpMk id="50" creationId="{00000000-0000-0000-0000-000000000000}"/>
+          </ac:cxnSpMkLst>
+        </pc:cxnChg>
+        <pc:cxnChg chg="mod">
+          <ac:chgData name="Judson Santiago" userId="ebb108da2f256286" providerId="LiveId" clId="{892A6213-B575-4955-849D-E82EBCE1248D}" dt="2021-07-06T04:04:31.857" v="519" actId="1582"/>
+          <ac:cxnSpMkLst>
+            <pc:docMk/>
+            <pc:sldMk cId="12527219" sldId="285"/>
+            <ac:cxnSpMk id="52" creationId="{00000000-0000-0000-0000-000000000000}"/>
+          </ac:cxnSpMkLst>
+        </pc:cxnChg>
+        <pc:cxnChg chg="mod">
+          <ac:chgData name="Judson Santiago" userId="ebb108da2f256286" providerId="LiveId" clId="{892A6213-B575-4955-849D-E82EBCE1248D}" dt="2021-07-06T04:04:31.857" v="519" actId="1582"/>
+          <ac:cxnSpMkLst>
+            <pc:docMk/>
+            <pc:sldMk cId="12527219" sldId="285"/>
+            <ac:cxnSpMk id="55" creationId="{00000000-0000-0000-0000-000000000000}"/>
+          </ac:cxnSpMkLst>
+        </pc:cxnChg>
+      </pc:sldChg>
+      <pc:sldChg chg="modSp mod">
+        <pc:chgData name="Judson Santiago" userId="ebb108da2f256286" providerId="LiveId" clId="{892A6213-B575-4955-849D-E82EBCE1248D}" dt="2021-07-06T03:45:30.100" v="438" actId="1037"/>
+        <pc:sldMkLst>
+          <pc:docMk/>
+          <pc:sldMk cId="3811780769" sldId="289"/>
+        </pc:sldMkLst>
+        <pc:spChg chg="mod">
+          <ac:chgData name="Judson Santiago" userId="ebb108da2f256286" providerId="LiveId" clId="{892A6213-B575-4955-849D-E82EBCE1248D}" dt="2021-07-06T03:45:20.820" v="432" actId="6549"/>
+          <ac:spMkLst>
+            <pc:docMk/>
+            <pc:sldMk cId="3811780769" sldId="289"/>
+            <ac:spMk id="2" creationId="{00000000-0000-0000-0000-000000000000}"/>
+          </ac:spMkLst>
+        </pc:spChg>
+        <pc:grpChg chg="mod">
+          <ac:chgData name="Judson Santiago" userId="ebb108da2f256286" providerId="LiveId" clId="{892A6213-B575-4955-849D-E82EBCE1248D}" dt="2021-07-06T03:45:30.100" v="438" actId="1037"/>
+          <ac:grpSpMkLst>
+            <pc:docMk/>
+            <pc:sldMk cId="3811780769" sldId="289"/>
+            <ac:grpSpMk id="4" creationId="{00000000-0000-0000-0000-000000000000}"/>
+          </ac:grpSpMkLst>
+        </pc:grpChg>
+      </pc:sldChg>
+      <pc:sldChg chg="modSp mod">
+        <pc:chgData name="Judson Santiago" userId="ebb108da2f256286" providerId="LiveId" clId="{892A6213-B575-4955-849D-E82EBCE1248D}" dt="2021-07-06T03:46:59.558" v="453" actId="1035"/>
+        <pc:sldMkLst>
+          <pc:docMk/>
+          <pc:sldMk cId="2466993791" sldId="290"/>
+        </pc:sldMkLst>
+        <pc:spChg chg="mod">
+          <ac:chgData name="Judson Santiago" userId="ebb108da2f256286" providerId="LiveId" clId="{892A6213-B575-4955-849D-E82EBCE1248D}" dt="2021-07-06T03:46:23.699" v="440" actId="20577"/>
+          <ac:spMkLst>
+            <pc:docMk/>
+            <pc:sldMk cId="2466993791" sldId="290"/>
+            <ac:spMk id="2" creationId="{00000000-0000-0000-0000-000000000000}"/>
+          </ac:spMkLst>
+        </pc:spChg>
+        <pc:grpChg chg="mod">
+          <ac:chgData name="Judson Santiago" userId="ebb108da2f256286" providerId="LiveId" clId="{892A6213-B575-4955-849D-E82EBCE1248D}" dt="2021-07-06T03:46:59.558" v="453" actId="1035"/>
+          <ac:grpSpMkLst>
+            <pc:docMk/>
+            <pc:sldMk cId="2466993791" sldId="290"/>
+            <ac:grpSpMk id="4" creationId="{00000000-0000-0000-0000-000000000000}"/>
+          </ac:grpSpMkLst>
+        </pc:grpChg>
+      </pc:sldChg>
+      <pc:sldChg chg="modSp mod">
+        <pc:chgData name="Judson Santiago" userId="ebb108da2f256286" providerId="LiveId" clId="{892A6213-B575-4955-849D-E82EBCE1248D}" dt="2021-07-06T03:49:58.251" v="469" actId="20577"/>
+        <pc:sldMkLst>
+          <pc:docMk/>
+          <pc:sldMk cId="3984088179" sldId="292"/>
+        </pc:sldMkLst>
+        <pc:spChg chg="mod">
+          <ac:chgData name="Judson Santiago" userId="ebb108da2f256286" providerId="LiveId" clId="{892A6213-B575-4955-849D-E82EBCE1248D}" dt="2021-07-06T03:49:58.251" v="469" actId="20577"/>
+          <ac:spMkLst>
+            <pc:docMk/>
+            <pc:sldMk cId="3984088179" sldId="292"/>
+            <ac:spMk id="2" creationId="{00000000-0000-0000-0000-000000000000}"/>
+          </ac:spMkLst>
+        </pc:spChg>
+      </pc:sldChg>
+      <pc:sldChg chg="modSp mod">
+        <pc:chgData name="Judson Santiago" userId="ebb108da2f256286" providerId="LiveId" clId="{892A6213-B575-4955-849D-E82EBCE1248D}" dt="2021-07-06T03:51:49.130" v="473" actId="6549"/>
+        <pc:sldMkLst>
+          <pc:docMk/>
+          <pc:sldMk cId="3064736429" sldId="295"/>
+        </pc:sldMkLst>
+        <pc:spChg chg="mod">
+          <ac:chgData name="Judson Santiago" userId="ebb108da2f256286" providerId="LiveId" clId="{892A6213-B575-4955-849D-E82EBCE1248D}" dt="2021-07-06T03:51:49.130" v="473" actId="6549"/>
+          <ac:spMkLst>
+            <pc:docMk/>
+            <pc:sldMk cId="3064736429" sldId="295"/>
+            <ac:spMk id="2" creationId="{00000000-0000-0000-0000-000000000000}"/>
+          </ac:spMkLst>
+        </pc:spChg>
+      </pc:sldChg>
+      <pc:sldMasterChg chg="addSp delSp modSp mod modSldLayout">
+        <pc:chgData name="Judson Santiago" userId="ebb108da2f256286" providerId="LiveId" clId="{892A6213-B575-4955-849D-E82EBCE1248D}" dt="2021-07-06T04:09:32.239" v="533" actId="21"/>
+        <pc:sldMasterMkLst>
+          <pc:docMk/>
+          <pc:sldMasterMk cId="0" sldId="2147483780"/>
+        </pc:sldMasterMkLst>
+        <pc:spChg chg="add mod">
+          <ac:chgData name="Judson Santiago" userId="ebb108da2f256286" providerId="LiveId" clId="{892A6213-B575-4955-849D-E82EBCE1248D}" dt="2021-07-06T04:09:30.209" v="532" actId="164"/>
+          <ac:spMkLst>
+            <pc:docMk/>
+            <pc:sldMasterMk cId="0" sldId="2147483780"/>
+            <ac:spMk id="6" creationId="{02F6BCEE-491F-4C3F-9216-92120908C134}"/>
+          </ac:spMkLst>
+        </pc:spChg>
+        <pc:spChg chg="mod">
+          <ac:chgData name="Judson Santiago" userId="ebb108da2f256286" providerId="LiveId" clId="{892A6213-B575-4955-849D-E82EBCE1248D}" dt="2021-07-06T03:29:36.746" v="333" actId="164"/>
+          <ac:spMkLst>
+            <pc:docMk/>
+            <pc:sldMasterMk cId="0" sldId="2147483780"/>
+            <ac:spMk id="12" creationId="{00000000-0000-0000-0000-000000000000}"/>
+          </ac:spMkLst>
+        </pc:spChg>
+        <pc:spChg chg="mod topLvl">
+          <ac:chgData name="Judson Santiago" userId="ebb108da2f256286" providerId="LiveId" clId="{892A6213-B575-4955-849D-E82EBCE1248D}" dt="2021-07-06T03:29:36.746" v="333" actId="164"/>
+          <ac:spMkLst>
+            <pc:docMk/>
+            <pc:sldMasterMk cId="0" sldId="2147483780"/>
+            <ac:spMk id="13" creationId="{00000000-0000-0000-0000-000000000000}"/>
+          </ac:spMkLst>
+        </pc:spChg>
+        <pc:spChg chg="mod topLvl">
+          <ac:chgData name="Judson Santiago" userId="ebb108da2f256286" providerId="LiveId" clId="{892A6213-B575-4955-849D-E82EBCE1248D}" dt="2021-07-06T03:30:04.838" v="334" actId="14100"/>
+          <ac:spMkLst>
+            <pc:docMk/>
+            <pc:sldMasterMk cId="0" sldId="2147483780"/>
+            <ac:spMk id="14" creationId="{00000000-0000-0000-0000-000000000000}"/>
+          </ac:spMkLst>
+        </pc:spChg>
+        <pc:spChg chg="mod">
+          <ac:chgData name="Judson Santiago" userId="ebb108da2f256286" providerId="LiveId" clId="{892A6213-B575-4955-849D-E82EBCE1248D}" dt="2021-07-06T03:13:28.632" v="239"/>
+          <ac:spMkLst>
+            <pc:docMk/>
+            <pc:sldMasterMk cId="0" sldId="2147483780"/>
+            <ac:spMk id="17" creationId="{6F2757E3-BF32-4EB2-B5F1-3D8E5FD7B346}"/>
+          </ac:spMkLst>
+        </pc:spChg>
+        <pc:spChg chg="mod">
+          <ac:chgData name="Judson Santiago" userId="ebb108da2f256286" providerId="LiveId" clId="{892A6213-B575-4955-849D-E82EBCE1248D}" dt="2021-07-06T03:13:28.632" v="239"/>
+          <ac:spMkLst>
+            <pc:docMk/>
+            <pc:sldMasterMk cId="0" sldId="2147483780"/>
+            <ac:spMk id="19" creationId="{07CA9D97-AB8A-4565-8C92-1DCD45964340}"/>
+          </ac:spMkLst>
+        </pc:spChg>
+        <pc:spChg chg="del mod topLvl">
+          <ac:chgData name="Judson Santiago" userId="ebb108da2f256286" providerId="LiveId" clId="{892A6213-B575-4955-849D-E82EBCE1248D}" dt="2021-07-06T03:21:00.443" v="288" actId="478"/>
+          <ac:spMkLst>
+            <pc:docMk/>
+            <pc:sldMasterMk cId="0" sldId="2147483780"/>
+            <ac:spMk id="21" creationId="{BDDB5816-2BDF-4090-87C6-0FFF96DFB309}"/>
+          </ac:spMkLst>
+        </pc:spChg>
+        <pc:spChg chg="mod topLvl">
+          <ac:chgData name="Judson Santiago" userId="ebb108da2f256286" providerId="LiveId" clId="{892A6213-B575-4955-849D-E82EBCE1248D}" dt="2021-07-06T03:58:45.844" v="517" actId="14100"/>
+          <ac:spMkLst>
+            <pc:docMk/>
+            <pc:sldMasterMk cId="0" sldId="2147483780"/>
+            <ac:spMk id="23" creationId="{37AF139E-BE6B-4FF6-B972-B67C98DCCCF4}"/>
+          </ac:spMkLst>
+        </pc:spChg>
+        <pc:grpChg chg="add del mod">
+          <ac:chgData name="Judson Santiago" userId="ebb108da2f256286" providerId="LiveId" clId="{892A6213-B575-4955-849D-E82EBCE1248D}" dt="2021-07-06T04:09:32.239" v="533" actId="21"/>
+          <ac:grpSpMkLst>
+            <pc:docMk/>
+            <pc:sldMasterMk cId="0" sldId="2147483780"/>
+            <ac:grpSpMk id="2" creationId="{F29D67A0-963D-4240-9E9E-E8C55D3D3963}"/>
+          </ac:grpSpMkLst>
+        </pc:grpChg>
+        <pc:grpChg chg="add del mod">
+          <ac:chgData name="Judson Santiago" userId="ebb108da2f256286" providerId="LiveId" clId="{892A6213-B575-4955-849D-E82EBCE1248D}" dt="2021-07-06T03:28:54.057" v="328" actId="165"/>
+          <ac:grpSpMkLst>
+            <pc:docMk/>
+            <pc:sldMasterMk cId="0" sldId="2147483780"/>
+            <ac:grpSpMk id="7" creationId="{B9BA260D-7A40-4E5A-9BA1-0670A3891DA6}"/>
+          </ac:grpSpMkLst>
+        </pc:grpChg>
+        <pc:grpChg chg="add mod">
+          <ac:chgData name="Judson Santiago" userId="ebb108da2f256286" providerId="LiveId" clId="{892A6213-B575-4955-849D-E82EBCE1248D}" dt="2021-07-06T03:29:36.746" v="333" actId="164"/>
+          <ac:grpSpMkLst>
+            <pc:docMk/>
+            <pc:sldMasterMk cId="0" sldId="2147483780"/>
+            <ac:grpSpMk id="8" creationId="{4562553E-F5D4-432E-B5BE-4474E320B598}"/>
+          </ac:grpSpMkLst>
+        </pc:grpChg>
+        <pc:grpChg chg="add del mod ord">
+          <ac:chgData name="Judson Santiago" userId="ebb108da2f256286" providerId="LiveId" clId="{892A6213-B575-4955-849D-E82EBCE1248D}" dt="2021-07-06T03:16:55.228" v="250" actId="478"/>
+          <ac:grpSpMkLst>
+            <pc:docMk/>
+            <pc:sldMasterMk cId="0" sldId="2147483780"/>
+            <ac:grpSpMk id="16" creationId="{D037FE0C-4E4E-4740-BF63-33871BF8B95D}"/>
+          </ac:grpSpMkLst>
+        </pc:grpChg>
+        <pc:grpChg chg="add del mod ord">
+          <ac:chgData name="Judson Santiago" userId="ebb108da2f256286" providerId="LiveId" clId="{892A6213-B575-4955-849D-E82EBCE1248D}" dt="2021-07-06T03:17:55.220" v="256" actId="165"/>
+          <ac:grpSpMkLst>
+            <pc:docMk/>
+            <pc:sldMasterMk cId="0" sldId="2147483780"/>
+            <ac:grpSpMk id="20" creationId="{38FFD897-1AD3-4B67-8B12-88339EFB6B2D}"/>
+          </ac:grpSpMkLst>
+        </pc:grpChg>
+        <pc:picChg chg="add del">
+          <ac:chgData name="Judson Santiago" userId="ebb108da2f256286" providerId="LiveId" clId="{892A6213-B575-4955-849D-E82EBCE1248D}" dt="2021-07-06T02:17:45.592" v="1" actId="478"/>
+          <ac:picMkLst>
+            <pc:docMk/>
+            <pc:sldMasterMk cId="0" sldId="2147483780"/>
+            <ac:picMk id="3" creationId="{F2FEA819-DCAB-401E-8F14-D9B5F9BFA0EA}"/>
+          </ac:picMkLst>
+        </pc:picChg>
+        <pc:picChg chg="add mod modCrop">
+          <ac:chgData name="Judson Santiago" userId="ebb108da2f256286" providerId="LiveId" clId="{892A6213-B575-4955-849D-E82EBCE1248D}" dt="2021-07-06T04:09:30.209" v="532" actId="164"/>
+          <ac:picMkLst>
+            <pc:docMk/>
+            <pc:sldMasterMk cId="0" sldId="2147483780"/>
+            <ac:picMk id="5" creationId="{AF0F742B-B989-4019-94BA-F08886F37D06}"/>
+          </ac:picMkLst>
+        </pc:picChg>
+        <pc:sldLayoutChg chg="modSp mod">
+          <pc:chgData name="Judson Santiago" userId="ebb108da2f256286" providerId="LiveId" clId="{892A6213-B575-4955-849D-E82EBCE1248D}" dt="2021-07-06T02:27:02.926" v="15" actId="113"/>
+          <pc:sldLayoutMkLst>
+            <pc:docMk/>
+            <pc:sldMasterMk cId="0" sldId="2147483780"/>
+            <pc:sldLayoutMk cId="0" sldId="2147483781"/>
+          </pc:sldLayoutMkLst>
+          <pc:spChg chg="mod">
+            <ac:chgData name="Judson Santiago" userId="ebb108da2f256286" providerId="LiveId" clId="{892A6213-B575-4955-849D-E82EBCE1248D}" dt="2021-07-06T02:27:02.926" v="15" actId="113"/>
+            <ac:spMkLst>
+              <pc:docMk/>
+              <pc:sldMasterMk cId="0" sldId="2147483780"/>
+              <pc:sldLayoutMk cId="0" sldId="2147483781"/>
+              <ac:spMk id="20" creationId="{00000000-0000-0000-0000-000000000000}"/>
+            </ac:spMkLst>
+          </pc:spChg>
+        </pc:sldLayoutChg>
+      </pc:sldMasterChg>
+    </pc:docChg>
+  </pc:docChgLst>
   <pc:docChgLst>
     <pc:chgData name="Judson Santiago" userId="ebb108da2f256286" providerId="LiveId" clId="{44735F1B-1BE7-4BE4-8BEF-EDD725D21DD4}"/>
     <pc:docChg chg="undo custSel modSld modMainMaster">
@@ -1050,7 +2048,7 @@
             <a:fld id="{4C457FC9-8E1D-4A40-BFF1-0E630693B1AB}" type="datetimeFigureOut">
               <a:rPr lang="pt-BR" smtClean="0"/>
               <a:pPr/>
-              <a:t>25/04/2019</a:t>
+              <a:t>06/07/2021</a:t>
             </a:fld>
             <a:endParaRPr lang="pt-BR"/>
           </a:p>
@@ -3547,15 +4545,7 @@
             </a:r>
             <a:r>
               <a:rPr lang="pt-BR" baseline="0" dirty="0"/>
-              <a:t>jogo de console ou computador. Ela envolve simulação, agentes e </a:t>
-            </a:r>
-            <a:r>
-              <a:rPr lang="pt-BR" baseline="0" dirty="0" err="1"/>
-              <a:t>tempo-real</a:t>
-            </a:r>
-            <a:r>
-              <a:rPr lang="pt-BR" baseline="0" dirty="0"/>
-              <a:t>. U</a:t>
+              <a:t>jogo de console ou computador. Ela envolve simulação, agentes e tempo real. U</a:t>
             </a:r>
             <a:r>
               <a:rPr lang="pt-BR" dirty="0"/>
@@ -4703,7 +5693,7 @@
           <a:p>
             <a:pPr algn="r"/>
             <a:r>
-              <a:rPr lang="pt-BR" sz="1800" dirty="0">
+              <a:rPr lang="pt-BR" sz="1800" b="1" dirty="0">
                 <a:solidFill>
                   <a:schemeClr val="tx1"/>
                 </a:solidFill>
@@ -4711,14 +5701,14 @@
               <a:t>Judson</a:t>
             </a:r>
             <a:r>
-              <a:rPr lang="pt-BR" sz="1800" baseline="0" dirty="0">
+              <a:rPr lang="pt-BR" sz="1800" b="1" baseline="0" dirty="0">
                 <a:solidFill>
                   <a:schemeClr val="tx1"/>
                 </a:solidFill>
               </a:rPr>
               <a:t> Santos Santiago</a:t>
             </a:r>
-            <a:endParaRPr lang="pt-BR" sz="1800" dirty="0">
+            <a:endParaRPr lang="pt-BR" sz="1800" b="1" dirty="0">
               <a:solidFill>
                 <a:schemeClr val="tx1"/>
               </a:solidFill>
@@ -4935,7 +5925,7 @@
             <a:fld id="{B41ABA4E-CD72-497B-97AA-7213B3980F60}" type="datetimeFigureOut">
               <a:rPr lang="en-US" smtClean="0"/>
               <a:pPr/>
-              <a:t>4/25/2019</a:t>
+              <a:t>7/6/2021</a:t>
             </a:fld>
             <a:endParaRPr lang="en-US" dirty="0"/>
           </a:p>
@@ -5112,7 +6102,7 @@
             <a:fld id="{B41ABA4E-CD72-497B-97AA-7213B3980F60}" type="datetimeFigureOut">
               <a:rPr lang="en-US" smtClean="0"/>
               <a:pPr/>
-              <a:t>4/25/2019</a:t>
+              <a:t>7/6/2021</a:t>
             </a:fld>
             <a:endParaRPr lang="en-US" dirty="0"/>
           </a:p>
@@ -5308,7 +6298,7 @@
             <a:fld id="{B41ABA4E-CD72-497B-97AA-7213B3980F60}" type="datetimeFigureOut">
               <a:rPr lang="en-US" smtClean="0"/>
               <a:pPr/>
-              <a:t>4/25/2019</a:t>
+              <a:t>7/6/2021</a:t>
             </a:fld>
             <a:endParaRPr lang="en-US" dirty="0"/>
           </a:p>
@@ -5569,7 +6559,7 @@
             <a:fld id="{B41ABA4E-CD72-497B-97AA-7213B3980F60}" type="datetimeFigureOut">
               <a:rPr lang="en-US" smtClean="0"/>
               <a:pPr/>
-              <a:t>4/25/2019</a:t>
+              <a:t>7/6/2021</a:t>
             </a:fld>
             <a:endParaRPr lang="en-US" dirty="0"/>
           </a:p>
@@ -5970,7 +6960,7 @@
             <a:fld id="{B41ABA4E-CD72-497B-97AA-7213B3980F60}" type="datetimeFigureOut">
               <a:rPr lang="en-US" smtClean="0"/>
               <a:pPr/>
-              <a:t>4/25/2019</a:t>
+              <a:t>7/6/2021</a:t>
             </a:fld>
             <a:endParaRPr lang="en-US" dirty="0"/>
           </a:p>
@@ -6410,7 +7400,7 @@
             <a:fld id="{B41ABA4E-CD72-497B-97AA-7213B3980F60}" type="datetimeFigureOut">
               <a:rPr lang="en-US" smtClean="0"/>
               <a:pPr/>
-              <a:t>4/25/2019</a:t>
+              <a:t>7/6/2021</a:t>
             </a:fld>
             <a:endParaRPr lang="en-US" dirty="0"/>
           </a:p>
@@ -6507,7 +7497,7 @@
             <a:fld id="{B41ABA4E-CD72-497B-97AA-7213B3980F60}" type="datetimeFigureOut">
               <a:rPr lang="en-US" smtClean="0"/>
               <a:pPr/>
-              <a:t>4/25/2019</a:t>
+              <a:t>7/6/2021</a:t>
             </a:fld>
             <a:endParaRPr lang="en-US" dirty="0"/>
           </a:p>
@@ -6622,7 +7612,7 @@
             <a:fld id="{B41ABA4E-CD72-497B-97AA-7213B3980F60}" type="datetimeFigureOut">
               <a:rPr lang="en-US" smtClean="0"/>
               <a:pPr/>
-              <a:t>4/25/2019</a:t>
+              <a:t>7/6/2021</a:t>
             </a:fld>
             <a:endParaRPr lang="en-US" dirty="0"/>
           </a:p>
@@ -6892,7 +7882,7 @@
             <a:fld id="{B41ABA4E-CD72-497B-97AA-7213B3980F60}" type="datetimeFigureOut">
               <a:rPr lang="en-US" smtClean="0"/>
               <a:pPr/>
-              <a:t>4/25/2019</a:t>
+              <a:t>7/6/2021</a:t>
             </a:fld>
             <a:endParaRPr lang="en-US" dirty="0"/>
           </a:p>
@@ -7095,7 +8085,7 @@
             <a:fld id="{B41ABA4E-CD72-497B-97AA-7213B3980F60}" type="datetimeFigureOut">
               <a:rPr lang="en-US" smtClean="0"/>
               <a:pPr/>
-              <a:t>4/25/2019</a:t>
+              <a:t>7/6/2021</a:t>
             </a:fld>
             <a:endParaRPr lang="en-US" dirty="0"/>
           </a:p>
@@ -7730,178 +8720,22 @@
       </p:grpSpPr>
       <p:sp>
         <p:nvSpPr>
-          <p:cNvPr id="13" name="Forma livre 12"/>
+          <p:cNvPr id="23" name="Triângulo retângulo 13">
+            <a:extLst>
+              <a:ext uri="{FF2B5EF4-FFF2-40B4-BE49-F238E27FC236}">
+                <a16:creationId xmlns:a16="http://schemas.microsoft.com/office/drawing/2014/main" id="{37AF139E-BE6B-4FF6-B972-B67C98DCCCF4}"/>
+              </a:ext>
+            </a:extLst>
+          </p:cNvPr>
           <p:cNvSpPr>
             <a:spLocks/>
           </p:cNvSpPr>
           <p:nvPr/>
         </p:nvSpPr>
         <p:spPr bwMode="auto">
-          <a:xfrm>
-            <a:off x="665697" y="5944936"/>
-            <a:ext cx="6587499" cy="921076"/>
-          </a:xfrm>
-          <a:custGeom>
-            <a:avLst>
-              <a:gd name="A1" fmla="val 0"/>
-              <a:gd name="A2" fmla="val 0"/>
-              <a:gd name="A3" fmla="val 0"/>
-              <a:gd name="A4" fmla="val 0"/>
-              <a:gd name="A5" fmla="val 0"/>
-              <a:gd name="A6" fmla="val 0"/>
-              <a:gd name="A7" fmla="val 0"/>
-              <a:gd name="A8" fmla="val 0"/>
-            </a:avLst>
-            <a:gdLst/>
-            <a:ahLst/>
-            <a:cxnLst>
-              <a:cxn ang="0">
-                <a:pos x="0" y="0"/>
-              </a:cxn>
-              <a:cxn ang="0">
-                <a:pos x="5760" y="0"/>
-              </a:cxn>
-              <a:cxn ang="0">
-                <a:pos x="5760" y="528"/>
-              </a:cxn>
-              <a:cxn ang="0">
-                <a:pos x="48" y="0"/>
-              </a:cxn>
-            </a:cxnLst>
-            <a:rect l="0" t="0" r="0" b="0"/>
-            <a:pathLst>
-              <a:path w="7485" h="337">
-                <a:moveTo>
-                  <a:pt x="0" y="2"/>
-                </a:moveTo>
-                <a:lnTo>
-                  <a:pt x="7485" y="337"/>
-                </a:lnTo>
-                <a:lnTo>
-                  <a:pt x="5558" y="337"/>
-                </a:lnTo>
-                <a:lnTo>
-                  <a:pt x="1" y="0"/>
-                </a:lnTo>
-              </a:path>
-            </a:pathLst>
-          </a:custGeom>
-          <a:solidFill>
-            <a:schemeClr val="accent1">
-              <a:tint val="65000"/>
-              <a:satMod val="115000"/>
-              <a:alpha val="40000"/>
-            </a:schemeClr>
-          </a:solidFill>
-          <a:ln w="9525" cap="flat" cmpd="sng" algn="ctr">
-            <a:noFill/>
-            <a:prstDash val="solid"/>
-            <a:round/>
-            <a:headEnd type="none" w="med" len="med"/>
-            <a:tailEnd type="none" w="med" len="med"/>
-          </a:ln>
-          <a:effectLst/>
-        </p:spPr>
-        <p:txBody>
-          <a:bodyPr vert="horz" wrap="square" lIns="91440" tIns="45720" rIns="91440" bIns="45720" anchor="t" compatLnSpc="1"/>
-          <a:lstStyle/>
-          <a:p>
-            <a:endParaRPr kumimoji="0" lang="en-US" sz="1800"/>
-          </a:p>
-        </p:txBody>
-      </p:sp>
-      <p:sp>
-        <p:nvSpPr>
-          <p:cNvPr id="12" name="Forma livre 11"/>
-          <p:cNvSpPr>
-            <a:spLocks/>
-          </p:cNvSpPr>
-          <p:nvPr/>
-        </p:nvSpPr>
-        <p:spPr bwMode="auto">
-          <a:xfrm>
-            <a:off x="647623" y="5974521"/>
-            <a:ext cx="4920601" cy="896795"/>
-          </a:xfrm>
-          <a:custGeom>
-            <a:avLst>
-              <a:gd name="A1" fmla="val 0"/>
-              <a:gd name="A2" fmla="val 0"/>
-              <a:gd name="A3" fmla="val 0"/>
-              <a:gd name="A4" fmla="val 0"/>
-              <a:gd name="A5" fmla="val 0"/>
-              <a:gd name="A6" fmla="val 0"/>
-              <a:gd name="A7" fmla="val 0"/>
-              <a:gd name="A8" fmla="val 0"/>
-            </a:avLst>
-            <a:gdLst/>
-            <a:ahLst/>
-            <a:cxnLst>
-              <a:cxn ang="0">
-                <a:pos x="0" y="0"/>
-              </a:cxn>
-              <a:cxn ang="0">
-                <a:pos x="5760" y="0"/>
-              </a:cxn>
-              <a:cxn ang="0">
-                <a:pos x="5760" y="528"/>
-              </a:cxn>
-              <a:cxn ang="0">
-                <a:pos x="48" y="0"/>
-              </a:cxn>
-            </a:cxnLst>
-            <a:rect l="0" t="0" r="0" b="0"/>
-            <a:pathLst>
-              <a:path w="5591" h="588">
-                <a:moveTo>
-                  <a:pt x="0" y="0"/>
-                </a:moveTo>
-                <a:lnTo>
-                  <a:pt x="5591" y="585"/>
-                </a:lnTo>
-                <a:lnTo>
-                  <a:pt x="4415" y="588"/>
-                </a:lnTo>
-                <a:lnTo>
-                  <a:pt x="12" y="4"/>
-                </a:lnTo>
-              </a:path>
-            </a:pathLst>
-          </a:custGeom>
-          <a:solidFill>
-            <a:srgbClr val="000000">
-              <a:alpha val="100000"/>
-            </a:srgbClr>
-          </a:solidFill>
-          <a:ln w="9525" cap="flat" cmpd="sng" algn="ctr">
-            <a:noFill/>
-            <a:prstDash val="solid"/>
-            <a:round/>
-            <a:headEnd type="none" w="med" len="med"/>
-            <a:tailEnd type="none" w="med" len="med"/>
-          </a:ln>
-          <a:effectLst/>
-        </p:spPr>
-        <p:txBody>
-          <a:bodyPr vert="horz" wrap="square" lIns="91440" tIns="45720" rIns="91440" bIns="45720" anchor="t" compatLnSpc="1"/>
-          <a:lstStyle/>
-          <a:p>
-            <a:endParaRPr kumimoji="0" lang="en-US" sz="1800"/>
-          </a:p>
-        </p:txBody>
-      </p:sp>
-      <p:sp>
-        <p:nvSpPr>
-          <p:cNvPr id="14" name="Triângulo retângulo 13"/>
-          <p:cNvSpPr>
-            <a:spLocks/>
-          </p:cNvSpPr>
-          <p:nvPr/>
-        </p:nvSpPr>
-        <p:spPr bwMode="auto">
-          <a:xfrm>
-            <a:off x="-8056" y="5791253"/>
-            <a:ext cx="4536419" cy="1080868"/>
+          <a:xfrm rot="10800000">
+            <a:off x="6600056" y="-2"/>
+            <a:ext cx="5600000" cy="836713"/>
           </a:xfrm>
           <a:prstGeom prst="rtTriangle">
             <a:avLst/>
@@ -7999,13 +8833,305 @@
           </a:p>
         </p:txBody>
       </p:sp>
+      <p:grpSp>
+        <p:nvGrpSpPr>
+          <p:cNvPr id="8" name="Agrupar 7">
+            <a:extLst>
+              <a:ext uri="{FF2B5EF4-FFF2-40B4-BE49-F238E27FC236}">
+                <a16:creationId xmlns:a16="http://schemas.microsoft.com/office/drawing/2014/main" id="{4562553E-F5D4-432E-B5BE-4474E320B598}"/>
+              </a:ext>
+            </a:extLst>
+          </p:cNvPr>
+          <p:cNvGrpSpPr/>
+          <p:nvPr userDrawn="1"/>
+        </p:nvGrpSpPr>
+        <p:grpSpPr>
+          <a:xfrm>
+            <a:off x="-8056" y="5974521"/>
+            <a:ext cx="5744016" cy="883479"/>
+            <a:chOff x="-8056" y="5974521"/>
+            <a:chExt cx="5744016" cy="883479"/>
+          </a:xfrm>
+        </p:grpSpPr>
+        <p:sp>
+          <p:nvSpPr>
+            <p:cNvPr id="12" name="Forma livre 11"/>
+            <p:cNvSpPr>
+              <a:spLocks/>
+            </p:cNvSpPr>
+            <p:nvPr userDrawn="1"/>
+          </p:nvSpPr>
+          <p:spPr bwMode="auto">
+            <a:xfrm>
+              <a:off x="647623" y="5974521"/>
+              <a:ext cx="4920601" cy="883479"/>
+            </a:xfrm>
+            <a:custGeom>
+              <a:avLst>
+                <a:gd name="A1" fmla="val 0"/>
+                <a:gd name="A2" fmla="val 0"/>
+                <a:gd name="A3" fmla="val 0"/>
+                <a:gd name="A4" fmla="val 0"/>
+                <a:gd name="A5" fmla="val 0"/>
+                <a:gd name="A6" fmla="val 0"/>
+                <a:gd name="A7" fmla="val 0"/>
+                <a:gd name="A8" fmla="val 0"/>
+              </a:avLst>
+              <a:gdLst/>
+              <a:ahLst/>
+              <a:cxnLst>
+                <a:cxn ang="0">
+                  <a:pos x="0" y="0"/>
+                </a:cxn>
+                <a:cxn ang="0">
+                  <a:pos x="5760" y="0"/>
+                </a:cxn>
+                <a:cxn ang="0">
+                  <a:pos x="5760" y="528"/>
+                </a:cxn>
+                <a:cxn ang="0">
+                  <a:pos x="48" y="0"/>
+                </a:cxn>
+              </a:cxnLst>
+              <a:rect l="0" t="0" r="0" b="0"/>
+              <a:pathLst>
+                <a:path w="5591" h="588">
+                  <a:moveTo>
+                    <a:pt x="0" y="0"/>
+                  </a:moveTo>
+                  <a:lnTo>
+                    <a:pt x="5591" y="585"/>
+                  </a:lnTo>
+                  <a:lnTo>
+                    <a:pt x="4415" y="588"/>
+                  </a:lnTo>
+                  <a:lnTo>
+                    <a:pt x="12" y="4"/>
+                  </a:lnTo>
+                </a:path>
+              </a:pathLst>
+            </a:custGeom>
+            <a:solidFill>
+              <a:srgbClr val="000000">
+                <a:alpha val="100000"/>
+              </a:srgbClr>
+            </a:solidFill>
+            <a:ln w="9525" cap="flat" cmpd="sng" algn="ctr">
+              <a:noFill/>
+              <a:prstDash val="solid"/>
+              <a:round/>
+              <a:headEnd type="none" w="med" len="med"/>
+              <a:tailEnd type="none" w="med" len="med"/>
+            </a:ln>
+            <a:effectLst/>
+          </p:spPr>
+          <p:txBody>
+            <a:bodyPr vert="horz" wrap="square" lIns="91440" tIns="45720" rIns="91440" bIns="45720" anchor="t" compatLnSpc="1"/>
+            <a:lstStyle/>
+            <a:p>
+              <a:endParaRPr kumimoji="0" lang="en-US" sz="1800"/>
+            </a:p>
+          </p:txBody>
+        </p:sp>
+        <p:sp>
+          <p:nvSpPr>
+            <p:cNvPr id="13" name="Forma livre 12"/>
+            <p:cNvSpPr>
+              <a:spLocks/>
+            </p:cNvSpPr>
+            <p:nvPr/>
+          </p:nvSpPr>
+          <p:spPr bwMode="auto">
+            <a:xfrm>
+              <a:off x="524917" y="6327571"/>
+              <a:ext cx="5211043" cy="530429"/>
+            </a:xfrm>
+            <a:custGeom>
+              <a:avLst>
+                <a:gd name="A1" fmla="val 0"/>
+                <a:gd name="A2" fmla="val 0"/>
+                <a:gd name="A3" fmla="val 0"/>
+                <a:gd name="A4" fmla="val 0"/>
+                <a:gd name="A5" fmla="val 0"/>
+                <a:gd name="A6" fmla="val 0"/>
+                <a:gd name="A7" fmla="val 0"/>
+                <a:gd name="A8" fmla="val 0"/>
+              </a:avLst>
+              <a:gdLst/>
+              <a:ahLst/>
+              <a:cxnLst>
+                <a:cxn ang="0">
+                  <a:pos x="0" y="0"/>
+                </a:cxn>
+                <a:cxn ang="0">
+                  <a:pos x="5760" y="0"/>
+                </a:cxn>
+                <a:cxn ang="0">
+                  <a:pos x="5760" y="528"/>
+                </a:cxn>
+                <a:cxn ang="0">
+                  <a:pos x="48" y="0"/>
+                </a:cxn>
+              </a:cxnLst>
+              <a:rect l="0" t="0" r="0" b="0"/>
+              <a:pathLst>
+                <a:path w="7485" h="337">
+                  <a:moveTo>
+                    <a:pt x="0" y="2"/>
+                  </a:moveTo>
+                  <a:lnTo>
+                    <a:pt x="7485" y="337"/>
+                  </a:lnTo>
+                  <a:lnTo>
+                    <a:pt x="5558" y="337"/>
+                  </a:lnTo>
+                  <a:lnTo>
+                    <a:pt x="1" y="0"/>
+                  </a:lnTo>
+                </a:path>
+              </a:pathLst>
+            </a:custGeom>
+            <a:solidFill>
+              <a:schemeClr val="accent1">
+                <a:tint val="65000"/>
+                <a:satMod val="115000"/>
+                <a:alpha val="40000"/>
+              </a:schemeClr>
+            </a:solidFill>
+            <a:ln w="9525" cap="flat" cmpd="sng" algn="ctr">
+              <a:noFill/>
+              <a:prstDash val="solid"/>
+              <a:round/>
+              <a:headEnd type="none" w="med" len="med"/>
+              <a:tailEnd type="none" w="med" len="med"/>
+            </a:ln>
+            <a:effectLst/>
+          </p:spPr>
+          <p:txBody>
+            <a:bodyPr vert="horz" wrap="square" lIns="91440" tIns="45720" rIns="91440" bIns="45720" anchor="t" compatLnSpc="1"/>
+            <a:lstStyle/>
+            <a:p>
+              <a:endParaRPr kumimoji="0" lang="en-US" sz="1800"/>
+            </a:p>
+          </p:txBody>
+        </p:sp>
+        <p:sp>
+          <p:nvSpPr>
+            <p:cNvPr id="14" name="Triângulo retângulo 13"/>
+            <p:cNvSpPr>
+              <a:spLocks/>
+            </p:cNvSpPr>
+            <p:nvPr/>
+          </p:nvSpPr>
+          <p:spPr bwMode="auto">
+            <a:xfrm>
+              <a:off x="-8056" y="6237311"/>
+              <a:ext cx="3588536" cy="620689"/>
+            </a:xfrm>
+            <a:prstGeom prst="rtTriangle">
+              <a:avLst/>
+            </a:prstGeom>
+            <a:blipFill>
+              <a:blip r:embed="rId13">
+                <a:alphaModFix amt="50000"/>
+              </a:blip>
+              <a:tile tx="0" ty="0" sx="50000" sy="50000" flip="none" algn="t"/>
+            </a:blipFill>
+            <a:ln w="12700" cap="rnd" cmpd="thickThin" algn="ctr">
+              <a:noFill/>
+              <a:prstDash val="solid"/>
+            </a:ln>
+            <a:effectLst>
+              <a:fillOverlay blend="mult">
+                <a:gradFill flip="none" rotWithShape="1">
+                  <a:gsLst>
+                    <a:gs pos="0">
+                      <a:schemeClr val="accent1">
+                        <a:shade val="20000"/>
+                        <a:satMod val="176000"/>
+                        <a:alpha val="100000"/>
+                      </a:schemeClr>
+                    </a:gs>
+                    <a:gs pos="18000">
+                      <a:schemeClr val="accent1">
+                        <a:shade val="48000"/>
+                        <a:satMod val="153000"/>
+                        <a:alpha val="100000"/>
+                      </a:schemeClr>
+                    </a:gs>
+                    <a:gs pos="43000">
+                      <a:schemeClr val="accent1">
+                        <a:tint val="86000"/>
+                        <a:satMod val="149000"/>
+                        <a:alpha val="100000"/>
+                      </a:schemeClr>
+                    </a:gs>
+                    <a:gs pos="45000">
+                      <a:schemeClr val="accent1">
+                        <a:tint val="85000"/>
+                        <a:satMod val="150000"/>
+                        <a:alpha val="100000"/>
+                      </a:schemeClr>
+                    </a:gs>
+                    <a:gs pos="50000">
+                      <a:schemeClr val="accent1">
+                        <a:tint val="86000"/>
+                        <a:satMod val="149000"/>
+                        <a:alpha val="100000"/>
+                      </a:schemeClr>
+                    </a:gs>
+                    <a:gs pos="79000">
+                      <a:schemeClr val="accent1">
+                        <a:shade val="53000"/>
+                        <a:satMod val="150000"/>
+                        <a:alpha val="100000"/>
+                      </a:schemeClr>
+                    </a:gs>
+                    <a:gs pos="100000">
+                      <a:schemeClr val="accent1">
+                        <a:shade val="25000"/>
+                        <a:satMod val="170000"/>
+                        <a:alpha val="100000"/>
+                      </a:schemeClr>
+                    </a:gs>
+                  </a:gsLst>
+                  <a:lin ang="450000" scaled="1"/>
+                  <a:tileRect/>
+                </a:gradFill>
+              </a:fillOverlay>
+            </a:effectLst>
+          </p:spPr>
+          <p:style>
+            <a:lnRef idx="3">
+              <a:schemeClr val="lt1"/>
+            </a:lnRef>
+            <a:fillRef idx="1">
+              <a:schemeClr val="accent1"/>
+            </a:fillRef>
+            <a:effectRef idx="1">
+              <a:schemeClr val="accent1"/>
+            </a:effectRef>
+            <a:fontRef idx="minor">
+              <a:schemeClr val="lt1"/>
+            </a:fontRef>
+          </p:style>
+          <p:txBody>
+            <a:bodyPr vert="horz" wrap="square" lIns="91440" tIns="45720" rIns="91440" bIns="45720" anchor="ctr" compatLnSpc="1"/>
+            <a:lstStyle/>
+            <a:p>
+              <a:pPr algn="ctr" eaLnBrk="1" latinLnBrk="0" hangingPunct="1"/>
+              <a:endParaRPr kumimoji="0" lang="en-US" sz="1800"/>
+            </a:p>
+          </p:txBody>
+        </p:sp>
+      </p:grpSp>
       <p:sp>
         <p:nvSpPr>
           <p:cNvPr id="9" name="Espaço Reservado para Título 8"/>
           <p:cNvSpPr>
             <a:spLocks noGrp="1"/>
           </p:cNvSpPr>
-          <p:nvPr>
+          <p:nvPr userDrawn="1">
             <p:ph type="title"/>
           </p:nvPr>
         </p:nvSpPr>
@@ -8045,7 +9171,7 @@
           <p:cNvSpPr>
             <a:spLocks noGrp="1"/>
           </p:cNvSpPr>
-          <p:nvPr>
+          <p:nvPr userDrawn="1">
             <p:ph type="body" idx="1"/>
           </p:nvPr>
         </p:nvSpPr>
@@ -8107,7 +9233,7 @@
           <p:cNvSpPr>
             <a:spLocks noGrp="1"/>
           </p:cNvSpPr>
-          <p:nvPr>
+          <p:nvPr userDrawn="1">
             <p:ph type="dt" sz="half" idx="2"/>
           </p:nvPr>
         </p:nvSpPr>
@@ -8136,7 +9262,7 @@
             <a:fld id="{B41ABA4E-CD72-497B-97AA-7213B3980F60}" type="datetimeFigureOut">
               <a:rPr lang="en-US" smtClean="0"/>
               <a:pPr/>
-              <a:t>4/25/2019</a:t>
+              <a:t>7/6/2021</a:t>
             </a:fld>
             <a:endParaRPr lang="en-US" dirty="0"/>
           </a:p>
@@ -8148,7 +9274,7 @@
           <p:cNvSpPr>
             <a:spLocks noGrp="1"/>
           </p:cNvSpPr>
-          <p:nvPr>
+          <p:nvPr userDrawn="1">
             <p:ph type="ftr" sz="quarter" idx="3"/>
           </p:nvPr>
         </p:nvSpPr>
@@ -8184,7 +9310,7 @@
           <p:cNvSpPr>
             <a:spLocks noGrp="1"/>
           </p:cNvSpPr>
-          <p:nvPr>
+          <p:nvPr userDrawn="1">
             <p:ph type="sldNum" sz="quarter" idx="4"/>
           </p:nvPr>
         </p:nvSpPr>
@@ -8589,7 +9715,7 @@
                   </a:schemeClr>
                 </a:solidFill>
               </a:rPr>
-              <a:t>Desenvolvimento de Jogos</a:t>
+              <a:t>Programação de Jogos</a:t>
             </a:r>
           </a:p>
         </p:txBody>
@@ -8636,7 +9762,14 @@
           <a:p>
             <a:r>
               <a:rPr lang="pt-BR" dirty="0"/>
-              <a:t>Jogos tipo FPS, RPG e RTS em sua maioria exploram a sobrevivência física (caça, exploração e coleta)</a:t>
+              <a:t>Jogos tipo FPS, RPG e RTS em sua maioria exploram </a:t>
+            </a:r>
+            <a:br>
+              <a:rPr lang="pt-BR" dirty="0"/>
+            </a:br>
+            <a:r>
+              <a:rPr lang="pt-BR" dirty="0"/>
+              <a:t>a sobrevivência física (caça, exploração e coleta)</a:t>
             </a:r>
           </a:p>
         </p:txBody>
@@ -8672,9 +9805,9 @@
         <p:grpSpPr>
           <a:xfrm>
             <a:off x="1163054" y="2435771"/>
-            <a:ext cx="9446630" cy="4213372"/>
+            <a:ext cx="9207241" cy="4023351"/>
             <a:chOff x="1163054" y="2435771"/>
-            <a:chExt cx="9446630" cy="4213372"/>
+            <a:chExt cx="9207241" cy="4023351"/>
           </a:xfrm>
         </p:grpSpPr>
         <p:pic>
@@ -8953,7 +10086,7 @@
           <p:spPr>
             <a:xfrm>
               <a:off x="6600056" y="4389749"/>
-              <a:ext cx="4009628" cy="2259394"/>
+              <a:ext cx="3672408" cy="2069373"/>
             </a:xfrm>
             <a:prstGeom prst="rect">
               <a:avLst/>
@@ -8982,7 +10115,7 @@
           </p:nvSpPr>
           <p:spPr>
             <a:xfrm>
-              <a:off x="9845709" y="4077072"/>
+              <a:off x="9680683" y="4112750"/>
               <a:ext cx="689612" cy="276999"/>
             </a:xfrm>
             <a:prstGeom prst="rect">
@@ -9064,6 +10197,9 @@
           <a:bodyPr/>
           <a:lstStyle/>
           <a:p>
+            <a:endParaRPr lang="pt-BR" dirty="0"/>
+          </a:p>
+          <a:p>
             <a:r>
               <a:rPr lang="pt-BR" dirty="0"/>
               <a:t>Desse princípio básico de </a:t>
@@ -9078,6 +10214,15 @@
               </a:rPr>
               <a:t>sobrevivência física </a:t>
             </a:r>
+            <a:br>
+              <a:rPr lang="pt-BR" dirty="0">
+                <a:solidFill>
+                  <a:schemeClr val="accent1">
+                    <a:lumMod val="75000"/>
+                  </a:schemeClr>
+                </a:solidFill>
+              </a:rPr>
+            </a:br>
             <a:r>
               <a:rPr lang="pt-BR" dirty="0"/>
               <a:t>podemos tirar a seguinte dica para o projeto de jogos:</a:t>
@@ -9196,7 +10341,14 @@
           <a:p>
             <a:r>
               <a:rPr lang="pt-BR" dirty="0"/>
-              <a:t>O jogo mais popular de todos os tempos para PC, The </a:t>
+              <a:t>O jogo mais popular de todos os tempos para PC, </a:t>
+            </a:r>
+            <a:br>
+              <a:rPr lang="pt-BR" dirty="0"/>
+            </a:br>
+            <a:r>
+              <a:rPr lang="pt-BR" dirty="0"/>
+              <a:t>The </a:t>
             </a:r>
             <a:r>
               <a:rPr lang="pt-BR" dirty="0" err="1"/>
@@ -9204,7 +10356,14 @@
             </a:r>
             <a:r>
               <a:rPr lang="pt-BR" dirty="0"/>
-              <a:t>, não explora caça, mas explora atividades básicas de </a:t>
+              <a:t>, não explora caça, mas explora atividades </a:t>
+            </a:r>
+            <a:br>
+              <a:rPr lang="pt-BR" dirty="0"/>
+            </a:br>
+            <a:r>
+              <a:rPr lang="pt-BR" dirty="0"/>
+              <a:t>básicas de </a:t>
             </a:r>
             <a:r>
               <a:rPr lang="pt-BR" dirty="0">
@@ -9250,10 +10409,10 @@
         </p:nvGrpSpPr>
         <p:grpSpPr>
           <a:xfrm>
-            <a:off x="2279575" y="2760234"/>
-            <a:ext cx="7674109" cy="3084693"/>
-            <a:chOff x="2279575" y="2760234"/>
-            <a:chExt cx="7674109" cy="3084693"/>
+            <a:off x="2279575" y="3211373"/>
+            <a:ext cx="7674109" cy="3169955"/>
+            <a:chOff x="2279575" y="3054916"/>
+            <a:chExt cx="7674109" cy="3169955"/>
           </a:xfrm>
         </p:grpSpPr>
         <p:pic>
@@ -9284,19 +10443,11 @@
             <a:prstGeom prst="rect">
               <a:avLst/>
             </a:prstGeom>
-            <a:ln w="38100" cap="sq">
-              <a:solidFill>
-                <a:srgbClr val="000000"/>
-              </a:solidFill>
-              <a:prstDash val="solid"/>
-              <a:miter lim="800000"/>
+            <a:ln>
+              <a:noFill/>
             </a:ln>
             <a:effectLst>
-              <a:outerShdw blurRad="50800" dist="38100" dir="2700000" algn="tl" rotWithShape="0">
-                <a:srgbClr val="000000">
-                  <a:alpha val="43000"/>
-                </a:srgbClr>
-              </a:outerShdw>
+              <a:softEdge rad="112500"/>
             </a:effectLst>
           </p:spPr>
         </p:pic>
@@ -9308,7 +10459,7 @@
           </p:nvSpPr>
           <p:spPr>
             <a:xfrm>
-              <a:off x="8977710" y="2760234"/>
+              <a:off x="8976320" y="5917094"/>
               <a:ext cx="973343" cy="307777"/>
             </a:xfrm>
             <a:prstGeom prst="rect">
@@ -9383,19 +10534,11 @@
             <a:prstGeom prst="rect">
               <a:avLst/>
             </a:prstGeom>
-            <a:ln w="38100" cap="sq">
-              <a:solidFill>
-                <a:srgbClr val="000000"/>
-              </a:solidFill>
-              <a:prstDash val="solid"/>
-              <a:miter lim="800000"/>
+            <a:ln>
+              <a:noFill/>
             </a:ln>
             <a:effectLst>
-              <a:outerShdw blurRad="50800" dist="38100" dir="2700000" algn="tl" rotWithShape="0">
-                <a:srgbClr val="000000">
-                  <a:alpha val="43000"/>
-                </a:srgbClr>
-              </a:outerShdw>
+              <a:softEdge rad="112500"/>
             </a:effectLst>
           </p:spPr>
         </p:pic>
@@ -9442,9 +10585,19 @@
         </p:nvSpPr>
         <p:spPr/>
         <p:txBody>
-          <a:bodyPr/>
+          <a:bodyPr>
+            <a:normAutofit/>
+          </a:bodyPr>
           <a:lstStyle/>
           <a:p>
+            <a:endParaRPr lang="pt-BR" dirty="0"/>
+          </a:p>
+          <a:p>
+            <a:pPr>
+              <a:spcAft>
+                <a:spcPts val="2400"/>
+              </a:spcAft>
+            </a:pPr>
             <a:r>
               <a:rPr lang="pt-BR" dirty="0"/>
               <a:t>Desse princípio básico de </a:t>
@@ -9459,6 +10612,15 @@
               </a:rPr>
               <a:t>sobrevivência social </a:t>
             </a:r>
+            <a:br>
+              <a:rPr lang="pt-BR" dirty="0">
+                <a:solidFill>
+                  <a:schemeClr val="accent1">
+                    <a:lumMod val="75000"/>
+                  </a:schemeClr>
+                </a:solidFill>
+              </a:rPr>
+            </a:br>
             <a:r>
               <a:rPr lang="pt-BR" dirty="0"/>
               <a:t>podemos tirar a seguinte dica para o projeto de jogos:</a:t>
@@ -9466,12 +10628,6 @@
             <a:br>
               <a:rPr lang="pt-BR" dirty="0"/>
             </a:br>
-            <a:endParaRPr lang="pt-BR" dirty="0"/>
-          </a:p>
-          <a:p>
-            <a:pPr marL="109728" indent="0">
-              <a:buNone/>
-            </a:pPr>
             <a:endParaRPr lang="pt-BR" dirty="0"/>
           </a:p>
           <a:p>
@@ -9568,7 +10724,21 @@
           <a:p>
             <a:r>
               <a:rPr lang="pt-BR" dirty="0"/>
-              <a:t>Tetris é um exemplo de jogo que não possui um aspecto evidente de sobrevivência física nem social. Ele se baseia na </a:t>
+              <a:t>Tetris é um exemplo de jogo que não possui um </a:t>
+            </a:r>
+            <a:br>
+              <a:rPr lang="pt-BR" dirty="0"/>
+            </a:br>
+            <a:r>
+              <a:rPr lang="pt-BR" dirty="0"/>
+              <a:t>aspecto evidente de sobrevivência física nem social. </a:t>
+            </a:r>
+            <a:br>
+              <a:rPr lang="pt-BR" dirty="0"/>
+            </a:br>
+            <a:r>
+              <a:rPr lang="pt-BR" dirty="0"/>
+              <a:t>Ele se baseia na </a:t>
             </a:r>
             <a:r>
               <a:rPr lang="pt-BR" dirty="0">
@@ -9631,7 +10801,7 @@
         </p:blipFill>
         <p:spPr>
           <a:xfrm>
-            <a:off x="6672065" y="3284985"/>
+            <a:off x="6240789" y="3284985"/>
             <a:ext cx="2943961" cy="3123411"/>
           </a:xfrm>
           <a:prstGeom prst="rect">
@@ -9647,7 +10817,7 @@
         </p:nvSpPr>
         <p:spPr>
           <a:xfrm>
-            <a:off x="2638844" y="3662266"/>
+            <a:off x="2207568" y="3662266"/>
             <a:ext cx="3685624" cy="2031325"/>
           </a:xfrm>
           <a:prstGeom prst="rect">
@@ -9851,6 +11021,9 @@
           <a:bodyPr/>
           <a:lstStyle/>
           <a:p>
+            <a:endParaRPr lang="pt-BR" dirty="0"/>
+          </a:p>
+          <a:p>
             <a:r>
               <a:rPr lang="pt-BR" dirty="0"/>
               <a:t>Desse princípio básico de </a:t>
@@ -9867,7 +11040,14 @@
             </a:r>
             <a:r>
               <a:rPr lang="pt-BR" dirty="0"/>
-              <a:t> podemos tirar a seguinte dica para o projeto de jogos:</a:t>
+              <a:t> </a:t>
+            </a:r>
+            <a:br>
+              <a:rPr lang="pt-BR" dirty="0"/>
+            </a:br>
+            <a:r>
+              <a:rPr lang="pt-BR" dirty="0"/>
+              <a:t>podemos tirar a seguinte dica para o projeto de jogos:</a:t>
             </a:r>
           </a:p>
           <a:p>
@@ -9986,7 +11166,7 @@
         </p:spPr>
         <p:txBody>
           <a:bodyPr>
-            <a:normAutofit lnSpcReduction="10000"/>
+            <a:normAutofit/>
           </a:bodyPr>
           <a:lstStyle/>
           <a:p>
@@ -10006,7 +11186,21 @@
             </a:r>
             <a:r>
               <a:rPr lang="pt-BR" dirty="0"/>
-              <a:t> mostra como os jogos nos divertem ensinando habilidades de sobrevivência nas </a:t>
+              <a:t> mostra como os jogos </a:t>
+            </a:r>
+            <a:br>
+              <a:rPr lang="pt-BR" dirty="0"/>
+            </a:br>
+            <a:r>
+              <a:rPr lang="pt-BR" dirty="0"/>
+              <a:t>nos divertem ensinando habilidades de sobrevivência </a:t>
+            </a:r>
+            <a:br>
+              <a:rPr lang="pt-BR" dirty="0"/>
+            </a:br>
+            <a:r>
+              <a:rPr lang="pt-BR" dirty="0"/>
+              <a:t>nas </a:t>
             </a:r>
             <a:r>
               <a:rPr lang="pt-BR" dirty="0">
@@ -10016,37 +11210,22 @@
                   </a:schemeClr>
                 </a:solidFill>
               </a:rPr>
-              <a:t>áreas física, </a:t>
-            </a:r>
-            <a:br>
-              <a:rPr lang="pt-BR" dirty="0">
-                <a:solidFill>
-                  <a:schemeClr val="accent1">
-                    <a:lumMod val="75000"/>
-                  </a:schemeClr>
-                </a:solidFill>
-              </a:rPr>
-            </a:br>
-            <a:r>
-              <a:rPr lang="pt-BR" dirty="0">
-                <a:solidFill>
-                  <a:schemeClr val="accent1">
-                    <a:lumMod val="75000"/>
-                  </a:schemeClr>
-                </a:solidFill>
-              </a:rPr>
-              <a:t>social e mental</a:t>
+              <a:t>áreas física, social e mental</a:t>
             </a:r>
             <a:r>
               <a:rPr lang="pt-BR" dirty="0"/>
-              <a:t>, mas ela não diz como um jogo deve ser estruturado</a:t>
+              <a:t>, mas ela não diz como </a:t>
             </a:r>
             <a:br>
               <a:rPr lang="pt-BR" dirty="0"/>
             </a:br>
-            <a:endParaRPr lang="pt-BR" dirty="0"/>
-          </a:p>
-          <a:p>
+            <a:r>
+              <a:rPr lang="pt-BR" dirty="0"/>
+              <a:t>um jogo deve ser estruturado</a:t>
+            </a:r>
+            <a:br>
+              <a:rPr lang="pt-BR" dirty="0"/>
+            </a:br>
             <a:endParaRPr lang="pt-BR" dirty="0"/>
           </a:p>
           <a:p>
@@ -10215,7 +11394,26 @@
                   </a:schemeClr>
                 </a:solidFill>
               </a:rPr>
-              <a:t>não há um objetivo específico</a:t>
+              <a:t>não há </a:t>
+            </a:r>
+            <a:br>
+              <a:rPr lang="pt-BR" dirty="0">
+                <a:solidFill>
+                  <a:schemeClr val="accent1">
+                    <a:lumMod val="75000"/>
+                  </a:schemeClr>
+                </a:solidFill>
+              </a:rPr>
+            </a:br>
+            <a:r>
+              <a:rPr lang="pt-BR" dirty="0">
+                <a:solidFill>
+                  <a:schemeClr val="accent1">
+                    <a:lumMod val="75000"/>
+                  </a:schemeClr>
+                </a:solidFill>
+              </a:rPr>
+              <a:t>um objetivo específico</a:t>
             </a:r>
             <a:r>
               <a:rPr lang="pt-BR" dirty="0"/>
@@ -10228,17 +11426,17 @@
             <a:endParaRPr lang="pt-BR" dirty="0"/>
           </a:p>
           <a:p>
-            <a:pPr lvl="2"/>
+            <a:pPr lvl="3"/>
             <a:r>
               <a:rPr lang="pt-BR" dirty="0"/>
-              <a:t>Mas um jogo sem um objetivo é apenas um brinquedo</a:t>
-            </a:r>
-          </a:p>
-          <a:p>
-            <a:pPr lvl="2"/>
+              <a:t>Um jogo sem um objetivo é apenas um brinquedo</a:t>
+            </a:r>
+          </a:p>
+          <a:p>
+            <a:pPr lvl="3"/>
             <a:r>
               <a:rPr lang="pt-BR" dirty="0"/>
-              <a:t>Neste caso como os temas de Sim City e The </a:t>
+              <a:t>Como os temas de Sim City e The </a:t>
             </a:r>
             <a:r>
               <a:rPr lang="pt-BR" dirty="0" err="1"/>
@@ -10246,7 +11444,14 @@
             </a:r>
             <a:r>
               <a:rPr lang="pt-BR" dirty="0"/>
-              <a:t> são familiares a todas as pessoas, cada uma acaba trazendo os seus próprios objetivos para o brinquedo</a:t>
+              <a:t> são familiares, </a:t>
+            </a:r>
+            <a:br>
+              <a:rPr lang="pt-BR" dirty="0"/>
+            </a:br>
+            <a:r>
+              <a:rPr lang="pt-BR" dirty="0"/>
+              <a:t>cada uma acaba trazendo seus próprios objetivos</a:t>
             </a:r>
           </a:p>
           <a:p>
@@ -10368,6 +11573,9 @@
           </a:bodyPr>
           <a:lstStyle/>
           <a:p>
+            <a:endParaRPr lang="pt-BR" dirty="0"/>
+          </a:p>
+          <a:p>
             <a:r>
               <a:rPr lang="pt-BR" dirty="0"/>
               <a:t>As </a:t>
@@ -10449,10 +11657,6 @@
                 </a:schemeClr>
               </a:solidFill>
             </a:endParaRPr>
-          </a:p>
-          <a:p>
-            <a:pPr lvl="1"/>
-            <a:endParaRPr lang="pt-BR" dirty="0"/>
           </a:p>
           <a:p>
             <a:pPr lvl="1"/>
@@ -10578,9 +11782,6 @@
             <a:endParaRPr lang="pt-BR" dirty="0"/>
           </a:p>
           <a:p>
-            <a:endParaRPr lang="pt-BR" dirty="0"/>
-          </a:p>
-          <a:p>
             <a:pPr marL="109728" indent="0" algn="ctr">
               <a:buNone/>
             </a:pPr>
@@ -10672,7 +11873,7 @@
         </p:nvGrpSpPr>
         <p:grpSpPr>
           <a:xfrm>
-            <a:off x="3215680" y="2390372"/>
+            <a:off x="3215680" y="2060848"/>
             <a:ext cx="5482412" cy="2046740"/>
             <a:chOff x="3215680" y="2390372"/>
             <a:chExt cx="5482412" cy="2046740"/>
@@ -10697,7 +11898,7 @@
                 <a:lumMod val="50000"/>
               </a:schemeClr>
             </a:solidFill>
-            <a:ln>
+            <a:ln w="12700">
               <a:solidFill>
                 <a:schemeClr val="bg1">
                   <a:lumMod val="75000"/>
@@ -10747,7 +11948,7 @@
                 <a:lumMod val="50000"/>
               </a:schemeClr>
             </a:solidFill>
-            <a:ln>
+            <a:ln w="12700">
               <a:solidFill>
                 <a:schemeClr val="bg1">
                   <a:lumMod val="75000"/>
@@ -10782,24 +11983,23 @@
           <p:nvCxnSpPr>
             <p:cNvPr id="15" name="Conector de seta reta 14"/>
             <p:cNvCxnSpPr>
-              <a:stCxn id="13" idx="6"/>
+              <a:cxnSpLocks/>
+              <a:stCxn id="13" idx="5"/>
               <a:endCxn id="41" idx="2"/>
             </p:cNvCxnSpPr>
             <p:nvPr/>
           </p:nvCxnSpPr>
           <p:spPr>
             <a:xfrm>
-              <a:off x="3503712" y="3534088"/>
-              <a:ext cx="1156421" cy="398968"/>
+              <a:off x="3461531" y="3635923"/>
+              <a:ext cx="1198602" cy="338625"/>
             </a:xfrm>
             <a:prstGeom prst="straightConnector1">
               <a:avLst/>
             </a:prstGeom>
-            <a:ln>
+            <a:ln w="12700">
               <a:solidFill>
-                <a:schemeClr val="bg1">
-                  <a:lumMod val="75000"/>
-                </a:schemeClr>
+                <a:schemeClr val="accent1"/>
               </a:solidFill>
               <a:tailEnd type="triangle"/>
             </a:ln>
@@ -10823,24 +12023,23 @@
           <p:nvCxnSpPr>
             <p:cNvPr id="16" name="Conector de seta reta 15"/>
             <p:cNvCxnSpPr>
-              <a:stCxn id="21" idx="6"/>
+              <a:cxnSpLocks/>
+              <a:stCxn id="21" idx="7"/>
               <a:endCxn id="18" idx="2"/>
             </p:cNvCxnSpPr>
             <p:nvPr/>
           </p:nvCxnSpPr>
           <p:spPr>
             <a:xfrm flipV="1">
-              <a:off x="4927570" y="2534388"/>
-              <a:ext cx="842196" cy="390556"/>
+              <a:off x="4885389" y="2534388"/>
+              <a:ext cx="884377" cy="288721"/>
             </a:xfrm>
             <a:prstGeom prst="straightConnector1">
               <a:avLst/>
             </a:prstGeom>
-            <a:ln>
+            <a:ln w="12700">
               <a:solidFill>
-                <a:schemeClr val="bg1">
-                  <a:lumMod val="75000"/>
-                </a:schemeClr>
+                <a:schemeClr val="accent1"/>
               </a:solidFill>
               <a:tailEnd type="triangle"/>
             </a:ln>
@@ -10864,24 +12063,23 @@
           <p:nvCxnSpPr>
             <p:cNvPr id="17" name="Conector de seta reta 16"/>
             <p:cNvCxnSpPr>
-              <a:stCxn id="21" idx="6"/>
+              <a:cxnSpLocks/>
+              <a:stCxn id="21" idx="5"/>
               <a:endCxn id="8" idx="2"/>
             </p:cNvCxnSpPr>
             <p:nvPr/>
           </p:nvCxnSpPr>
           <p:spPr>
             <a:xfrm>
-              <a:off x="4927570" y="2924944"/>
-              <a:ext cx="842196" cy="216024"/>
+              <a:off x="4885389" y="3026779"/>
+              <a:ext cx="884377" cy="114189"/>
             </a:xfrm>
             <a:prstGeom prst="straightConnector1">
               <a:avLst/>
             </a:prstGeom>
-            <a:ln>
+            <a:ln w="12700">
               <a:solidFill>
-                <a:schemeClr val="bg1">
-                  <a:lumMod val="75000"/>
-                </a:schemeClr>
+                <a:schemeClr val="accent1"/>
               </a:solidFill>
               <a:tailEnd type="triangle"/>
             </a:ln>
@@ -10920,7 +12118,7 @@
                 <a:lumMod val="50000"/>
               </a:schemeClr>
             </a:solidFill>
-            <a:ln>
+            <a:ln w="12700">
               <a:solidFill>
                 <a:schemeClr val="bg1">
                   <a:lumMod val="75000"/>
@@ -10955,24 +12153,23 @@
           <p:nvCxnSpPr>
             <p:cNvPr id="22" name="Conector de seta reta 21"/>
             <p:cNvCxnSpPr>
-              <a:stCxn id="13" idx="6"/>
+              <a:cxnSpLocks/>
+              <a:stCxn id="13" idx="7"/>
               <a:endCxn id="21" idx="2"/>
             </p:cNvCxnSpPr>
             <p:nvPr/>
           </p:nvCxnSpPr>
           <p:spPr>
             <a:xfrm flipV="1">
-              <a:off x="3503712" y="2924944"/>
-              <a:ext cx="1135826" cy="609144"/>
+              <a:off x="3461531" y="2924944"/>
+              <a:ext cx="1178007" cy="507309"/>
             </a:xfrm>
             <a:prstGeom prst="straightConnector1">
               <a:avLst/>
             </a:prstGeom>
-            <a:ln>
+            <a:ln w="12700">
               <a:solidFill>
-                <a:schemeClr val="bg1">
-                  <a:lumMod val="75000"/>
-                </a:schemeClr>
+                <a:schemeClr val="accent1"/>
               </a:solidFill>
               <a:tailEnd type="triangle"/>
             </a:ln>
@@ -11011,7 +12208,7 @@
                 <a:lumMod val="50000"/>
               </a:schemeClr>
             </a:solidFill>
-            <a:ln>
+            <a:ln w="12700">
               <a:solidFill>
                 <a:schemeClr val="bg1">
                   <a:lumMod val="75000"/>
@@ -11046,23 +12243,23 @@
           <p:nvCxnSpPr>
             <p:cNvPr id="32" name="Conector de seta reta 31"/>
             <p:cNvCxnSpPr>
+              <a:cxnSpLocks/>
+              <a:stCxn id="8" idx="7"/>
               <a:endCxn id="27" idx="3"/>
             </p:cNvCxnSpPr>
             <p:nvPr/>
           </p:nvCxnSpPr>
           <p:spPr>
             <a:xfrm flipV="1">
-              <a:off x="6057799" y="2949641"/>
-              <a:ext cx="884377" cy="209995"/>
+              <a:off x="6015617" y="2949640"/>
+              <a:ext cx="926558" cy="89493"/>
             </a:xfrm>
             <a:prstGeom prst="straightConnector1">
               <a:avLst/>
             </a:prstGeom>
-            <a:ln>
+            <a:ln w="12700">
               <a:solidFill>
-                <a:schemeClr val="bg1">
-                  <a:lumMod val="75000"/>
-                </a:schemeClr>
+                <a:schemeClr val="accent1"/>
               </a:solidFill>
               <a:tailEnd type="triangle"/>
             </a:ln>
@@ -11086,23 +12283,23 @@
           <p:nvCxnSpPr>
             <p:cNvPr id="35" name="Conector de seta reta 34"/>
             <p:cNvCxnSpPr>
+              <a:cxnSpLocks/>
+              <a:stCxn id="8" idx="5"/>
               <a:endCxn id="23" idx="1"/>
             </p:cNvCxnSpPr>
             <p:nvPr/>
           </p:nvCxnSpPr>
           <p:spPr>
             <a:xfrm>
-              <a:off x="6057799" y="3159636"/>
-              <a:ext cx="892761" cy="170783"/>
+              <a:off x="6015617" y="3242803"/>
+              <a:ext cx="934942" cy="87615"/>
             </a:xfrm>
             <a:prstGeom prst="straightConnector1">
               <a:avLst/>
             </a:prstGeom>
-            <a:ln>
+            <a:ln w="12700">
               <a:solidFill>
-                <a:schemeClr val="bg1">
-                  <a:lumMod val="75000"/>
-                </a:schemeClr>
+                <a:schemeClr val="accent1"/>
               </a:solidFill>
               <a:tailEnd type="triangle"/>
             </a:ln>
@@ -11141,7 +12338,7 @@
                 <a:lumMod val="50000"/>
               </a:schemeClr>
             </a:solidFill>
-            <a:ln>
+            <a:ln w="12700">
               <a:solidFill>
                 <a:schemeClr val="bg1">
                   <a:lumMod val="75000"/>
@@ -11189,11 +12386,9 @@
             <a:prstGeom prst="straightConnector1">
               <a:avLst/>
             </a:prstGeom>
-            <a:ln>
+            <a:ln w="12700">
               <a:solidFill>
-                <a:schemeClr val="bg1">
-                  <a:lumMod val="75000"/>
-                </a:schemeClr>
+                <a:schemeClr val="accent1"/>
               </a:solidFill>
               <a:tailEnd type="triangle"/>
             </a:ln>
@@ -11232,7 +12427,7 @@
                 <a:lumMod val="50000"/>
               </a:schemeClr>
             </a:solidFill>
-            <a:ln>
+            <a:ln w="12700">
               <a:solidFill>
                 <a:schemeClr val="bg1">
                   <a:lumMod val="75000"/>
@@ -11282,7 +12477,7 @@
                 <a:lumMod val="50000"/>
               </a:schemeClr>
             </a:solidFill>
-            <a:ln>
+            <a:ln w="12700">
               <a:solidFill>
                 <a:schemeClr val="bg1">
                   <a:lumMod val="75000"/>
@@ -11317,24 +12512,23 @@
           <p:nvCxnSpPr>
             <p:cNvPr id="39" name="Conector de seta reta 38"/>
             <p:cNvCxnSpPr>
-              <a:stCxn id="41" idx="6"/>
+              <a:cxnSpLocks/>
+              <a:stCxn id="41" idx="7"/>
               <a:endCxn id="45" idx="2"/>
             </p:cNvCxnSpPr>
             <p:nvPr/>
           </p:nvCxnSpPr>
           <p:spPr>
             <a:xfrm flipV="1">
-              <a:off x="4948165" y="3686516"/>
-              <a:ext cx="842196" cy="246540"/>
+              <a:off x="4905984" y="3686516"/>
+              <a:ext cx="884377" cy="186197"/>
             </a:xfrm>
             <a:prstGeom prst="straightConnector1">
               <a:avLst/>
             </a:prstGeom>
-            <a:ln>
+            <a:ln w="12700">
               <a:solidFill>
-                <a:schemeClr val="bg1">
-                  <a:lumMod val="75000"/>
-                </a:schemeClr>
+                <a:schemeClr val="accent1"/>
               </a:solidFill>
               <a:tailEnd type="triangle"/>
             </a:ln>
@@ -11358,24 +12552,23 @@
           <p:nvCxnSpPr>
             <p:cNvPr id="40" name="Conector de seta reta 39"/>
             <p:cNvCxnSpPr>
-              <a:stCxn id="41" idx="6"/>
+              <a:cxnSpLocks/>
+              <a:stCxn id="41" idx="5"/>
               <a:endCxn id="38" idx="2"/>
             </p:cNvCxnSpPr>
             <p:nvPr/>
           </p:nvCxnSpPr>
           <p:spPr>
             <a:xfrm>
-              <a:off x="4948165" y="3933056"/>
-              <a:ext cx="842196" cy="360040"/>
+              <a:off x="4905984" y="4076383"/>
+              <a:ext cx="884377" cy="216713"/>
             </a:xfrm>
             <a:prstGeom prst="straightConnector1">
               <a:avLst/>
             </a:prstGeom>
-            <a:ln>
+            <a:ln w="12700">
               <a:solidFill>
-                <a:schemeClr val="bg1">
-                  <a:lumMod val="75000"/>
-                </a:schemeClr>
+                <a:schemeClr val="accent1"/>
               </a:solidFill>
               <a:tailEnd type="triangle"/>
             </a:ln>
@@ -11403,7 +12596,7 @@
           </p:nvSpPr>
           <p:spPr>
             <a:xfrm>
-              <a:off x="4660133" y="3789040"/>
+              <a:off x="4660133" y="3830532"/>
               <a:ext cx="288032" cy="288032"/>
             </a:xfrm>
             <a:prstGeom prst="ellipse">
@@ -11414,7 +12607,7 @@
                 <a:lumMod val="50000"/>
               </a:schemeClr>
             </a:solidFill>
-            <a:ln>
+            <a:ln w="12700">
               <a:solidFill>
                 <a:schemeClr val="bg1">
                   <a:lumMod val="75000"/>
@@ -11464,7 +12657,7 @@
                 <a:lumMod val="50000"/>
               </a:schemeClr>
             </a:solidFill>
-            <a:ln>
+            <a:ln w="12700">
               <a:solidFill>
                 <a:schemeClr val="bg1">
                   <a:lumMod val="75000"/>
@@ -11511,11 +12704,9 @@
             <a:prstGeom prst="straightConnector1">
               <a:avLst/>
             </a:prstGeom>
-            <a:ln>
+            <a:ln w="12700">
               <a:solidFill>
-                <a:schemeClr val="bg1">
-                  <a:lumMod val="75000"/>
-                </a:schemeClr>
+                <a:schemeClr val="accent1"/>
               </a:solidFill>
               <a:tailEnd type="triangle"/>
             </a:ln>
@@ -11554,7 +12745,7 @@
                 <a:lumMod val="50000"/>
               </a:schemeClr>
             </a:solidFill>
-            <a:ln>
+            <a:ln w="12700">
               <a:solidFill>
                 <a:schemeClr val="bg1">
                   <a:lumMod val="75000"/>
@@ -11589,24 +12780,23 @@
           <p:nvCxnSpPr>
             <p:cNvPr id="46" name="Conector de seta reta 45"/>
             <p:cNvCxnSpPr>
-              <a:stCxn id="45" idx="6"/>
+              <a:cxnSpLocks/>
+              <a:stCxn id="45" idx="5"/>
               <a:endCxn id="42" idx="1"/>
             </p:cNvCxnSpPr>
             <p:nvPr/>
           </p:nvCxnSpPr>
           <p:spPr>
             <a:xfrm>
-              <a:off x="6078394" y="3686516"/>
-              <a:ext cx="884377" cy="211582"/>
+              <a:off x="6036212" y="3788351"/>
+              <a:ext cx="926558" cy="109747"/>
             </a:xfrm>
             <a:prstGeom prst="straightConnector1">
               <a:avLst/>
             </a:prstGeom>
-            <a:ln>
+            <a:ln w="12700">
               <a:solidFill>
-                <a:schemeClr val="bg1">
-                  <a:lumMod val="75000"/>
-                </a:schemeClr>
+                <a:schemeClr val="accent1"/>
               </a:solidFill>
               <a:tailEnd type="triangle"/>
             </a:ln>
@@ -11630,24 +12820,23 @@
           <p:nvCxnSpPr>
             <p:cNvPr id="48" name="Conector de seta reta 47"/>
             <p:cNvCxnSpPr>
-              <a:stCxn id="45" idx="6"/>
+              <a:cxnSpLocks/>
+              <a:stCxn id="45" idx="7"/>
               <a:endCxn id="23" idx="3"/>
             </p:cNvCxnSpPr>
             <p:nvPr/>
           </p:nvCxnSpPr>
           <p:spPr>
             <a:xfrm flipV="1">
-              <a:off x="6078393" y="3534088"/>
-              <a:ext cx="872166" cy="152428"/>
+              <a:off x="6036212" y="3534088"/>
+              <a:ext cx="914347" cy="50593"/>
             </a:xfrm>
             <a:prstGeom prst="straightConnector1">
               <a:avLst/>
             </a:prstGeom>
-            <a:ln>
+            <a:ln w="12700">
               <a:solidFill>
-                <a:schemeClr val="bg1">
-                  <a:lumMod val="75000"/>
-                </a:schemeClr>
+                <a:schemeClr val="accent1"/>
               </a:solidFill>
               <a:tailEnd type="triangle"/>
             </a:ln>
@@ -11686,7 +12875,7 @@
                 <a:lumMod val="50000"/>
               </a:schemeClr>
             </a:solidFill>
-            <a:ln>
+            <a:ln w="12700">
               <a:solidFill>
                 <a:schemeClr val="bg1">
                   <a:lumMod val="75000"/>
@@ -11734,11 +12923,9 @@
             <a:prstGeom prst="straightConnector1">
               <a:avLst/>
             </a:prstGeom>
-            <a:ln>
+            <a:ln w="12700">
               <a:solidFill>
-                <a:schemeClr val="bg1">
-                  <a:lumMod val="75000"/>
-                </a:schemeClr>
+                <a:schemeClr val="accent1"/>
               </a:solidFill>
               <a:tailEnd type="triangle"/>
             </a:ln>
@@ -11775,11 +12962,9 @@
             <a:prstGeom prst="straightConnector1">
               <a:avLst/>
             </a:prstGeom>
-            <a:ln>
+            <a:ln w="12700">
               <a:solidFill>
-                <a:schemeClr val="bg1">
-                  <a:lumMod val="75000"/>
-                </a:schemeClr>
+                <a:schemeClr val="accent1"/>
               </a:solidFill>
               <a:tailEnd type="triangle"/>
             </a:ln>
@@ -11816,11 +13001,9 @@
             <a:prstGeom prst="straightConnector1">
               <a:avLst/>
             </a:prstGeom>
-            <a:ln>
+            <a:ln w="12700">
               <a:solidFill>
-                <a:schemeClr val="bg1">
-                  <a:lumMod val="75000"/>
-                </a:schemeClr>
+                <a:schemeClr val="accent1"/>
               </a:solidFill>
               <a:tailEnd type="triangle"/>
             </a:ln>
@@ -11923,10 +13106,10 @@
         </p:nvGrpSpPr>
         <p:grpSpPr>
           <a:xfrm>
-            <a:off x="1073694" y="536746"/>
-            <a:ext cx="10653870" cy="5900395"/>
-            <a:chOff x="1073694" y="536746"/>
-            <a:chExt cx="10653870" cy="5900395"/>
+            <a:off x="1073694" y="1231642"/>
+            <a:ext cx="10251831" cy="5205499"/>
+            <a:chOff x="1073694" y="1231642"/>
+            <a:chExt cx="10251831" cy="5205499"/>
           </a:xfrm>
         </p:grpSpPr>
         <p:pic>
@@ -11951,7 +13134,7 @@
           </p:blipFill>
           <p:spPr>
             <a:xfrm>
-              <a:off x="9262341" y="1861781"/>
+              <a:off x="6168008" y="1561785"/>
               <a:ext cx="1595670" cy="1196752"/>
             </a:xfrm>
             <a:prstGeom prst="rect">
@@ -11995,7 +13178,7 @@
           </p:blipFill>
           <p:spPr>
             <a:xfrm>
-              <a:off x="7859064" y="1569387"/>
+              <a:off x="4903209" y="1231642"/>
               <a:ext cx="1564688" cy="977930"/>
             </a:xfrm>
             <a:prstGeom prst="rect">
@@ -12039,7 +13222,7 @@
           </p:blipFill>
           <p:spPr>
             <a:xfrm>
-              <a:off x="10131975" y="536746"/>
+              <a:off x="9389043" y="2420728"/>
               <a:ext cx="1595589" cy="1483618"/>
             </a:xfrm>
             <a:prstGeom prst="rect">
@@ -12082,7 +13265,7 @@
           </p:blipFill>
           <p:spPr>
             <a:xfrm>
-              <a:off x="8867176" y="864303"/>
+              <a:off x="7866653" y="1645964"/>
               <a:ext cx="1419334" cy="1112573"/>
             </a:xfrm>
             <a:prstGeom prst="rect">
@@ -12126,7 +13309,7 @@
           </p:blipFill>
           <p:spPr>
             <a:xfrm>
-              <a:off x="6361255" y="2755741"/>
+              <a:off x="6168008" y="2861351"/>
               <a:ext cx="2773176" cy="1561298"/>
             </a:xfrm>
             <a:prstGeom prst="rect">
@@ -12190,7 +13373,6 @@
                 </a:srgbClr>
               </a:outerShdw>
             </a:effectLst>
-            <a:extLst/>
           </p:spPr>
         </p:pic>
         <p:pic>
@@ -17068,7 +18250,14 @@
           <a:p>
             <a:r>
               <a:rPr lang="pt-BR" dirty="0"/>
-              <a:t>Uma sequência de convexidades ajuda a criar um </a:t>
+              <a:t>Uma sequência de convexidades ajuda a </a:t>
+            </a:r>
+            <a:br>
+              <a:rPr lang="pt-BR" dirty="0"/>
+            </a:br>
+            <a:r>
+              <a:rPr lang="pt-BR" dirty="0"/>
+              <a:t>criar um </a:t>
             </a:r>
             <a:r>
               <a:rPr lang="pt-BR" dirty="0">
@@ -17113,7 +18302,7 @@
         </p:nvGrpSpPr>
         <p:grpSpPr>
           <a:xfrm>
-            <a:off x="2711625" y="2636912"/>
+            <a:off x="2423592" y="2740278"/>
             <a:ext cx="6624736" cy="3425026"/>
             <a:chOff x="2711625" y="2636912"/>
             <a:chExt cx="6624736" cy="3425026"/>
@@ -17964,7 +19153,14 @@
             </a:r>
             <a:r>
               <a:rPr lang="pt-BR" dirty="0"/>
-              <a:t>uma por vez e dê aos jogadores a oportunidade de </a:t>
+              <a:t>uma por vez e dê </a:t>
+            </a:r>
+            <a:br>
+              <a:rPr lang="pt-BR" dirty="0"/>
+            </a:br>
+            <a:r>
+              <a:rPr lang="pt-BR" dirty="0"/>
+              <a:t>aos jogadores a oportunidade de </a:t>
             </a:r>
             <a:r>
               <a:rPr lang="pt-BR" dirty="0">
@@ -17974,7 +19170,26 @@
                   </a:schemeClr>
                 </a:solidFill>
               </a:rPr>
-              <a:t>curtir o domínio dessas habilidades</a:t>
+              <a:t>curtir o domínio </a:t>
+            </a:r>
+            <a:br>
+              <a:rPr lang="pt-BR" dirty="0">
+                <a:solidFill>
+                  <a:schemeClr val="accent1">
+                    <a:lumMod val="75000"/>
+                  </a:schemeClr>
+                </a:solidFill>
+              </a:rPr>
+            </a:br>
+            <a:r>
+              <a:rPr lang="pt-BR" dirty="0">
+                <a:solidFill>
+                  <a:schemeClr val="accent1">
+                    <a:lumMod val="75000"/>
+                  </a:schemeClr>
+                </a:solidFill>
+              </a:rPr>
+              <a:t>dessas habilidades</a:t>
             </a:r>
             <a:r>
               <a:rPr lang="pt-BR" dirty="0"/>
@@ -18013,8 +19228,8 @@
         </p:nvGrpSpPr>
         <p:grpSpPr>
           <a:xfrm>
-            <a:off x="2783632" y="2636912"/>
-            <a:ext cx="6408711" cy="3999795"/>
+            <a:off x="2279576" y="2996952"/>
+            <a:ext cx="6408711" cy="3495739"/>
             <a:chOff x="2783632" y="2636912"/>
             <a:chExt cx="6408711" cy="3999795"/>
           </a:xfrm>
@@ -23472,9 +24687,16 @@
             <p:ph idx="1"/>
           </p:nvPr>
         </p:nvSpPr>
-        <p:spPr/>
+        <p:spPr>
+          <a:xfrm>
+            <a:off x="609600" y="1481329"/>
+            <a:ext cx="10972800" cy="4972007"/>
+          </a:xfrm>
+        </p:spPr>
         <p:txBody>
-          <a:bodyPr/>
+          <a:bodyPr>
+            <a:normAutofit/>
+          </a:bodyPr>
           <a:lstStyle/>
           <a:p>
             <a:r>
@@ -23489,12 +24711,35 @@
                   </a:schemeClr>
                 </a:solidFill>
               </a:rPr>
-              <a:t>normalmente específicas para um gênero</a:t>
+              <a:t>normalmente específicas </a:t>
+            </a:r>
+            <a:br>
+              <a:rPr lang="pt-BR" dirty="0">
+                <a:solidFill>
+                  <a:schemeClr val="accent1">
+                    <a:lumMod val="75000"/>
+                  </a:schemeClr>
+                </a:solidFill>
+              </a:rPr>
+            </a:br>
+            <a:r>
+              <a:rPr lang="pt-BR" dirty="0">
+                <a:solidFill>
+                  <a:schemeClr val="accent1">
+                    <a:lumMod val="75000"/>
+                  </a:schemeClr>
+                </a:solidFill>
+              </a:rPr>
+              <a:t>para um gênero</a:t>
             </a:r>
             <a:r>
               <a:rPr lang="pt-BR" dirty="0"/>
               <a:t>:</a:t>
             </a:r>
+            <a:br>
+              <a:rPr lang="pt-BR" dirty="0"/>
+            </a:br>
+            <a:endParaRPr lang="pt-BR" dirty="0"/>
           </a:p>
           <a:p>
             <a:pPr lvl="1"/>
@@ -23594,23 +24839,8 @@
             </a:r>
             <a:r>
               <a:rPr lang="pt-BR" dirty="0"/>
-              <a:t> Games</a:t>
-            </a:r>
-          </a:p>
-          <a:p>
-            <a:pPr lvl="1"/>
-            <a:r>
-              <a:rPr lang="pt-BR" dirty="0" err="1"/>
-              <a:t>Rhythm</a:t>
-            </a:r>
-            <a:r>
-              <a:rPr lang="pt-BR" dirty="0"/>
-              <a:t> Games</a:t>
-            </a:r>
-          </a:p>
-          <a:p>
-            <a:pPr lvl="1"/>
-            <a:endParaRPr lang="pt-BR" dirty="0"/>
+              <a:t> Games (RPG)</a:t>
+            </a:r>
           </a:p>
           <a:p>
             <a:pPr lvl="1"/>
@@ -23768,7 +24998,7 @@
             </a:br>
             <a:r>
               <a:rPr lang="pt-BR" sz="2000" dirty="0"/>
-              <a:t>"frouxa"</a:t>
+              <a:t>"frouxo"</a:t>
             </a:r>
           </a:p>
           <a:p>
@@ -24601,7 +25831,14 @@
             <a:pPr lvl="1"/>
             <a:r>
               <a:rPr lang="pt-BR" sz="2400" dirty="0"/>
-              <a:t>Utilização de cartões 2D para desenhar objetos distantes, como árvores, montanhas, etc.</a:t>
+              <a:t>Utilização de cartões 2D para desenhar </a:t>
+            </a:r>
+            <a:br>
+              <a:rPr lang="pt-BR" sz="2400" dirty="0"/>
+            </a:br>
+            <a:r>
+              <a:rPr lang="pt-BR" sz="2400" dirty="0"/>
+              <a:t>objetos distantes, como árvores, montanhas, etc.</a:t>
             </a:r>
           </a:p>
           <a:p>
@@ -24842,6 +26079,10 @@
               <a:rPr lang="pt-BR" dirty="0"/>
               <a:t>O que é um jogo?</a:t>
             </a:r>
+            <a:br>
+              <a:rPr lang="pt-BR" dirty="0"/>
+            </a:br>
+            <a:endParaRPr lang="pt-BR" dirty="0"/>
           </a:p>
           <a:p>
             <a:pPr lvl="1"/>
@@ -25450,6 +26691,11 @@
           <a:bodyPr/>
           <a:lstStyle/>
           <a:p>
+            <a:pPr>
+              <a:spcAft>
+                <a:spcPts val="1800"/>
+              </a:spcAft>
+            </a:pPr>
             <a:r>
               <a:rPr lang="pt-BR" dirty="0"/>
               <a:t>A distinção entre um </a:t>
@@ -25480,7 +26726,14 @@
             </a:r>
             <a:r>
               <a:rPr lang="pt-BR" dirty="0"/>
-              <a:t> é muitas vezes obscura</a:t>
+              <a:t> </a:t>
+            </a:r>
+            <a:br>
+              <a:rPr lang="pt-BR" dirty="0"/>
+            </a:br>
+            <a:r>
+              <a:rPr lang="pt-BR" dirty="0"/>
+              <a:t>muitas vezes não é clara</a:t>
             </a:r>
           </a:p>
           <a:p>
@@ -25527,7 +26780,7 @@
         </p:nvGrpSpPr>
         <p:grpSpPr>
           <a:xfrm>
-            <a:off x="1343472" y="3904618"/>
+            <a:off x="1343472" y="4145906"/>
             <a:ext cx="9217024" cy="1875382"/>
             <a:chOff x="1883532" y="3904618"/>
             <a:chExt cx="8676964" cy="1875382"/>
@@ -26241,7 +27494,14 @@
             </a:r>
             <a:r>
               <a:rPr lang="pt-BR" dirty="0"/>
-              <a:t> básico para produzir jogos 2D:</a:t>
+              <a:t> </a:t>
+            </a:r>
+            <a:br>
+              <a:rPr lang="pt-BR" dirty="0"/>
+            </a:br>
+            <a:r>
+              <a:rPr lang="pt-BR" dirty="0"/>
+              <a:t>básico para produzir jogos 2D:</a:t>
             </a:r>
             <a:br>
               <a:rPr lang="pt-BR" dirty="0"/>
@@ -26365,6 +27625,9 @@
               <a:rPr lang="pt-BR" dirty="0"/>
               <a:t>Ideias não são boas se não forem </a:t>
             </a:r>
+            <a:br>
+              <a:rPr lang="pt-BR" dirty="0"/>
+            </a:br>
             <a:r>
               <a:rPr lang="pt-BR" dirty="0">
                 <a:solidFill>
@@ -26375,10 +27638,7 @@
               </a:rPr>
               <a:t>testadas através de um protótipo</a:t>
             </a:r>
-            <a:r>
-              <a:rPr lang="pt-BR" dirty="0"/>
-              <a:t> do jogo</a:t>
-            </a:r>
+            <a:endParaRPr lang="pt-BR" dirty="0"/>
           </a:p>
           <a:p>
             <a:pPr marL="109728" indent="0">
@@ -26527,7 +27787,12 @@
             <p:ph idx="1"/>
           </p:nvPr>
         </p:nvSpPr>
-        <p:spPr/>
+        <p:spPr>
+          <a:xfrm>
+            <a:off x="479376" y="1481329"/>
+            <a:ext cx="10972800" cy="4525963"/>
+          </a:xfrm>
+        </p:spPr>
         <p:txBody>
           <a:bodyPr>
             <a:normAutofit/>
@@ -26537,52 +27802,24 @@
             <a:pPr marL="109728" indent="0" algn="ctr">
               <a:buNone/>
             </a:pPr>
-            <a:r>
+            <a:br>
               <a:rPr lang="pt-BR" dirty="0"/>
-              <a:t>"Jogos são simulações de tempo real baseadas em agentes"</a:t>
+            </a:br>
+            <a:r>
+              <a:rPr lang="pt-BR" sz="2400" dirty="0"/>
+              <a:t>"Jogos são simulações de tempo real </a:t>
+            </a:r>
+            <a:br>
+              <a:rPr lang="pt-BR" sz="2400" dirty="0"/>
+            </a:br>
+            <a:r>
+              <a:rPr lang="pt-BR" sz="2400" dirty="0"/>
+              <a:t>baseadas em agentes"</a:t>
             </a:r>
             <a:br>
               <a:rPr lang="pt-BR" dirty="0"/>
             </a:br>
             <a:endParaRPr lang="pt-BR" dirty="0"/>
-          </a:p>
-          <a:p>
-            <a:pPr lvl="1"/>
-            <a:r>
-              <a:rPr lang="pt-BR" sz="2000" dirty="0">
-                <a:solidFill>
-                  <a:schemeClr val="accent1">
-                    <a:lumMod val="75000"/>
-                  </a:schemeClr>
-                </a:solidFill>
-              </a:rPr>
-              <a:t>Simulações</a:t>
-            </a:r>
-            <a:r>
-              <a:rPr lang="pt-BR" sz="2000" dirty="0"/>
-              <a:t>: normalmente algum subconjunto do mundo real ou imaginário é modelado matematicamente</a:t>
-            </a:r>
-            <a:br>
-              <a:rPr lang="pt-BR" sz="2000" dirty="0"/>
-            </a:br>
-            <a:endParaRPr lang="pt-BR" sz="2000" dirty="0"/>
-          </a:p>
-          <a:p>
-            <a:pPr lvl="1"/>
-            <a:r>
-              <a:rPr lang="pt-BR" sz="2000" dirty="0">
-                <a:solidFill>
-                  <a:schemeClr val="accent1">
-                    <a:lumMod val="75000"/>
-                  </a:schemeClr>
-                </a:solidFill>
-              </a:rPr>
-              <a:t>Tempo real</a:t>
-            </a:r>
-            <a:r>
-              <a:rPr lang="pt-BR" sz="2000" dirty="0"/>
-              <a:t>: a tela deve ser atualizada a pelo menos 30 quadros/segundos para fornecer uma ilusão de movimento</a:t>
-            </a:r>
           </a:p>
           <a:p>
             <a:pPr lvl="1"/>
@@ -26593,27 +27830,6 @@
                 </a:schemeClr>
               </a:solidFill>
             </a:endParaRPr>
-          </a:p>
-          <a:p>
-            <a:pPr lvl="1"/>
-            <a:r>
-              <a:rPr lang="pt-BR" sz="2000" dirty="0">
-                <a:solidFill>
-                  <a:schemeClr val="accent1">
-                    <a:lumMod val="75000"/>
-                  </a:schemeClr>
-                </a:solidFill>
-              </a:rPr>
-              <a:t>Baseadas em agentes</a:t>
-            </a:r>
-            <a:r>
-              <a:rPr lang="pt-BR" sz="2000" dirty="0"/>
-              <a:t>: um número de entidades diferentes interage entre si. Os agentes são personagens, veículos, obstáculos, etc.</a:t>
-            </a:r>
-            <a:br>
-              <a:rPr lang="pt-BR" sz="2000" dirty="0"/>
-            </a:br>
-            <a:endParaRPr lang="pt-BR" sz="2000" dirty="0"/>
           </a:p>
         </p:txBody>
       </p:sp>
@@ -26636,6 +27852,351 @@
               <a:rPr lang="pt-BR" dirty="0"/>
               <a:t>Introdução</a:t>
             </a:r>
+          </a:p>
+        </p:txBody>
+      </p:sp>
+      <p:graphicFrame>
+        <p:nvGraphicFramePr>
+          <p:cNvPr id="5" name="Tabela 5">
+            <a:extLst>
+              <a:ext uri="{FF2B5EF4-FFF2-40B4-BE49-F238E27FC236}">
+                <a16:creationId xmlns:a16="http://schemas.microsoft.com/office/drawing/2014/main" id="{31E1DB1B-0778-4F4C-9140-0A21A28EF4DA}"/>
+              </a:ext>
+            </a:extLst>
+          </p:cNvPr>
+          <p:cNvGraphicFramePr>
+            <a:graphicFrameLocks noGrp="1"/>
+          </p:cNvGraphicFramePr>
+          <p:nvPr>
+            <p:extLst>
+              <p:ext uri="{D42A27DB-BD31-4B8C-83A1-F6EECF244321}">
+                <p14:modId xmlns:p14="http://schemas.microsoft.com/office/powerpoint/2010/main" val="1264957679"/>
+              </p:ext>
+            </p:extLst>
+          </p:nvPr>
+        </p:nvGraphicFramePr>
+        <p:xfrm>
+          <a:off x="745196" y="3294572"/>
+          <a:ext cx="10441160" cy="2712720"/>
+        </p:xfrm>
+        <a:graphic>
+          <a:graphicData uri="http://schemas.openxmlformats.org/drawingml/2006/table">
+            <a:tbl>
+              <a:tblPr firstRow="1" bandRow="1">
+                <a:tableStyleId>{2D5ABB26-0587-4C30-8999-92F81FD0307C}</a:tableStyleId>
+              </a:tblPr>
+              <a:tblGrid>
+                <a:gridCol w="3063391">
+                  <a:extLst>
+                    <a:ext uri="{9D8B030D-6E8A-4147-A177-3AD203B41FA5}">
+                      <a16:colId xmlns:a16="http://schemas.microsoft.com/office/drawing/2014/main" val="3407480704"/>
+                    </a:ext>
+                  </a:extLst>
+                </a:gridCol>
+                <a:gridCol w="7377769">
+                  <a:extLst>
+                    <a:ext uri="{9D8B030D-6E8A-4147-A177-3AD203B41FA5}">
+                      <a16:colId xmlns:a16="http://schemas.microsoft.com/office/drawing/2014/main" val="23732999"/>
+                    </a:ext>
+                  </a:extLst>
+                </a:gridCol>
+              </a:tblGrid>
+              <a:tr h="370840">
+                <a:tc>
+                  <a:txBody>
+                    <a:bodyPr/>
+                    <a:lstStyle/>
+                    <a:p>
+                      <a:pPr algn="r"/>
+                      <a:r>
+                        <a:rPr lang="pt-BR" sz="2000" dirty="0">
+                          <a:solidFill>
+                            <a:schemeClr val="accent1">
+                              <a:lumMod val="75000"/>
+                            </a:schemeClr>
+                          </a:solidFill>
+                        </a:rPr>
+                        <a:t>Simulações:</a:t>
+                      </a:r>
+                      <a:endParaRPr lang="pt-BR" sz="2000" dirty="0"/>
+                    </a:p>
+                  </a:txBody>
+                  <a:tcPr/>
+                </a:tc>
+                <a:tc>
+                  <a:txBody>
+                    <a:bodyPr/>
+                    <a:lstStyle/>
+                    <a:p>
+                      <a:r>
+                        <a:rPr lang="pt-BR" sz="2000" dirty="0">
+                          <a:solidFill>
+                            <a:schemeClr val="tx2">
+                              <a:lumMod val="60000"/>
+                              <a:lumOff val="40000"/>
+                            </a:schemeClr>
+                          </a:solidFill>
+                        </a:rPr>
+                        <a:t>normalmente algum subconjunto do mundo real </a:t>
+                      </a:r>
+                      <a:br>
+                        <a:rPr lang="pt-BR" sz="2000" dirty="0">
+                          <a:solidFill>
+                            <a:schemeClr val="tx2">
+                              <a:lumMod val="60000"/>
+                              <a:lumOff val="40000"/>
+                            </a:schemeClr>
+                          </a:solidFill>
+                        </a:rPr>
+                      </a:br>
+                      <a:r>
+                        <a:rPr lang="pt-BR" sz="2000" dirty="0">
+                          <a:solidFill>
+                            <a:schemeClr val="tx2">
+                              <a:lumMod val="60000"/>
+                              <a:lumOff val="40000"/>
+                            </a:schemeClr>
+                          </a:solidFill>
+                        </a:rPr>
+                        <a:t>ou imaginário é modelado matematicamente</a:t>
+                      </a:r>
+                      <a:br>
+                        <a:rPr lang="pt-BR" sz="2000" dirty="0">
+                          <a:solidFill>
+                            <a:schemeClr val="tx2">
+                              <a:lumMod val="60000"/>
+                              <a:lumOff val="40000"/>
+                            </a:schemeClr>
+                          </a:solidFill>
+                        </a:rPr>
+                      </a:br>
+                      <a:endParaRPr lang="pt-BR" sz="2000" dirty="0">
+                        <a:solidFill>
+                          <a:schemeClr val="tx2">
+                            <a:lumMod val="60000"/>
+                            <a:lumOff val="40000"/>
+                          </a:schemeClr>
+                        </a:solidFill>
+                      </a:endParaRPr>
+                    </a:p>
+                  </a:txBody>
+                  <a:tcPr/>
+                </a:tc>
+                <a:extLst>
+                  <a:ext uri="{0D108BD9-81ED-4DB2-BD59-A6C34878D82A}">
+                    <a16:rowId xmlns:a16="http://schemas.microsoft.com/office/drawing/2014/main" val="1981101885"/>
+                  </a:ext>
+                </a:extLst>
+              </a:tr>
+              <a:tr h="370840">
+                <a:tc>
+                  <a:txBody>
+                    <a:bodyPr/>
+                    <a:lstStyle/>
+                    <a:p>
+                      <a:pPr algn="r"/>
+                      <a:r>
+                        <a:rPr lang="pt-BR" sz="2000" dirty="0">
+                          <a:solidFill>
+                            <a:schemeClr val="accent1">
+                              <a:lumMod val="75000"/>
+                            </a:schemeClr>
+                          </a:solidFill>
+                        </a:rPr>
+                        <a:t>Tempo real:</a:t>
+                      </a:r>
+                      <a:endParaRPr lang="pt-BR" sz="2000" dirty="0"/>
+                    </a:p>
+                  </a:txBody>
+                  <a:tcPr/>
+                </a:tc>
+                <a:tc>
+                  <a:txBody>
+                    <a:bodyPr/>
+                    <a:lstStyle/>
+                    <a:p>
+                      <a:r>
+                        <a:rPr lang="pt-BR" sz="2000" dirty="0">
+                          <a:solidFill>
+                            <a:schemeClr val="tx2">
+                              <a:lumMod val="60000"/>
+                              <a:lumOff val="40000"/>
+                            </a:schemeClr>
+                          </a:solidFill>
+                        </a:rPr>
+                        <a:t>a tela deve ser atualizada a pelo menos 30 quadros </a:t>
+                      </a:r>
+                      <a:br>
+                        <a:rPr lang="pt-BR" sz="2000" dirty="0">
+                          <a:solidFill>
+                            <a:schemeClr val="tx2">
+                              <a:lumMod val="60000"/>
+                              <a:lumOff val="40000"/>
+                            </a:schemeClr>
+                          </a:solidFill>
+                        </a:rPr>
+                      </a:br>
+                      <a:r>
+                        <a:rPr lang="pt-BR" sz="2000" dirty="0">
+                          <a:solidFill>
+                            <a:schemeClr val="tx2">
+                              <a:lumMod val="60000"/>
+                              <a:lumOff val="40000"/>
+                            </a:schemeClr>
+                          </a:solidFill>
+                        </a:rPr>
+                        <a:t>por segundos para fornecer a ilusão de movimento</a:t>
+                      </a:r>
+                      <a:br>
+                        <a:rPr lang="pt-BR" sz="2000" dirty="0">
+                          <a:solidFill>
+                            <a:schemeClr val="tx2">
+                              <a:lumMod val="60000"/>
+                              <a:lumOff val="40000"/>
+                            </a:schemeClr>
+                          </a:solidFill>
+                        </a:rPr>
+                      </a:br>
+                      <a:endParaRPr lang="pt-BR" sz="2000" dirty="0">
+                        <a:solidFill>
+                          <a:schemeClr val="tx2">
+                            <a:lumMod val="60000"/>
+                            <a:lumOff val="40000"/>
+                          </a:schemeClr>
+                        </a:solidFill>
+                      </a:endParaRPr>
+                    </a:p>
+                  </a:txBody>
+                  <a:tcPr/>
+                </a:tc>
+                <a:extLst>
+                  <a:ext uri="{0D108BD9-81ED-4DB2-BD59-A6C34878D82A}">
+                    <a16:rowId xmlns:a16="http://schemas.microsoft.com/office/drawing/2014/main" val="605891788"/>
+                  </a:ext>
+                </a:extLst>
+              </a:tr>
+              <a:tr h="370840">
+                <a:tc>
+                  <a:txBody>
+                    <a:bodyPr/>
+                    <a:lstStyle/>
+                    <a:p>
+                      <a:pPr algn="r"/>
+                      <a:r>
+                        <a:rPr lang="pt-BR" sz="2000" dirty="0">
+                          <a:solidFill>
+                            <a:schemeClr val="accent1">
+                              <a:lumMod val="75000"/>
+                            </a:schemeClr>
+                          </a:solidFill>
+                        </a:rPr>
+                        <a:t>Baseadas em agentes:</a:t>
+                      </a:r>
+                      <a:endParaRPr lang="pt-BR" sz="2000" dirty="0"/>
+                    </a:p>
+                  </a:txBody>
+                  <a:tcPr/>
+                </a:tc>
+                <a:tc>
+                  <a:txBody>
+                    <a:bodyPr/>
+                    <a:lstStyle/>
+                    <a:p>
+                      <a:r>
+                        <a:rPr lang="pt-BR" sz="2000" dirty="0">
+                          <a:solidFill>
+                            <a:schemeClr val="tx2">
+                              <a:lumMod val="60000"/>
+                              <a:lumOff val="40000"/>
+                            </a:schemeClr>
+                          </a:solidFill>
+                        </a:rPr>
+                        <a:t>um número de entidades diferentes interage entre si. </a:t>
+                      </a:r>
+                      <a:br>
+                        <a:rPr lang="pt-BR" sz="2000" dirty="0">
+                          <a:solidFill>
+                            <a:schemeClr val="tx2">
+                              <a:lumMod val="60000"/>
+                              <a:lumOff val="40000"/>
+                            </a:schemeClr>
+                          </a:solidFill>
+                        </a:rPr>
+                      </a:br>
+                      <a:r>
+                        <a:rPr lang="pt-BR" sz="2000" dirty="0">
+                          <a:solidFill>
+                            <a:schemeClr val="tx2">
+                              <a:lumMod val="60000"/>
+                              <a:lumOff val="40000"/>
+                            </a:schemeClr>
+                          </a:solidFill>
+                        </a:rPr>
+                        <a:t>Os agentes são personagens, veículos, obstáculos, etc.</a:t>
+                      </a:r>
+                    </a:p>
+                  </a:txBody>
+                  <a:tcPr/>
+                </a:tc>
+                <a:extLst>
+                  <a:ext uri="{0D108BD9-81ED-4DB2-BD59-A6C34878D82A}">
+                    <a16:rowId xmlns:a16="http://schemas.microsoft.com/office/drawing/2014/main" val="3707308476"/>
+                  </a:ext>
+                </a:extLst>
+              </a:tr>
+            </a:tbl>
+          </a:graphicData>
+        </a:graphic>
+      </p:graphicFrame>
+      <p:sp>
+        <p:nvSpPr>
+          <p:cNvPr id="6" name="Retângulo: Cantos Arredondados 5">
+            <a:extLst>
+              <a:ext uri="{FF2B5EF4-FFF2-40B4-BE49-F238E27FC236}">
+                <a16:creationId xmlns:a16="http://schemas.microsoft.com/office/drawing/2014/main" id="{10467B17-1DE6-4369-AE55-98696AAE2236}"/>
+              </a:ext>
+            </a:extLst>
+          </p:cNvPr>
+          <p:cNvSpPr/>
+          <p:nvPr/>
+        </p:nvSpPr>
+        <p:spPr>
+          <a:xfrm>
+            <a:off x="2927648" y="1700808"/>
+            <a:ext cx="6264696" cy="1224136"/>
+          </a:xfrm>
+          <a:prstGeom prst="roundRect">
+            <a:avLst/>
+          </a:prstGeom>
+          <a:noFill/>
+          <a:ln>
+            <a:solidFill>
+              <a:schemeClr val="tx2">
+                <a:lumMod val="75000"/>
+              </a:schemeClr>
+            </a:solidFill>
+          </a:ln>
+        </p:spPr>
+        <p:style>
+          <a:lnRef idx="1">
+            <a:schemeClr val="accent1"/>
+          </a:lnRef>
+          <a:fillRef idx="3">
+            <a:schemeClr val="accent1"/>
+          </a:fillRef>
+          <a:effectRef idx="2">
+            <a:schemeClr val="accent1"/>
+          </a:effectRef>
+          <a:fontRef idx="minor">
+            <a:schemeClr val="lt1"/>
+          </a:fontRef>
+        </p:style>
+        <p:txBody>
+          <a:bodyPr rtlCol="0" anchor="ctr"/>
+          <a:lstStyle/>
+          <a:p>
+            <a:pPr algn="ctr"/>
+            <a:endParaRPr lang="pt-BR"/>
           </a:p>
         </p:txBody>
       </p:sp>
@@ -26691,14 +28252,15 @@
           </a:bodyPr>
           <a:lstStyle/>
           <a:p>
+            <a:pPr>
+              <a:spcAft>
+                <a:spcPts val="1800"/>
+              </a:spcAft>
+            </a:pPr>
             <a:r>
               <a:rPr lang="pt-BR" dirty="0"/>
               <a:t>Quais os passos para desenvolver um jogo?</a:t>
             </a:r>
-            <a:br>
-              <a:rPr lang="pt-BR" dirty="0"/>
-            </a:br>
-            <a:endParaRPr lang="pt-BR" dirty="0"/>
           </a:p>
           <a:p>
             <a:pPr lvl="1"/>
@@ -26735,7 +28297,7 @@
             <a:pPr lvl="2"/>
             <a:r>
               <a:rPr lang="pt-BR" dirty="0"/>
-              <a:t>Mecânicas do jogo, etc. </a:t>
+              <a:t>Mecânicas, etc. </a:t>
             </a:r>
           </a:p>
           <a:p>
@@ -26964,32 +28526,37 @@
         </p:nvGrpSpPr>
         <p:grpSpPr>
           <a:xfrm>
-            <a:off x="2047708" y="2420888"/>
-            <a:ext cx="8152749" cy="3015044"/>
+            <a:off x="1631504" y="2420888"/>
+            <a:ext cx="8568952" cy="3015044"/>
             <a:chOff x="2047708" y="2420888"/>
-            <a:chExt cx="8152749" cy="3015044"/>
+            <a:chExt cx="8568952" cy="3015044"/>
           </a:xfrm>
         </p:grpSpPr>
         <p:cxnSp>
           <p:nvCxnSpPr>
             <p:cNvPr id="13" name="Conector reto 12"/>
             <p:cNvCxnSpPr>
+              <a:cxnSpLocks/>
               <a:stCxn id="16" idx="3"/>
             </p:cNvCxnSpPr>
             <p:nvPr/>
           </p:nvCxnSpPr>
           <p:spPr>
             <a:xfrm flipV="1">
-              <a:off x="3694314" y="3510533"/>
-              <a:ext cx="6498683" cy="821"/>
+              <a:off x="3694314" y="3510535"/>
+              <a:ext cx="6914886" cy="818"/>
             </a:xfrm>
             <a:prstGeom prst="line">
               <a:avLst/>
             </a:prstGeom>
             <a:ln>
               <a:solidFill>
-                <a:schemeClr val="bg1"/>
+                <a:schemeClr val="bg1">
+                  <a:lumMod val="75000"/>
+                </a:schemeClr>
               </a:solidFill>
+              <a:headEnd type="none"/>
+              <a:tailEnd type="oval"/>
             </a:ln>
           </p:spPr>
           <p:style>
@@ -27011,6 +28578,7 @@
           <p:nvCxnSpPr>
             <p:cNvPr id="14" name="Conector reto 13"/>
             <p:cNvCxnSpPr>
+              <a:cxnSpLocks/>
               <a:stCxn id="17" idx="3"/>
             </p:cNvCxnSpPr>
             <p:nvPr/>
@@ -27018,15 +28586,19 @@
           <p:spPr>
             <a:xfrm>
               <a:off x="3960412" y="4355812"/>
-              <a:ext cx="6232585" cy="0"/>
+              <a:ext cx="6648788" cy="0"/>
             </a:xfrm>
             <a:prstGeom prst="line">
               <a:avLst/>
             </a:prstGeom>
             <a:ln>
               <a:solidFill>
-                <a:schemeClr val="bg1"/>
+                <a:schemeClr val="bg1">
+                  <a:lumMod val="75000"/>
+                </a:schemeClr>
               </a:solidFill>
+              <a:headEnd type="none"/>
+              <a:tailEnd type="oval"/>
             </a:ln>
           </p:spPr>
           <p:style>
@@ -27048,6 +28620,7 @@
           <p:nvCxnSpPr>
             <p:cNvPr id="15" name="Conector reto 14"/>
             <p:cNvCxnSpPr>
+              <a:cxnSpLocks/>
               <a:stCxn id="18" idx="3"/>
             </p:cNvCxnSpPr>
             <p:nvPr/>
@@ -27055,15 +28628,19 @@
           <p:spPr>
             <a:xfrm flipV="1">
               <a:off x="3920338" y="5138202"/>
-              <a:ext cx="6280119" cy="9698"/>
+              <a:ext cx="6696322" cy="9698"/>
             </a:xfrm>
             <a:prstGeom prst="line">
               <a:avLst/>
             </a:prstGeom>
             <a:ln>
               <a:solidFill>
-                <a:schemeClr val="bg1"/>
+                <a:schemeClr val="bg1">
+                  <a:lumMod val="75000"/>
+                </a:schemeClr>
               </a:solidFill>
+              <a:headEnd type="none"/>
+              <a:tailEnd type="oval"/>
             </a:ln>
           </p:spPr>
           <p:style>
@@ -27085,6 +28662,7 @@
           <p:nvCxnSpPr>
             <p:cNvPr id="12" name="Conector reto 11"/>
             <p:cNvCxnSpPr>
+              <a:cxnSpLocks/>
               <a:stCxn id="10" idx="3"/>
             </p:cNvCxnSpPr>
             <p:nvPr/>
@@ -27092,15 +28670,19 @@
           <p:spPr>
             <a:xfrm>
               <a:off x="4248952" y="2708920"/>
-              <a:ext cx="5944044" cy="0"/>
+              <a:ext cx="6360247" cy="0"/>
             </a:xfrm>
             <a:prstGeom prst="line">
               <a:avLst/>
             </a:prstGeom>
             <a:ln>
               <a:solidFill>
-                <a:schemeClr val="bg1"/>
+                <a:schemeClr val="bg1">
+                  <a:lumMod val="75000"/>
+                </a:schemeClr>
               </a:solidFill>
+              <a:headEnd type="none"/>
+              <a:tailEnd type="oval"/>
             </a:ln>
           </p:spPr>
           <p:style>
@@ -27626,7 +29208,14 @@
             </a:r>
             <a:r>
               <a:rPr lang="pt-BR" dirty="0"/>
-              <a:t>exige mais do que apenas saber programar:</a:t>
+              <a:t>exige mais do que </a:t>
+            </a:r>
+            <a:br>
+              <a:rPr lang="pt-BR" dirty="0"/>
+            </a:br>
+            <a:r>
+              <a:rPr lang="pt-BR" dirty="0"/>
+              <a:t>apenas saber programar:</a:t>
             </a:r>
             <a:br>
               <a:rPr lang="pt-BR" dirty="0"/>
@@ -27670,7 +29259,14 @@
             </a:br>
             <a:r>
               <a:rPr lang="pt-BR" dirty="0"/>
-              <a:t>fadados a descobrir por tentativa e erro ou copiar fórmulas de sucesso" </a:t>
+              <a:t>fadados a descobrir por tentativa e erro </a:t>
+            </a:r>
+            <a:br>
+              <a:rPr lang="pt-BR" dirty="0"/>
+            </a:br>
+            <a:r>
+              <a:rPr lang="pt-BR" dirty="0"/>
+              <a:t>ou copiar fórmulas de sucesso" </a:t>
             </a:r>
           </a:p>
           <a:p>
@@ -27685,47 +29281,7 @@
                   </a:schemeClr>
                 </a:solidFill>
               </a:rPr>
-              <a:t>– </a:t>
-            </a:r>
-            <a:r>
-              <a:rPr lang="pt-BR" sz="2000" dirty="0" err="1">
-                <a:solidFill>
-                  <a:schemeClr val="accent1">
-                    <a:lumMod val="50000"/>
-                  </a:schemeClr>
-                </a:solidFill>
-              </a:rPr>
-              <a:t>Noah</a:t>
-            </a:r>
-            <a:r>
-              <a:rPr lang="pt-BR" sz="2000" dirty="0">
-                <a:solidFill>
-                  <a:schemeClr val="accent1">
-                    <a:lumMod val="50000"/>
-                  </a:schemeClr>
-                </a:solidFill>
-              </a:rPr>
-              <a:t> </a:t>
-            </a:r>
-            <a:r>
-              <a:rPr lang="pt-BR" sz="2000" dirty="0" err="1">
-                <a:solidFill>
-                  <a:schemeClr val="accent1">
-                    <a:lumMod val="50000"/>
-                  </a:schemeClr>
-                </a:solidFill>
-              </a:rPr>
-              <a:t>Falstein</a:t>
-            </a:r>
-            <a:r>
-              <a:rPr lang="pt-BR" sz="2000" dirty="0">
-                <a:solidFill>
-                  <a:schemeClr val="accent1">
-                    <a:lumMod val="50000"/>
-                  </a:schemeClr>
-                </a:solidFill>
-              </a:rPr>
-              <a:t> (Game Designer)</a:t>
+              <a:t>– Noah Falstein (Game Designer)</a:t>
             </a:r>
           </a:p>
         </p:txBody>
@@ -27833,7 +29389,14 @@
           <a:p>
             <a:r>
               <a:rPr lang="pt-BR" dirty="0"/>
-              <a:t>A diversão tem raízes ancestrais nas atividades relacionadas a sobrevivência: </a:t>
+              <a:t>A diversão tem raízes ancestrais nas atividades </a:t>
+            </a:r>
+            <a:br>
+              <a:rPr lang="pt-BR" dirty="0"/>
+            </a:br>
+            <a:r>
+              <a:rPr lang="pt-BR" dirty="0"/>
+              <a:t>relacionadas a sobrevivência: </a:t>
             </a:r>
             <a:r>
               <a:rPr lang="pt-BR" dirty="0">
@@ -27977,7 +29540,14 @@
             </a:r>
             <a:r>
               <a:rPr lang="pt-BR" dirty="0"/>
-              <a:t> – se baseia em fugir dos predadores enquanto coleta comida e caçar os predadores quando se ganha força suficiente</a:t>
+              <a:t> – se baseia em fugir dos predadores enquanto coleta </a:t>
+            </a:r>
+            <a:br>
+              <a:rPr lang="pt-BR" dirty="0"/>
+            </a:br>
+            <a:r>
+              <a:rPr lang="pt-BR" dirty="0"/>
+              <a:t>comida e caçar os predadores quando se ganha força suficiente</a:t>
             </a:r>
           </a:p>
         </p:txBody>
@@ -28012,7 +29582,7 @@
         </p:nvGrpSpPr>
         <p:grpSpPr>
           <a:xfrm>
-            <a:off x="2971964" y="3717032"/>
+            <a:off x="2495600" y="3501008"/>
             <a:ext cx="6148372" cy="2664296"/>
             <a:chOff x="2971964" y="3717032"/>
             <a:chExt cx="6148372" cy="2664296"/>

</xml_diff>

<commit_message>
Semestre 2021.1: slides 00 e 01
</commit_message>
<xml_diff>
--- a/Slides/00. Introdução.pptx
+++ b/Slides/00. Introdução.pptx
@@ -164,7 +164,8 @@
 <file path=ppt/revisionInfo.xml><?xml version="1.0" encoding="utf-8"?>
 <p1510:revInfo xmlns:a="http://schemas.openxmlformats.org/drawingml/2006/main" xmlns:r="http://schemas.openxmlformats.org/officeDocument/2006/relationships" xmlns:p1510="http://schemas.microsoft.com/office/powerpoint/2015/10/main">
   <p1510:revLst>
-    <p1510:client id="{892A6213-B575-4955-849D-E82EBCE1248D}" v="20" dt="2021-07-06T04:09:30.210"/>
+    <p1510:client id="{892A6213-B575-4955-849D-E82EBCE1248D}" v="1" dt="2021-07-14T21:37:56.219"/>
+    <p1510:client id="{CAB01854-B122-694C-83D2-432F27D90619}" v="3" dt="2021-07-14T18:34:58.327"/>
   </p1510:revLst>
 </p1510:revInfo>
 </file>
@@ -172,14 +173,456 @@
 <file path=ppt/changesInfos/changesInfo1.xml><?xml version="1.0" encoding="utf-8"?>
 <pc:chgInfo xmlns:a="http://schemas.openxmlformats.org/drawingml/2006/main" xmlns:r="http://schemas.openxmlformats.org/officeDocument/2006/relationships" xmlns:ac="http://schemas.microsoft.com/office/drawing/2013/main/command" xmlns:pc="http://schemas.microsoft.com/office/powerpoint/2013/main/command">
   <pc:docChgLst>
-    <pc:chgData name="Judson Santiago" userId="ebb108da2f256286" providerId="LiveId" clId="{892A6213-B575-4955-849D-E82EBCE1248D}"/>
-    <pc:docChg chg="undo redo custSel modSld modMainMaster">
-      <pc:chgData name="Judson Santiago" userId="ebb108da2f256286" providerId="LiveId" clId="{892A6213-B575-4955-849D-E82EBCE1248D}" dt="2021-07-06T04:09:32.239" v="533" actId="21"/>
+    <pc:chgData name="Judson Santiago" userId="ebb108da2f256286" providerId="LiveId" clId="{CAB01854-B122-694C-83D2-432F27D90619}"/>
+    <pc:docChg chg="undo custSel modSld modMainMaster">
+      <pc:chgData name="Judson Santiago" userId="ebb108da2f256286" providerId="LiveId" clId="{CAB01854-B122-694C-83D2-432F27D90619}" dt="2021-07-14T18:34:58.326" v="16"/>
       <pc:docMkLst>
         <pc:docMk/>
       </pc:docMkLst>
-      <pc:sldChg chg="modSp mod">
-        <pc:chgData name="Judson Santiago" userId="ebb108da2f256286" providerId="LiveId" clId="{892A6213-B575-4955-849D-E82EBCE1248D}" dt="2021-07-06T04:08:19.309" v="531" actId="20577"/>
+      <pc:sldChg chg="modSp mod modTransition">
+        <pc:chgData name="Judson Santiago" userId="ebb108da2f256286" providerId="LiveId" clId="{CAB01854-B122-694C-83D2-432F27D90619}" dt="2021-07-11T23:14:39.043" v="12"/>
+        <pc:sldMkLst>
+          <pc:docMk/>
+          <pc:sldMk cId="0" sldId="256"/>
+        </pc:sldMkLst>
+        <pc:spChg chg="mod">
+          <ac:chgData name="Judson Santiago" userId="ebb108da2f256286" providerId="LiveId" clId="{CAB01854-B122-694C-83D2-432F27D90619}" dt="2021-07-11T23:05:16.721" v="3" actId="403"/>
+          <ac:spMkLst>
+            <pc:docMk/>
+            <pc:sldMk cId="0" sldId="256"/>
+            <ac:spMk id="2" creationId="{00000000-0000-0000-0000-000000000000}"/>
+          </ac:spMkLst>
+        </pc:spChg>
+        <pc:spChg chg="mod">
+          <ac:chgData name="Judson Santiago" userId="ebb108da2f256286" providerId="LiveId" clId="{CAB01854-B122-694C-83D2-432F27D90619}" dt="2021-07-11T23:05:16.721" v="3" actId="403"/>
+          <ac:spMkLst>
+            <pc:docMk/>
+            <pc:sldMk cId="0" sldId="256"/>
+            <ac:spMk id="3" creationId="{00000000-0000-0000-0000-000000000000}"/>
+          </ac:spMkLst>
+        </pc:spChg>
+      </pc:sldChg>
+      <pc:sldChg chg="modTransition">
+        <pc:chgData name="Judson Santiago" userId="ebb108da2f256286" providerId="LiveId" clId="{CAB01854-B122-694C-83D2-432F27D90619}" dt="2021-07-11T23:10:45.691" v="8"/>
+        <pc:sldMkLst>
+          <pc:docMk/>
+          <pc:sldMk cId="1646120797" sldId="257"/>
+        </pc:sldMkLst>
+      </pc:sldChg>
+      <pc:sldChg chg="modTransition">
+        <pc:chgData name="Judson Santiago" userId="ebb108da2f256286" providerId="LiveId" clId="{CAB01854-B122-694C-83D2-432F27D90619}" dt="2021-07-11T23:11:39.445" v="9"/>
+        <pc:sldMkLst>
+          <pc:docMk/>
+          <pc:sldMk cId="3825172895" sldId="258"/>
+        </pc:sldMkLst>
+      </pc:sldChg>
+      <pc:sldChg chg="modTransition">
+        <pc:chgData name="Judson Santiago" userId="ebb108da2f256286" providerId="LiveId" clId="{CAB01854-B122-694C-83D2-432F27D90619}" dt="2021-07-11T23:11:39.445" v="9"/>
+        <pc:sldMkLst>
+          <pc:docMk/>
+          <pc:sldMk cId="229696289" sldId="259"/>
+        </pc:sldMkLst>
+      </pc:sldChg>
+      <pc:sldChg chg="modTransition">
+        <pc:chgData name="Judson Santiago" userId="ebb108da2f256286" providerId="LiveId" clId="{CAB01854-B122-694C-83D2-432F27D90619}" dt="2021-07-11T23:11:39.445" v="9"/>
+        <pc:sldMkLst>
+          <pc:docMk/>
+          <pc:sldMk cId="950544423" sldId="260"/>
+        </pc:sldMkLst>
+      </pc:sldChg>
+      <pc:sldChg chg="modTransition">
+        <pc:chgData name="Judson Santiago" userId="ebb108da2f256286" providerId="LiveId" clId="{CAB01854-B122-694C-83D2-432F27D90619}" dt="2021-07-11T23:11:39.445" v="9"/>
+        <pc:sldMkLst>
+          <pc:docMk/>
+          <pc:sldMk cId="926871459" sldId="261"/>
+        </pc:sldMkLst>
+      </pc:sldChg>
+      <pc:sldChg chg="modTransition">
+        <pc:chgData name="Judson Santiago" userId="ebb108da2f256286" providerId="LiveId" clId="{CAB01854-B122-694C-83D2-432F27D90619}" dt="2021-07-11T23:11:39.445" v="9"/>
+        <pc:sldMkLst>
+          <pc:docMk/>
+          <pc:sldMk cId="3874163093" sldId="262"/>
+        </pc:sldMkLst>
+      </pc:sldChg>
+      <pc:sldChg chg="modTransition">
+        <pc:chgData name="Judson Santiago" userId="ebb108da2f256286" providerId="LiveId" clId="{CAB01854-B122-694C-83D2-432F27D90619}" dt="2021-07-11T23:11:39.445" v="9"/>
+        <pc:sldMkLst>
+          <pc:docMk/>
+          <pc:sldMk cId="2964675404" sldId="263"/>
+        </pc:sldMkLst>
+      </pc:sldChg>
+      <pc:sldChg chg="modTransition">
+        <pc:chgData name="Judson Santiago" userId="ebb108da2f256286" providerId="LiveId" clId="{CAB01854-B122-694C-83D2-432F27D90619}" dt="2021-07-11T23:11:39.445" v="9"/>
+        <pc:sldMkLst>
+          <pc:docMk/>
+          <pc:sldMk cId="2507631774" sldId="264"/>
+        </pc:sldMkLst>
+      </pc:sldChg>
+      <pc:sldChg chg="modTransition">
+        <pc:chgData name="Judson Santiago" userId="ebb108da2f256286" providerId="LiveId" clId="{CAB01854-B122-694C-83D2-432F27D90619}" dt="2021-07-11T23:11:39.445" v="9"/>
+        <pc:sldMkLst>
+          <pc:docMk/>
+          <pc:sldMk cId="1844711731" sldId="265"/>
+        </pc:sldMkLst>
+      </pc:sldChg>
+      <pc:sldChg chg="modTransition">
+        <pc:chgData name="Judson Santiago" userId="ebb108da2f256286" providerId="LiveId" clId="{CAB01854-B122-694C-83D2-432F27D90619}" dt="2021-07-11T23:11:39.445" v="9"/>
+        <pc:sldMkLst>
+          <pc:docMk/>
+          <pc:sldMk cId="4187815433" sldId="266"/>
+        </pc:sldMkLst>
+      </pc:sldChg>
+      <pc:sldChg chg="modTransition">
+        <pc:chgData name="Judson Santiago" userId="ebb108da2f256286" providerId="LiveId" clId="{CAB01854-B122-694C-83D2-432F27D90619}" dt="2021-07-11T23:11:39.445" v="9"/>
+        <pc:sldMkLst>
+          <pc:docMk/>
+          <pc:sldMk cId="457963254" sldId="267"/>
+        </pc:sldMkLst>
+      </pc:sldChg>
+      <pc:sldChg chg="modTransition">
+        <pc:chgData name="Judson Santiago" userId="ebb108da2f256286" providerId="LiveId" clId="{CAB01854-B122-694C-83D2-432F27D90619}" dt="2021-07-11T23:11:39.445" v="9"/>
+        <pc:sldMkLst>
+          <pc:docMk/>
+          <pc:sldMk cId="20598424" sldId="268"/>
+        </pc:sldMkLst>
+      </pc:sldChg>
+      <pc:sldChg chg="modSp modTransition">
+        <pc:chgData name="Judson Santiago" userId="ebb108da2f256286" providerId="LiveId" clId="{CAB01854-B122-694C-83D2-432F27D90619}" dt="2021-07-11T23:11:39.445" v="9"/>
+        <pc:sldMkLst>
+          <pc:docMk/>
+          <pc:sldMk cId="447932897" sldId="269"/>
+        </pc:sldMkLst>
+        <pc:picChg chg="mod">
+          <ac:chgData name="Judson Santiago" userId="ebb108da2f256286" providerId="LiveId" clId="{CAB01854-B122-694C-83D2-432F27D90619}" dt="2021-07-11T23:03:13.691" v="0"/>
+          <ac:picMkLst>
+            <pc:docMk/>
+            <pc:sldMk cId="447932897" sldId="269"/>
+            <ac:picMk id="4" creationId="{00000000-0000-0000-0000-000000000000}"/>
+          </ac:picMkLst>
+        </pc:picChg>
+      </pc:sldChg>
+      <pc:sldChg chg="modTransition">
+        <pc:chgData name="Judson Santiago" userId="ebb108da2f256286" providerId="LiveId" clId="{CAB01854-B122-694C-83D2-432F27D90619}" dt="2021-07-11T23:11:39.445" v="9"/>
+        <pc:sldMkLst>
+          <pc:docMk/>
+          <pc:sldMk cId="951175386" sldId="270"/>
+        </pc:sldMkLst>
+      </pc:sldChg>
+      <pc:sldChg chg="modTransition">
+        <pc:chgData name="Judson Santiago" userId="ebb108da2f256286" providerId="LiveId" clId="{CAB01854-B122-694C-83D2-432F27D90619}" dt="2021-07-11T23:11:39.445" v="9"/>
+        <pc:sldMkLst>
+          <pc:docMk/>
+          <pc:sldMk cId="3254275499" sldId="271"/>
+        </pc:sldMkLst>
+      </pc:sldChg>
+      <pc:sldChg chg="modTransition">
+        <pc:chgData name="Judson Santiago" userId="ebb108da2f256286" providerId="LiveId" clId="{CAB01854-B122-694C-83D2-432F27D90619}" dt="2021-07-11T23:11:39.445" v="9"/>
+        <pc:sldMkLst>
+          <pc:docMk/>
+          <pc:sldMk cId="814443891" sldId="273"/>
+        </pc:sldMkLst>
+      </pc:sldChg>
+      <pc:sldChg chg="modTransition">
+        <pc:chgData name="Judson Santiago" userId="ebb108da2f256286" providerId="LiveId" clId="{CAB01854-B122-694C-83D2-432F27D90619}" dt="2021-07-11T23:11:39.445" v="9"/>
+        <pc:sldMkLst>
+          <pc:docMk/>
+          <pc:sldMk cId="899213688" sldId="274"/>
+        </pc:sldMkLst>
+      </pc:sldChg>
+      <pc:sldChg chg="modTransition">
+        <pc:chgData name="Judson Santiago" userId="ebb108da2f256286" providerId="LiveId" clId="{CAB01854-B122-694C-83D2-432F27D90619}" dt="2021-07-11T23:11:39.445" v="9"/>
+        <pc:sldMkLst>
+          <pc:docMk/>
+          <pc:sldMk cId="3970567385" sldId="275"/>
+        </pc:sldMkLst>
+      </pc:sldChg>
+      <pc:sldChg chg="modTransition">
+        <pc:chgData name="Judson Santiago" userId="ebb108da2f256286" providerId="LiveId" clId="{CAB01854-B122-694C-83D2-432F27D90619}" dt="2021-07-11T23:11:39.445" v="9"/>
+        <pc:sldMkLst>
+          <pc:docMk/>
+          <pc:sldMk cId="3605239944" sldId="276"/>
+        </pc:sldMkLst>
+      </pc:sldChg>
+      <pc:sldChg chg="modTransition">
+        <pc:chgData name="Judson Santiago" userId="ebb108da2f256286" providerId="LiveId" clId="{CAB01854-B122-694C-83D2-432F27D90619}" dt="2021-07-11T23:11:39.445" v="9"/>
+        <pc:sldMkLst>
+          <pc:docMk/>
+          <pc:sldMk cId="1255073804" sldId="278"/>
+        </pc:sldMkLst>
+      </pc:sldChg>
+      <pc:sldChg chg="modTransition">
+        <pc:chgData name="Judson Santiago" userId="ebb108da2f256286" providerId="LiveId" clId="{CAB01854-B122-694C-83D2-432F27D90619}" dt="2021-07-11T23:11:39.445" v="9"/>
+        <pc:sldMkLst>
+          <pc:docMk/>
+          <pc:sldMk cId="727786704" sldId="279"/>
+        </pc:sldMkLst>
+      </pc:sldChg>
+      <pc:sldChg chg="modTransition">
+        <pc:chgData name="Judson Santiago" userId="ebb108da2f256286" providerId="LiveId" clId="{CAB01854-B122-694C-83D2-432F27D90619}" dt="2021-07-11T23:11:39.445" v="9"/>
+        <pc:sldMkLst>
+          <pc:docMk/>
+          <pc:sldMk cId="3611717784" sldId="280"/>
+        </pc:sldMkLst>
+      </pc:sldChg>
+      <pc:sldChg chg="modSp mod modTransition">
+        <pc:chgData name="Judson Santiago" userId="ebb108da2f256286" providerId="LiveId" clId="{CAB01854-B122-694C-83D2-432F27D90619}" dt="2021-07-11T23:11:39.445" v="9"/>
+        <pc:sldMkLst>
+          <pc:docMk/>
+          <pc:sldMk cId="12527219" sldId="285"/>
+        </pc:sldMkLst>
+        <pc:spChg chg="mod">
+          <ac:chgData name="Judson Santiago" userId="ebb108da2f256286" providerId="LiveId" clId="{CAB01854-B122-694C-83D2-432F27D90619}" dt="2021-07-11T23:08:12.546" v="5" actId="208"/>
+          <ac:spMkLst>
+            <pc:docMk/>
+            <pc:sldMk cId="12527219" sldId="285"/>
+            <ac:spMk id="8" creationId="{00000000-0000-0000-0000-000000000000}"/>
+          </ac:spMkLst>
+        </pc:spChg>
+        <pc:spChg chg="mod">
+          <ac:chgData name="Judson Santiago" userId="ebb108da2f256286" providerId="LiveId" clId="{CAB01854-B122-694C-83D2-432F27D90619}" dt="2021-07-11T23:08:12.546" v="5" actId="208"/>
+          <ac:spMkLst>
+            <pc:docMk/>
+            <pc:sldMk cId="12527219" sldId="285"/>
+            <ac:spMk id="13" creationId="{00000000-0000-0000-0000-000000000000}"/>
+          </ac:spMkLst>
+        </pc:spChg>
+        <pc:spChg chg="mod">
+          <ac:chgData name="Judson Santiago" userId="ebb108da2f256286" providerId="LiveId" clId="{CAB01854-B122-694C-83D2-432F27D90619}" dt="2021-07-11T23:08:12.546" v="5" actId="208"/>
+          <ac:spMkLst>
+            <pc:docMk/>
+            <pc:sldMk cId="12527219" sldId="285"/>
+            <ac:spMk id="18" creationId="{00000000-0000-0000-0000-000000000000}"/>
+          </ac:spMkLst>
+        </pc:spChg>
+        <pc:spChg chg="mod">
+          <ac:chgData name="Judson Santiago" userId="ebb108da2f256286" providerId="LiveId" clId="{CAB01854-B122-694C-83D2-432F27D90619}" dt="2021-07-11T23:08:12.546" v="5" actId="208"/>
+          <ac:spMkLst>
+            <pc:docMk/>
+            <pc:sldMk cId="12527219" sldId="285"/>
+            <ac:spMk id="21" creationId="{00000000-0000-0000-0000-000000000000}"/>
+          </ac:spMkLst>
+        </pc:spChg>
+        <pc:spChg chg="mod">
+          <ac:chgData name="Judson Santiago" userId="ebb108da2f256286" providerId="LiveId" clId="{CAB01854-B122-694C-83D2-432F27D90619}" dt="2021-07-11T23:08:12.546" v="5" actId="208"/>
+          <ac:spMkLst>
+            <pc:docMk/>
+            <pc:sldMk cId="12527219" sldId="285"/>
+            <ac:spMk id="23" creationId="{00000000-0000-0000-0000-000000000000}"/>
+          </ac:spMkLst>
+        </pc:spChg>
+        <pc:spChg chg="mod">
+          <ac:chgData name="Judson Santiago" userId="ebb108da2f256286" providerId="LiveId" clId="{CAB01854-B122-694C-83D2-432F27D90619}" dt="2021-07-11T23:08:12.546" v="5" actId="208"/>
+          <ac:spMkLst>
+            <pc:docMk/>
+            <pc:sldMk cId="12527219" sldId="285"/>
+            <ac:spMk id="27" creationId="{00000000-0000-0000-0000-000000000000}"/>
+          </ac:spMkLst>
+        </pc:spChg>
+        <pc:spChg chg="mod">
+          <ac:chgData name="Judson Santiago" userId="ebb108da2f256286" providerId="LiveId" clId="{CAB01854-B122-694C-83D2-432F27D90619}" dt="2021-07-11T23:08:12.546" v="5" actId="208"/>
+          <ac:spMkLst>
+            <pc:docMk/>
+            <pc:sldMk cId="12527219" sldId="285"/>
+            <ac:spMk id="38" creationId="{00000000-0000-0000-0000-000000000000}"/>
+          </ac:spMkLst>
+        </pc:spChg>
+        <pc:spChg chg="mod">
+          <ac:chgData name="Judson Santiago" userId="ebb108da2f256286" providerId="LiveId" clId="{CAB01854-B122-694C-83D2-432F27D90619}" dt="2021-07-11T23:08:12.546" v="5" actId="208"/>
+          <ac:spMkLst>
+            <pc:docMk/>
+            <pc:sldMk cId="12527219" sldId="285"/>
+            <ac:spMk id="41" creationId="{00000000-0000-0000-0000-000000000000}"/>
+          </ac:spMkLst>
+        </pc:spChg>
+        <pc:spChg chg="mod">
+          <ac:chgData name="Judson Santiago" userId="ebb108da2f256286" providerId="LiveId" clId="{CAB01854-B122-694C-83D2-432F27D90619}" dt="2021-07-11T23:08:12.546" v="5" actId="208"/>
+          <ac:spMkLst>
+            <pc:docMk/>
+            <pc:sldMk cId="12527219" sldId="285"/>
+            <ac:spMk id="42" creationId="{00000000-0000-0000-0000-000000000000}"/>
+          </ac:spMkLst>
+        </pc:spChg>
+        <pc:spChg chg="mod">
+          <ac:chgData name="Judson Santiago" userId="ebb108da2f256286" providerId="LiveId" clId="{CAB01854-B122-694C-83D2-432F27D90619}" dt="2021-07-11T23:08:12.546" v="5" actId="208"/>
+          <ac:spMkLst>
+            <pc:docMk/>
+            <pc:sldMk cId="12527219" sldId="285"/>
+            <ac:spMk id="45" creationId="{00000000-0000-0000-0000-000000000000}"/>
+          </ac:spMkLst>
+        </pc:spChg>
+        <pc:spChg chg="mod">
+          <ac:chgData name="Judson Santiago" userId="ebb108da2f256286" providerId="LiveId" clId="{CAB01854-B122-694C-83D2-432F27D90619}" dt="2021-07-11T23:08:12.546" v="5" actId="208"/>
+          <ac:spMkLst>
+            <pc:docMk/>
+            <pc:sldMk cId="12527219" sldId="285"/>
+            <ac:spMk id="49" creationId="{00000000-0000-0000-0000-000000000000}"/>
+          </ac:spMkLst>
+        </pc:spChg>
+      </pc:sldChg>
+      <pc:sldChg chg="modTransition">
+        <pc:chgData name="Judson Santiago" userId="ebb108da2f256286" providerId="LiveId" clId="{CAB01854-B122-694C-83D2-432F27D90619}" dt="2021-07-11T23:11:39.445" v="9"/>
+        <pc:sldMkLst>
+          <pc:docMk/>
+          <pc:sldMk cId="2926136774" sldId="286"/>
+        </pc:sldMkLst>
+      </pc:sldChg>
+      <pc:sldChg chg="modSp mod modTransition">
+        <pc:chgData name="Judson Santiago" userId="ebb108da2f256286" providerId="LiveId" clId="{CAB01854-B122-694C-83D2-432F27D90619}" dt="2021-07-11T23:11:39.445" v="9"/>
+        <pc:sldMkLst>
+          <pc:docMk/>
+          <pc:sldMk cId="3811780769" sldId="289"/>
+        </pc:sldMkLst>
+        <pc:spChg chg="mod">
+          <ac:chgData name="Judson Santiago" userId="ebb108da2f256286" providerId="LiveId" clId="{CAB01854-B122-694C-83D2-432F27D90619}" dt="2021-07-11T23:08:47.781" v="6" actId="1582"/>
+          <ac:spMkLst>
+            <pc:docMk/>
+            <pc:sldMk cId="3811780769" sldId="289"/>
+            <ac:spMk id="60" creationId="{00000000-0000-0000-0000-000000000000}"/>
+          </ac:spMkLst>
+        </pc:spChg>
+      </pc:sldChg>
+      <pc:sldChg chg="modTransition">
+        <pc:chgData name="Judson Santiago" userId="ebb108da2f256286" providerId="LiveId" clId="{CAB01854-B122-694C-83D2-432F27D90619}" dt="2021-07-11T23:11:39.445" v="9"/>
+        <pc:sldMkLst>
+          <pc:docMk/>
+          <pc:sldMk cId="2466993791" sldId="290"/>
+        </pc:sldMkLst>
+      </pc:sldChg>
+      <pc:sldChg chg="modTransition">
+        <pc:chgData name="Judson Santiago" userId="ebb108da2f256286" providerId="LiveId" clId="{CAB01854-B122-694C-83D2-432F27D90619}" dt="2021-07-11T23:11:39.445" v="9"/>
+        <pc:sldMkLst>
+          <pc:docMk/>
+          <pc:sldMk cId="339189448" sldId="291"/>
+        </pc:sldMkLst>
+      </pc:sldChg>
+      <pc:sldChg chg="modTransition">
+        <pc:chgData name="Judson Santiago" userId="ebb108da2f256286" providerId="LiveId" clId="{CAB01854-B122-694C-83D2-432F27D90619}" dt="2021-07-11T23:11:39.445" v="9"/>
+        <pc:sldMkLst>
+          <pc:docMk/>
+          <pc:sldMk cId="3984088179" sldId="292"/>
+        </pc:sldMkLst>
+      </pc:sldChg>
+      <pc:sldChg chg="modTransition">
+        <pc:chgData name="Judson Santiago" userId="ebb108da2f256286" providerId="LiveId" clId="{CAB01854-B122-694C-83D2-432F27D90619}" dt="2021-07-11T23:11:39.445" v="9"/>
+        <pc:sldMkLst>
+          <pc:docMk/>
+          <pc:sldMk cId="1821198597" sldId="293"/>
+        </pc:sldMkLst>
+      </pc:sldChg>
+      <pc:sldChg chg="modTransition">
+        <pc:chgData name="Judson Santiago" userId="ebb108da2f256286" providerId="LiveId" clId="{CAB01854-B122-694C-83D2-432F27D90619}" dt="2021-07-11T23:11:39.445" v="9"/>
+        <pc:sldMkLst>
+          <pc:docMk/>
+          <pc:sldMk cId="4047441642" sldId="294"/>
+        </pc:sldMkLst>
+      </pc:sldChg>
+      <pc:sldChg chg="modTransition">
+        <pc:chgData name="Judson Santiago" userId="ebb108da2f256286" providerId="LiveId" clId="{CAB01854-B122-694C-83D2-432F27D90619}" dt="2021-07-11T23:11:39.445" v="9"/>
+        <pc:sldMkLst>
+          <pc:docMk/>
+          <pc:sldMk cId="3064736429" sldId="295"/>
+        </pc:sldMkLst>
+      </pc:sldChg>
+      <pc:sldChg chg="modTransition">
+        <pc:chgData name="Judson Santiago" userId="ebb108da2f256286" providerId="LiveId" clId="{CAB01854-B122-694C-83D2-432F27D90619}" dt="2021-07-11T23:11:39.445" v="9"/>
+        <pc:sldMkLst>
+          <pc:docMk/>
+          <pc:sldMk cId="2344166050" sldId="296"/>
+        </pc:sldMkLst>
+      </pc:sldChg>
+      <pc:sldMasterChg chg="addSp delSp modSp mod modSldLayout">
+        <pc:chgData name="Judson Santiago" userId="ebb108da2f256286" providerId="LiveId" clId="{CAB01854-B122-694C-83D2-432F27D90619}" dt="2021-07-14T18:34:58.326" v="16"/>
+        <pc:sldMasterMkLst>
+          <pc:docMk/>
+          <pc:sldMasterMk cId="0" sldId="2147483780"/>
+        </pc:sldMasterMkLst>
+        <pc:spChg chg="mod">
+          <ac:chgData name="Judson Santiago" userId="ebb108da2f256286" providerId="LiveId" clId="{CAB01854-B122-694C-83D2-432F27D90619}" dt="2021-07-14T18:34:58.326" v="16"/>
+          <ac:spMkLst>
+            <pc:docMk/>
+            <pc:sldMasterMk cId="0" sldId="2147483780"/>
+            <ac:spMk id="16" creationId="{C85B54CA-D567-7342-A08A-AAE8198C5DDC}"/>
+          </ac:spMkLst>
+        </pc:spChg>
+        <pc:spChg chg="mod">
+          <ac:chgData name="Judson Santiago" userId="ebb108da2f256286" providerId="LiveId" clId="{CAB01854-B122-694C-83D2-432F27D90619}" dt="2021-07-14T18:34:58.326" v="16"/>
+          <ac:spMkLst>
+            <pc:docMk/>
+            <pc:sldMasterMk cId="0" sldId="2147483780"/>
+            <ac:spMk id="17" creationId="{E3DE26D8-3788-744E-B1E9-FCC6566781BD}"/>
+          </ac:spMkLst>
+        </pc:spChg>
+        <pc:spChg chg="mod">
+          <ac:chgData name="Judson Santiago" userId="ebb108da2f256286" providerId="LiveId" clId="{CAB01854-B122-694C-83D2-432F27D90619}" dt="2021-07-14T18:34:58.326" v="16"/>
+          <ac:spMkLst>
+            <pc:docMk/>
+            <pc:sldMasterMk cId="0" sldId="2147483780"/>
+            <ac:spMk id="19" creationId="{0D9BBDB7-69EA-8C4B-BDEF-16F453718B5C}"/>
+          </ac:spMkLst>
+        </pc:spChg>
+        <pc:grpChg chg="del">
+          <ac:chgData name="Judson Santiago" userId="ebb108da2f256286" providerId="LiveId" clId="{CAB01854-B122-694C-83D2-432F27D90619}" dt="2021-07-14T18:34:57.462" v="15" actId="478"/>
+          <ac:grpSpMkLst>
+            <pc:docMk/>
+            <pc:sldMasterMk cId="0" sldId="2147483780"/>
+            <ac:grpSpMk id="8" creationId="{4562553E-F5D4-432E-B5BE-4474E320B598}"/>
+          </ac:grpSpMkLst>
+        </pc:grpChg>
+        <pc:grpChg chg="add mod">
+          <ac:chgData name="Judson Santiago" userId="ebb108da2f256286" providerId="LiveId" clId="{CAB01854-B122-694C-83D2-432F27D90619}" dt="2021-07-14T18:34:58.326" v="16"/>
+          <ac:grpSpMkLst>
+            <pc:docMk/>
+            <pc:sldMasterMk cId="0" sldId="2147483780"/>
+            <ac:grpSpMk id="15" creationId="{E563939D-B587-6C4C-80CC-9AA6B9FB583C}"/>
+          </ac:grpSpMkLst>
+        </pc:grpChg>
+        <pc:sldLayoutChg chg="addSp delSp modSp mod">
+          <pc:chgData name="Judson Santiago" userId="ebb108da2f256286" providerId="LiveId" clId="{CAB01854-B122-694C-83D2-432F27D90619}" dt="2021-07-14T17:32:37.927" v="14" actId="478"/>
+          <pc:sldLayoutMkLst>
+            <pc:docMk/>
+            <pc:sldMasterMk cId="0" sldId="2147483780"/>
+            <pc:sldLayoutMk cId="0" sldId="2147483781"/>
+          </pc:sldLayoutMkLst>
+          <pc:spChg chg="add del">
+            <ac:chgData name="Judson Santiago" userId="ebb108da2f256286" providerId="LiveId" clId="{CAB01854-B122-694C-83D2-432F27D90619}" dt="2021-07-14T17:32:37.927" v="14" actId="478"/>
+            <ac:spMkLst>
+              <pc:docMk/>
+              <pc:sldMasterMk cId="0" sldId="2147483780"/>
+              <pc:sldLayoutMk cId="0" sldId="2147483781"/>
+              <ac:spMk id="11" creationId="{2F870E2C-FC3B-4695-B5DB-08E43323D7AA}"/>
+            </ac:spMkLst>
+          </pc:spChg>
+          <pc:spChg chg="add mod">
+            <ac:chgData name="Judson Santiago" userId="ebb108da2f256286" providerId="LiveId" clId="{CAB01854-B122-694C-83D2-432F27D90619}" dt="2021-07-11T23:05:57.140" v="4"/>
+            <ac:spMkLst>
+              <pc:docMk/>
+              <pc:sldMasterMk cId="0" sldId="2147483780"/>
+              <pc:sldLayoutMk cId="0" sldId="2147483781"/>
+              <ac:spMk id="13" creationId="{9CF3D794-194E-0B48-B22A-6D40F2635AB6}"/>
+            </ac:spMkLst>
+          </pc:spChg>
+          <pc:spChg chg="add mod">
+            <ac:chgData name="Judson Santiago" userId="ebb108da2f256286" providerId="LiveId" clId="{CAB01854-B122-694C-83D2-432F27D90619}" dt="2021-07-11T23:05:57.140" v="4"/>
+            <ac:spMkLst>
+              <pc:docMk/>
+              <pc:sldMasterMk cId="0" sldId="2147483780"/>
+              <pc:sldLayoutMk cId="0" sldId="2147483781"/>
+              <ac:spMk id="14" creationId="{C06930A2-8B68-504E-8DC6-B433F1113532}"/>
+            </ac:spMkLst>
+          </pc:spChg>
+        </pc:sldLayoutChg>
+      </pc:sldMasterChg>
+    </pc:docChg>
+  </pc:docChgLst>
+  <pc:docChgLst>
+    <pc:chgData name="Judson Santiago" userId="ebb108da2f256286" providerId="LiveId" clId="{892A6213-B575-4955-849D-E82EBCE1248D}"/>
+    <pc:docChg chg="undo redo custSel modSld modMainMaster">
+      <pc:chgData name="Judson Santiago" userId="ebb108da2f256286" providerId="LiveId" clId="{892A6213-B575-4955-849D-E82EBCE1248D}" dt="2021-07-14T22:52:54.164" v="535"/>
+      <pc:docMkLst>
+        <pc:docMk/>
+      </pc:docMkLst>
+      <pc:sldChg chg="modSp mod modNotesTx">
+        <pc:chgData name="Judson Santiago" userId="ebb108da2f256286" providerId="LiveId" clId="{892A6213-B575-4955-849D-E82EBCE1248D}" dt="2021-07-14T22:52:54.164" v="535"/>
         <pc:sldMkLst>
           <pc:docMk/>
           <pc:sldMk cId="0" sldId="256"/>
@@ -495,7 +938,7 @@
         </pc:spChg>
       </pc:sldChg>
       <pc:sldChg chg="modSp mod">
-        <pc:chgData name="Judson Santiago" userId="ebb108da2f256286" providerId="LiveId" clId="{892A6213-B575-4955-849D-E82EBCE1248D}" dt="2021-07-06T03:23:32.937" v="300" actId="1037"/>
+        <pc:chgData name="Judson Santiago" userId="ebb108da2f256286" providerId="LiveId" clId="{892A6213-B575-4955-849D-E82EBCE1248D}" dt="2021-07-14T21:37:56.219" v="534"/>
         <pc:sldMkLst>
           <pc:docMk/>
           <pc:sldMk cId="447932897" sldId="269"/>
@@ -516,6 +959,14 @@
             <ac:grpSpMk id="7" creationId="{00000000-0000-0000-0000-000000000000}"/>
           </ac:grpSpMkLst>
         </pc:grpChg>
+        <pc:picChg chg="mod">
+          <ac:chgData name="Judson Santiago" userId="ebb108da2f256286" providerId="LiveId" clId="{892A6213-B575-4955-849D-E82EBCE1248D}" dt="2021-07-14T21:37:56.219" v="534"/>
+          <ac:picMkLst>
+            <pc:docMk/>
+            <pc:sldMk cId="447932897" sldId="269"/>
+            <ac:picMk id="4" creationId="{00000000-0000-0000-0000-000000000000}"/>
+          </ac:picMkLst>
+        </pc:picChg>
       </pc:sldChg>
       <pc:sldChg chg="modSp mod">
         <pc:chgData name="Judson Santiago" userId="ebb108da2f256286" providerId="LiveId" clId="{892A6213-B575-4955-849D-E82EBCE1248D}" dt="2021-07-06T03:27:37.194" v="319" actId="1076"/>
@@ -2048,7 +2499,7 @@
             <a:fld id="{4C457FC9-8E1D-4A40-BFF1-0E630693B1AB}" type="datetimeFigureOut">
               <a:rPr lang="pt-BR" smtClean="0"/>
               <a:pPr/>
-              <a:t>06/07/2021</a:t>
+              <a:t>14/07/2021</a:t>
             </a:fld>
             <a:endParaRPr lang="pt-BR"/>
           </a:p>
@@ -2345,12 +2796,7 @@
             <p:ph type="sldImg"/>
           </p:nvPr>
         </p:nvSpPr>
-        <p:spPr>
-          <a:xfrm>
-            <a:off x="381000" y="685800"/>
-            <a:ext cx="6096000" cy="3429000"/>
-          </a:xfrm>
-        </p:spPr>
+        <p:spPr/>
       </p:sp>
       <p:sp>
         <p:nvSpPr>
@@ -2368,12 +2814,14 @@
           <a:lstStyle/>
           <a:p>
             <a:r>
-              <a:rPr lang="pt-BR" dirty="0"/>
-              <a:t>A palavra jogo possui</a:t>
-            </a:r>
-            <a:r>
-              <a:rPr lang="pt-BR" baseline="0" dirty="0"/>
-              <a:t> muitas interpretações. Pode ser um jogo de azar ou de futebol, uma brincadeira de criança, como pular corda, uma simulação de carros e também os tradicionais jogos de console e computador.</a:t>
+              <a:rPr lang="pt-BR" b="0" i="0" dirty="0">
+                <a:solidFill>
+                  <a:srgbClr val="000000"/>
+                </a:solidFill>
+                <a:effectLst/>
+                <a:latin typeface="Verdana" panose="020B0604030504040204" pitchFamily="34" charset="0"/>
+              </a:rPr>
+              <a:t>Aula introdutória sobre o desenvolvimento de jogos.</a:t>
             </a:r>
             <a:endParaRPr lang="pt-BR" dirty="0"/>
           </a:p>
@@ -2386,7 +2834,7 @@
             <a:spLocks noGrp="1"/>
           </p:cNvSpPr>
           <p:nvPr>
-            <p:ph type="sldNum" sz="quarter" idx="10"/>
+            <p:ph type="sldNum" sz="quarter" idx="5"/>
           </p:nvPr>
         </p:nvSpPr>
         <p:spPr/>
@@ -2397,7 +2845,7 @@
             <a:fld id="{EF334A8D-C5BE-432D-90D0-92D67DD437AB}" type="slidenum">
               <a:rPr lang="pt-BR" smtClean="0"/>
               <a:pPr/>
-              <a:t>2</a:t>
+              <a:t>1</a:t>
             </a:fld>
             <a:endParaRPr lang="pt-BR"/>
           </a:p>
@@ -2406,7 +2854,7 @@
     </p:spTree>
     <p:extLst>
       <p:ext uri="{BB962C8B-B14F-4D97-AF65-F5344CB8AC3E}">
-        <p14:creationId xmlns:p14="http://schemas.microsoft.com/office/powerpoint/2010/main" val="2248986921"/>
+        <p14:creationId xmlns:p14="http://schemas.microsoft.com/office/powerpoint/2010/main" val="2130868798"/>
       </p:ext>
     </p:extLst>
   </p:cSld>
@@ -2467,16 +2915,41 @@
           <a:p>
             <a:r>
               <a:rPr lang="pt-BR" dirty="0"/>
-              <a:t>É também um exemplo de diversão social. Conversar, interagir e observar a vida de outras pessoas também é uma atividade divertida</a:t>
+              <a:t>FPS = </a:t>
+            </a:r>
+            <a:r>
+              <a:rPr lang="pt-BR" dirty="0" err="1"/>
+              <a:t>First</a:t>
             </a:r>
             <a:r>
               <a:rPr lang="pt-BR" baseline="0" dirty="0"/>
-              <a:t> para o ser humano</a:t>
-            </a:r>
-            <a:r>
-              <a:rPr lang="pt-BR" dirty="0"/>
-              <a:t>.</a:t>
-            </a:r>
+              <a:t> Person </a:t>
+            </a:r>
+            <a:r>
+              <a:rPr lang="pt-BR" baseline="0" dirty="0" err="1"/>
+              <a:t>Shotter</a:t>
+            </a:r>
+            <a:r>
+              <a:rPr lang="pt-BR" baseline="0" dirty="0"/>
+              <a:t>, RPG = Role </a:t>
+            </a:r>
+            <a:r>
+              <a:rPr lang="pt-BR" baseline="0" dirty="0" err="1"/>
+              <a:t>Playing</a:t>
+            </a:r>
+            <a:r>
+              <a:rPr lang="pt-BR" baseline="0" dirty="0"/>
+              <a:t> Game, RTS = Real </a:t>
+            </a:r>
+            <a:r>
+              <a:rPr lang="pt-BR" baseline="0" dirty="0" err="1"/>
+              <a:t>Strategy</a:t>
+            </a:r>
+            <a:r>
+              <a:rPr lang="pt-BR" baseline="0" dirty="0"/>
+              <a:t> Game</a:t>
+            </a:r>
+            <a:endParaRPr lang="pt-BR" dirty="0"/>
           </a:p>
         </p:txBody>
       </p:sp>
@@ -2498,7 +2971,7 @@
             <a:fld id="{EF334A8D-C5BE-432D-90D0-92D67DD437AB}" type="slidenum">
               <a:rPr lang="pt-BR" smtClean="0"/>
               <a:pPr/>
-              <a:t>12</a:t>
+              <a:t>10</a:t>
             </a:fld>
             <a:endParaRPr lang="pt-BR"/>
           </a:p>
@@ -2507,7 +2980,7 @@
     </p:spTree>
     <p:extLst>
       <p:ext uri="{BB962C8B-B14F-4D97-AF65-F5344CB8AC3E}">
-        <p14:creationId xmlns:p14="http://schemas.microsoft.com/office/powerpoint/2010/main" val="1494771834"/>
+        <p14:creationId xmlns:p14="http://schemas.microsoft.com/office/powerpoint/2010/main" val="3101639942"/>
       </p:ext>
     </p:extLst>
   </p:cSld>
@@ -2568,13 +3041,16 @@
           <a:p>
             <a:r>
               <a:rPr lang="pt-BR" dirty="0"/>
-              <a:t>Reconhecer padrões</a:t>
+              <a:t>É também um exemplo de diversão social. Conversar, interagir e observar a vida de outras pessoas também é uma atividade divertida</a:t>
             </a:r>
             <a:r>
               <a:rPr lang="pt-BR" baseline="0" dirty="0"/>
-              <a:t> é uma habilidade útil que ajuda na hora da caça, exploração e coleta. Ajuda na orientação do caçador ao explorar um lugar novo e também a reconhecer padrões de comportamento das presas.</a:t>
-            </a:r>
-            <a:endParaRPr lang="pt-BR" dirty="0"/>
+              <a:t> para o ser humano</a:t>
+            </a:r>
+            <a:r>
+              <a:rPr lang="pt-BR" dirty="0"/>
+              <a:t>.</a:t>
+            </a:r>
           </a:p>
         </p:txBody>
       </p:sp>
@@ -2596,7 +3072,7 @@
             <a:fld id="{EF334A8D-C5BE-432D-90D0-92D67DD437AB}" type="slidenum">
               <a:rPr lang="pt-BR" smtClean="0"/>
               <a:pPr/>
-              <a:t>14</a:t>
+              <a:t>12</a:t>
             </a:fld>
             <a:endParaRPr lang="pt-BR"/>
           </a:p>
@@ -2605,7 +3081,7 @@
     </p:spTree>
     <p:extLst>
       <p:ext uri="{BB962C8B-B14F-4D97-AF65-F5344CB8AC3E}">
-        <p14:creationId xmlns:p14="http://schemas.microsoft.com/office/powerpoint/2010/main" val="3069878128"/>
+        <p14:creationId xmlns:p14="http://schemas.microsoft.com/office/powerpoint/2010/main" val="1494771834"/>
       </p:ext>
     </p:extLst>
   </p:cSld>
@@ -2666,19 +3142,11 @@
           <a:p>
             <a:r>
               <a:rPr lang="pt-BR" dirty="0"/>
-              <a:t>Exemplo:</a:t>
+              <a:t>Reconhecer padrões</a:t>
             </a:r>
             <a:r>
               <a:rPr lang="pt-BR" baseline="0" dirty="0"/>
-              <a:t> em jogos RTS em que as unidades de combate tem atributos, os j</a:t>
-            </a:r>
-            <a:r>
-              <a:rPr lang="pt-BR" dirty="0"/>
-              <a:t>ogadores não gostam que o resultado seja aleatório, mas sim que ele siga um padrão (vence o mais forte) ou com mais pontos de força.</a:t>
-            </a:r>
-            <a:r>
-              <a:rPr lang="pt-BR" baseline="0" dirty="0"/>
-              <a:t> Atributos subjetivos são mais difíceis de assimilar.</a:t>
+              <a:t> é uma habilidade útil que ajuda na hora da caça, exploração e coleta. Ajuda na orientação do caçador ao explorar um lugar novo e também a reconhecer padrões de comportamento das presas.</a:t>
             </a:r>
             <a:endParaRPr lang="pt-BR" dirty="0"/>
           </a:p>
@@ -2702,7 +3170,7 @@
             <a:fld id="{EF334A8D-C5BE-432D-90D0-92D67DD437AB}" type="slidenum">
               <a:rPr lang="pt-BR" smtClean="0"/>
               <a:pPr/>
-              <a:t>15</a:t>
+              <a:t>14</a:t>
             </a:fld>
             <a:endParaRPr lang="pt-BR"/>
           </a:p>
@@ -2711,7 +3179,7 @@
     </p:spTree>
     <p:extLst>
       <p:ext uri="{BB962C8B-B14F-4D97-AF65-F5344CB8AC3E}">
-        <p14:creationId xmlns:p14="http://schemas.microsoft.com/office/powerpoint/2010/main" val="3934048146"/>
+        <p14:creationId xmlns:p14="http://schemas.microsoft.com/office/powerpoint/2010/main" val="3069878128"/>
       </p:ext>
     </p:extLst>
   </p:cSld>
@@ -2772,27 +3240,19 @@
           <a:p>
             <a:r>
               <a:rPr lang="pt-BR" dirty="0"/>
-              <a:t>Sid</a:t>
+              <a:t>Exemplo:</a:t>
             </a:r>
             <a:r>
               <a:rPr lang="pt-BR" baseline="0" dirty="0"/>
-              <a:t> Meier e a sua empresa, </a:t>
-            </a:r>
-            <a:r>
-              <a:rPr lang="pt-BR" baseline="0" dirty="0" err="1"/>
-              <a:t>Firaxis</a:t>
+              <a:t> em jogos RTS em que as unidades de combate tem atributos, os j</a:t>
+            </a:r>
+            <a:r>
+              <a:rPr lang="pt-BR" dirty="0"/>
+              <a:t>ogadores não gostam que o resultado seja aleatório, mas sim que ele siga um padrão (vence o mais forte) ou com mais pontos de força.</a:t>
             </a:r>
             <a:r>
               <a:rPr lang="pt-BR" baseline="0" dirty="0"/>
-              <a:t>, são conhecidos por lançarem vários títulos de sucesso no gênero de estratégia, como </a:t>
-            </a:r>
-            <a:r>
-              <a:rPr lang="pt-BR" baseline="0" dirty="0" err="1"/>
-              <a:t>Civilization</a:t>
-            </a:r>
-            <a:r>
-              <a:rPr lang="pt-BR" baseline="0" dirty="0"/>
-              <a:t> e XCOM.</a:t>
+              <a:t> Atributos subjetivos são mais difíceis de assimilar.</a:t>
             </a:r>
             <a:endParaRPr lang="pt-BR" dirty="0"/>
           </a:p>
@@ -2816,7 +3276,7 @@
             <a:fld id="{EF334A8D-C5BE-432D-90D0-92D67DD437AB}" type="slidenum">
               <a:rPr lang="pt-BR" smtClean="0"/>
               <a:pPr/>
-              <a:t>16</a:t>
+              <a:t>15</a:t>
             </a:fld>
             <a:endParaRPr lang="pt-BR"/>
           </a:p>
@@ -2825,7 +3285,7 @@
     </p:spTree>
     <p:extLst>
       <p:ext uri="{BB962C8B-B14F-4D97-AF65-F5344CB8AC3E}">
-        <p14:creationId xmlns:p14="http://schemas.microsoft.com/office/powerpoint/2010/main" val="1438677095"/>
+        <p14:creationId xmlns:p14="http://schemas.microsoft.com/office/powerpoint/2010/main" val="3934048146"/>
       </p:ext>
     </p:extLst>
   </p:cSld>
@@ -2886,11 +3346,27 @@
           <a:p>
             <a:r>
               <a:rPr lang="pt-BR" dirty="0"/>
-              <a:t>Um jogo deve</a:t>
+              <a:t>Sid</a:t>
             </a:r>
             <a:r>
               <a:rPr lang="pt-BR" baseline="0" dirty="0"/>
-              <a:t> sempre ter um objetivo claro e atrativo.</a:t>
+              <a:t> Meier e a sua empresa, </a:t>
+            </a:r>
+            <a:r>
+              <a:rPr lang="pt-BR" baseline="0" dirty="0" err="1"/>
+              <a:t>Firaxis</a:t>
+            </a:r>
+            <a:r>
+              <a:rPr lang="pt-BR" baseline="0" dirty="0"/>
+              <a:t>, são conhecidos por lançarem vários títulos de sucesso no gênero de estratégia, como </a:t>
+            </a:r>
+            <a:r>
+              <a:rPr lang="pt-BR" baseline="0" dirty="0" err="1"/>
+              <a:t>Civilization</a:t>
+            </a:r>
+            <a:r>
+              <a:rPr lang="pt-BR" baseline="0" dirty="0"/>
+              <a:t> e XCOM.</a:t>
             </a:r>
             <a:endParaRPr lang="pt-BR" dirty="0"/>
           </a:p>
@@ -2914,7 +3390,7 @@
             <a:fld id="{EF334A8D-C5BE-432D-90D0-92D67DD437AB}" type="slidenum">
               <a:rPr lang="pt-BR" smtClean="0"/>
               <a:pPr/>
-              <a:t>17</a:t>
+              <a:t>16</a:t>
             </a:fld>
             <a:endParaRPr lang="pt-BR"/>
           </a:p>
@@ -2923,7 +3399,7 @@
     </p:spTree>
     <p:extLst>
       <p:ext uri="{BB962C8B-B14F-4D97-AF65-F5344CB8AC3E}">
-        <p14:creationId xmlns:p14="http://schemas.microsoft.com/office/powerpoint/2010/main" val="3144491909"/>
+        <p14:creationId xmlns:p14="http://schemas.microsoft.com/office/powerpoint/2010/main" val="1438677095"/>
       </p:ext>
     </p:extLst>
   </p:cSld>
@@ -2984,11 +3460,11 @@
           <a:p>
             <a:r>
               <a:rPr lang="pt-BR" dirty="0"/>
-              <a:t>Em</a:t>
+              <a:t>Um jogo deve</a:t>
             </a:r>
             <a:r>
               <a:rPr lang="pt-BR" baseline="0" dirty="0"/>
-              <a:t> Fable III o jogador pode escolher o caminho do bem ou do mal. Seguindo o caminho do bem ele fica jovem e bonito. No meio do jogo o jogador é obrigado a fazer uma escolha: salvar a vida de um pobre indefeso e se tornar velho e feio ou deixá-lo morrer e ser jovem e bonito. </a:t>
+              <a:t> sempre ter um objetivo claro e atrativo.</a:t>
             </a:r>
             <a:endParaRPr lang="pt-BR" dirty="0"/>
           </a:p>
@@ -3012,7 +3488,7 @@
             <a:fld id="{EF334A8D-C5BE-432D-90D0-92D67DD437AB}" type="slidenum">
               <a:rPr lang="pt-BR" smtClean="0"/>
               <a:pPr/>
-              <a:t>18</a:t>
+              <a:t>17</a:t>
             </a:fld>
             <a:endParaRPr lang="pt-BR"/>
           </a:p>
@@ -3021,7 +3497,7 @@
     </p:spTree>
     <p:extLst>
       <p:ext uri="{BB962C8B-B14F-4D97-AF65-F5344CB8AC3E}">
-        <p14:creationId xmlns:p14="http://schemas.microsoft.com/office/powerpoint/2010/main" val="1698593785"/>
+        <p14:creationId xmlns:p14="http://schemas.microsoft.com/office/powerpoint/2010/main" val="3144491909"/>
       </p:ext>
     </p:extLst>
   </p:cSld>
@@ -3082,11 +3558,11 @@
           <a:p>
             <a:r>
               <a:rPr lang="pt-BR" dirty="0"/>
-              <a:t>Esta é a estrutura clássica de escolhas tida</a:t>
+              <a:t>Em</a:t>
             </a:r>
             <a:r>
               <a:rPr lang="pt-BR" baseline="0" dirty="0"/>
-              <a:t> como a mais adequada para a maioria dos jogos. A exploração de uma ilha é um exemplo dessa estrutura convexa. Inicialmente forneça vários caminhos e cada um deles leva a explorar mais e mais da ilha. A medida que a ilha é explorada restam menos lugares para explorar até sobrar apenas um. Num jogo de xadrez inicialmente possuímos algumas poucas aberturas disponíveis, em seguida muitas opções de jogadas que vão se reduzindo no final do jogo.</a:t>
+              <a:t> Fable III o jogador pode escolher o caminho do bem ou do mal. Seguindo o caminho do bem ele fica jovem e bonito. No meio do jogo o jogador é obrigado a fazer uma escolha: salvar a vida de um pobre indefeso e se tornar velho e feio ou deixá-lo morrer e ser jovem e bonito. </a:t>
             </a:r>
             <a:endParaRPr lang="pt-BR" dirty="0"/>
           </a:p>
@@ -3110,7 +3586,7 @@
             <a:fld id="{EF334A8D-C5BE-432D-90D0-92D67DD437AB}" type="slidenum">
               <a:rPr lang="pt-BR" smtClean="0"/>
               <a:pPr/>
-              <a:t>19</a:t>
+              <a:t>18</a:t>
             </a:fld>
             <a:endParaRPr lang="pt-BR"/>
           </a:p>
@@ -3119,7 +3595,7 @@
     </p:spTree>
     <p:extLst>
       <p:ext uri="{BB962C8B-B14F-4D97-AF65-F5344CB8AC3E}">
-        <p14:creationId xmlns:p14="http://schemas.microsoft.com/office/powerpoint/2010/main" val="692941812"/>
+        <p14:creationId xmlns:p14="http://schemas.microsoft.com/office/powerpoint/2010/main" val="1698593785"/>
       </p:ext>
     </p:extLst>
   </p:cSld>
@@ -3180,11 +3656,11 @@
           <a:p>
             <a:r>
               <a:rPr lang="pt-BR" dirty="0"/>
-              <a:t>Alternar pontos de decisões</a:t>
+              <a:t>Esta é a estrutura clássica de escolhas tida</a:t>
             </a:r>
             <a:r>
               <a:rPr lang="pt-BR" baseline="0" dirty="0"/>
-              <a:t> simples com muitas opções de escolha é uma fórmula usada pela maioria dos jogos de sucesso.</a:t>
+              <a:t> como a mais adequada para a maioria dos jogos. A exploração de uma ilha é um exemplo dessa estrutura convexa. Inicialmente forneça vários caminhos e cada um deles leva a explorar mais e mais da ilha. A medida que a ilha é explorada restam menos lugares para explorar até sobrar apenas um. Num jogo de xadrez inicialmente possuímos algumas poucas aberturas disponíveis, em seguida muitas opções de jogadas que vão se reduzindo no final do jogo.</a:t>
             </a:r>
             <a:endParaRPr lang="pt-BR" dirty="0"/>
           </a:p>
@@ -3208,7 +3684,7 @@
             <a:fld id="{EF334A8D-C5BE-432D-90D0-92D67DD437AB}" type="slidenum">
               <a:rPr lang="pt-BR" smtClean="0"/>
               <a:pPr/>
-              <a:t>20</a:t>
+              <a:t>19</a:t>
             </a:fld>
             <a:endParaRPr lang="pt-BR"/>
           </a:p>
@@ -3278,11 +3754,11 @@
           <a:p>
             <a:r>
               <a:rPr lang="pt-BR" dirty="0"/>
-              <a:t>O ideal é fornecer um nível crescente de dificuldade mas com intervalos de</a:t>
+              <a:t>Alternar pontos de decisões</a:t>
             </a:r>
             <a:r>
               <a:rPr lang="pt-BR" baseline="0" dirty="0"/>
-              <a:t> decrescimento para que o jogador possa tomar um pouco de fôlego e fixar melhor as habilidades recém adquiridas sem a pressão de falha iminente.</a:t>
+              <a:t> simples com muitas opções de escolha é uma fórmula usada pela maioria dos jogos de sucesso.</a:t>
             </a:r>
             <a:endParaRPr lang="pt-BR" dirty="0"/>
           </a:p>
@@ -3306,7 +3782,7 @@
             <a:fld id="{EF334A8D-C5BE-432D-90D0-92D67DD437AB}" type="slidenum">
               <a:rPr lang="pt-BR" smtClean="0"/>
               <a:pPr/>
-              <a:t>21</a:t>
+              <a:t>20</a:t>
             </a:fld>
             <a:endParaRPr lang="pt-BR"/>
           </a:p>
@@ -3315,7 +3791,7 @@
     </p:spTree>
     <p:extLst>
       <p:ext uri="{BB962C8B-B14F-4D97-AF65-F5344CB8AC3E}">
-        <p14:creationId xmlns:p14="http://schemas.microsoft.com/office/powerpoint/2010/main" val="4148519706"/>
+        <p14:creationId xmlns:p14="http://schemas.microsoft.com/office/powerpoint/2010/main" val="692941812"/>
       </p:ext>
     </p:extLst>
   </p:cSld>
@@ -3376,19 +3852,11 @@
           <a:p>
             <a:r>
               <a:rPr lang="pt-BR" dirty="0"/>
-              <a:t>A dificuldade aumenta nos pontos de menor escolha</a:t>
+              <a:t>O ideal é fornecer um nível crescente de dificuldade mas com intervalos de</a:t>
             </a:r>
             <a:r>
               <a:rPr lang="pt-BR" baseline="0" dirty="0"/>
-              <a:t> (luta com chefe, batalha cinemática) e diminui nos momentos de maior escolha (mais recursos disponíveis, níveis </a:t>
-            </a:r>
-            <a:r>
-              <a:rPr lang="pt-BR" baseline="0" dirty="0" err="1"/>
-              <a:t>bonus</a:t>
-            </a:r>
-            <a:r>
-              <a:rPr lang="pt-BR" baseline="0" dirty="0"/>
-              <a:t>, inimigos fáceis).</a:t>
+              <a:t> decrescimento para que o jogador possa tomar um pouco de fôlego e fixar melhor as habilidades recém adquiridas sem a pressão de falha iminente.</a:t>
             </a:r>
             <a:endParaRPr lang="pt-BR" dirty="0"/>
           </a:p>
@@ -3412,7 +3880,7 @@
             <a:fld id="{EF334A8D-C5BE-432D-90D0-92D67DD437AB}" type="slidenum">
               <a:rPr lang="pt-BR" smtClean="0"/>
               <a:pPr/>
-              <a:t>22</a:t>
+              <a:t>21</a:t>
             </a:fld>
             <a:endParaRPr lang="pt-BR"/>
           </a:p>
@@ -3482,11 +3950,11 @@
           <a:p>
             <a:r>
               <a:rPr lang="pt-BR" dirty="0"/>
-              <a:t>A definição que iremos trabalhar</a:t>
+              <a:t>A palavra jogo possui</a:t>
             </a:r>
             <a:r>
               <a:rPr lang="pt-BR" baseline="0" dirty="0"/>
-              <a:t> é de um jogo baseado em computador, mas sem desassociar da definição da teoria da diversão.</a:t>
+              <a:t> muitas interpretações. Pode ser um jogo de azar ou de futebol, uma brincadeira de criança, como pular corda, uma simulação de carros e também os tradicionais jogos de console e computador.</a:t>
             </a:r>
             <a:endParaRPr lang="pt-BR" dirty="0"/>
           </a:p>
@@ -3510,7 +3978,7 @@
             <a:fld id="{EF334A8D-C5BE-432D-90D0-92D67DD437AB}" type="slidenum">
               <a:rPr lang="pt-BR" smtClean="0"/>
               <a:pPr/>
-              <a:t>3</a:t>
+              <a:t>2</a:t>
             </a:fld>
             <a:endParaRPr lang="pt-BR"/>
           </a:p>
@@ -3519,7 +3987,7 @@
     </p:spTree>
     <p:extLst>
       <p:ext uri="{BB962C8B-B14F-4D97-AF65-F5344CB8AC3E}">
-        <p14:creationId xmlns:p14="http://schemas.microsoft.com/office/powerpoint/2010/main" val="3352419966"/>
+        <p14:creationId xmlns:p14="http://schemas.microsoft.com/office/powerpoint/2010/main" val="2248986921"/>
       </p:ext>
     </p:extLst>
   </p:cSld>
@@ -3530,118 +3998,6 @@
 </file>
 
 <file path=ppt/notesSlides/notesSlide20.xml><?xml version="1.0" encoding="utf-8"?>
-<p:notes xmlns:a="http://schemas.openxmlformats.org/drawingml/2006/main" xmlns:r="http://schemas.openxmlformats.org/officeDocument/2006/relationships" xmlns:p="http://schemas.openxmlformats.org/presentationml/2006/main">
-  <p:cSld>
-    <p:spTree>
-      <p:nvGrpSpPr>
-        <p:cNvPr id="1" name=""/>
-        <p:cNvGrpSpPr/>
-        <p:nvPr/>
-      </p:nvGrpSpPr>
-      <p:grpSpPr>
-        <a:xfrm>
-          <a:off x="0" y="0"/>
-          <a:ext cx="0" cy="0"/>
-          <a:chOff x="0" y="0"/>
-          <a:chExt cx="0" cy="0"/>
-        </a:xfrm>
-      </p:grpSpPr>
-      <p:sp>
-        <p:nvSpPr>
-          <p:cNvPr id="2" name="Espaço Reservado para Imagem de Slide 1"/>
-          <p:cNvSpPr>
-            <a:spLocks noGrp="1" noRot="1" noChangeAspect="1"/>
-          </p:cNvSpPr>
-          <p:nvPr>
-            <p:ph type="sldImg"/>
-          </p:nvPr>
-        </p:nvSpPr>
-        <p:spPr/>
-      </p:sp>
-      <p:sp>
-        <p:nvSpPr>
-          <p:cNvPr id="3" name="Espaço Reservado para Anotações 2"/>
-          <p:cNvSpPr>
-            <a:spLocks noGrp="1"/>
-          </p:cNvSpPr>
-          <p:nvPr>
-            <p:ph type="body" idx="1"/>
-          </p:nvPr>
-        </p:nvSpPr>
-        <p:spPr/>
-        <p:txBody>
-          <a:bodyPr/>
-          <a:lstStyle/>
-          <a:p>
-            <a:r>
-              <a:rPr lang="pt-BR" dirty="0"/>
-              <a:t>Exemplos de jogos focados em estórias: Gabriel Knight, The </a:t>
-            </a:r>
-            <a:r>
-              <a:rPr lang="pt-BR" dirty="0" err="1"/>
-              <a:t>Walking</a:t>
-            </a:r>
-            <a:r>
-              <a:rPr lang="pt-BR" dirty="0"/>
-              <a:t> Dead, Life </a:t>
-            </a:r>
-            <a:r>
-              <a:rPr lang="pt-BR" dirty="0" err="1"/>
-              <a:t>is</a:t>
-            </a:r>
-            <a:r>
-              <a:rPr lang="pt-BR" dirty="0"/>
-              <a:t> </a:t>
-            </a:r>
-            <a:r>
-              <a:rPr lang="pt-BR" dirty="0" err="1"/>
-              <a:t>Strange</a:t>
-            </a:r>
-            <a:r>
-              <a:rPr lang="pt-BR" dirty="0"/>
-              <a:t>, etc.</a:t>
-            </a:r>
-          </a:p>
-        </p:txBody>
-      </p:sp>
-      <p:sp>
-        <p:nvSpPr>
-          <p:cNvPr id="4" name="Espaço Reservado para Número de Slide 3"/>
-          <p:cNvSpPr>
-            <a:spLocks noGrp="1"/>
-          </p:cNvSpPr>
-          <p:nvPr>
-            <p:ph type="sldNum" sz="quarter" idx="5"/>
-          </p:nvPr>
-        </p:nvSpPr>
-        <p:spPr/>
-        <p:txBody>
-          <a:bodyPr/>
-          <a:lstStyle/>
-          <a:p>
-            <a:fld id="{EF334A8D-C5BE-432D-90D0-92D67DD437AB}" type="slidenum">
-              <a:rPr lang="pt-BR" smtClean="0"/>
-              <a:pPr/>
-              <a:t>23</a:t>
-            </a:fld>
-            <a:endParaRPr lang="pt-BR"/>
-          </a:p>
-        </p:txBody>
-      </p:sp>
-    </p:spTree>
-    <p:extLst>
-      <p:ext uri="{BB962C8B-B14F-4D97-AF65-F5344CB8AC3E}">
-        <p14:creationId xmlns:p14="http://schemas.microsoft.com/office/powerpoint/2010/main" val="3909725383"/>
-      </p:ext>
-    </p:extLst>
-  </p:cSld>
-  <p:clrMapOvr>
-    <a:masterClrMapping/>
-  </p:clrMapOvr>
-</p:notes>
-</file>
-
-<file path=ppt/notesSlides/notesSlide21.xml><?xml version="1.0" encoding="utf-8"?>
 <p:notes xmlns:a="http://schemas.openxmlformats.org/drawingml/2006/main" xmlns:r="http://schemas.openxmlformats.org/officeDocument/2006/relationships" xmlns:p="http://schemas.openxmlformats.org/presentationml/2006/main">
   <p:cSld>
     <p:spTree>
@@ -3692,11 +4048,19 @@
           <a:p>
             <a:r>
               <a:rPr lang="pt-BR" dirty="0"/>
-              <a:t>A indústria rapidamente percebeu</a:t>
+              <a:t>A dificuldade aumenta nos pontos de menor escolha</a:t>
             </a:r>
             <a:r>
               <a:rPr lang="pt-BR" baseline="0" dirty="0"/>
-              <a:t> os benefícios dessa separação. Apenas mudando a arte, modelagem dos mundos e regras do jogo poderia-se obter um novo jogo reutilizando muito do jogo já produzido.</a:t>
+              <a:t> (luta com chefe, batalha cinemática) e diminui nos momentos de maior escolha (mais recursos disponíveis, níveis </a:t>
+            </a:r>
+            <a:r>
+              <a:rPr lang="pt-BR" baseline="0" dirty="0" err="1"/>
+              <a:t>bonus</a:t>
+            </a:r>
+            <a:r>
+              <a:rPr lang="pt-BR" baseline="0" dirty="0"/>
+              <a:t>, inimigos fáceis).</a:t>
             </a:r>
             <a:endParaRPr lang="pt-BR" dirty="0"/>
           </a:p>
@@ -3720,7 +4084,7 @@
             <a:fld id="{EF334A8D-C5BE-432D-90D0-92D67DD437AB}" type="slidenum">
               <a:rPr lang="pt-BR" smtClean="0"/>
               <a:pPr/>
-              <a:t>24</a:t>
+              <a:t>22</a:t>
             </a:fld>
             <a:endParaRPr lang="pt-BR"/>
           </a:p>
@@ -3729,7 +4093,119 @@
     </p:spTree>
     <p:extLst>
       <p:ext uri="{BB962C8B-B14F-4D97-AF65-F5344CB8AC3E}">
-        <p14:creationId xmlns:p14="http://schemas.microsoft.com/office/powerpoint/2010/main" val="4004054679"/>
+        <p14:creationId xmlns:p14="http://schemas.microsoft.com/office/powerpoint/2010/main" val="4148519706"/>
+      </p:ext>
+    </p:extLst>
+  </p:cSld>
+  <p:clrMapOvr>
+    <a:masterClrMapping/>
+  </p:clrMapOvr>
+</p:notes>
+</file>
+
+<file path=ppt/notesSlides/notesSlide21.xml><?xml version="1.0" encoding="utf-8"?>
+<p:notes xmlns:a="http://schemas.openxmlformats.org/drawingml/2006/main" xmlns:r="http://schemas.openxmlformats.org/officeDocument/2006/relationships" xmlns:p="http://schemas.openxmlformats.org/presentationml/2006/main">
+  <p:cSld>
+    <p:spTree>
+      <p:nvGrpSpPr>
+        <p:cNvPr id="1" name=""/>
+        <p:cNvGrpSpPr/>
+        <p:nvPr/>
+      </p:nvGrpSpPr>
+      <p:grpSpPr>
+        <a:xfrm>
+          <a:off x="0" y="0"/>
+          <a:ext cx="0" cy="0"/>
+          <a:chOff x="0" y="0"/>
+          <a:chExt cx="0" cy="0"/>
+        </a:xfrm>
+      </p:grpSpPr>
+      <p:sp>
+        <p:nvSpPr>
+          <p:cNvPr id="2" name="Espaço Reservado para Imagem de Slide 1"/>
+          <p:cNvSpPr>
+            <a:spLocks noGrp="1" noRot="1" noChangeAspect="1"/>
+          </p:cNvSpPr>
+          <p:nvPr>
+            <p:ph type="sldImg"/>
+          </p:nvPr>
+        </p:nvSpPr>
+        <p:spPr/>
+      </p:sp>
+      <p:sp>
+        <p:nvSpPr>
+          <p:cNvPr id="3" name="Espaço Reservado para Anotações 2"/>
+          <p:cNvSpPr>
+            <a:spLocks noGrp="1"/>
+          </p:cNvSpPr>
+          <p:nvPr>
+            <p:ph type="body" idx="1"/>
+          </p:nvPr>
+        </p:nvSpPr>
+        <p:spPr/>
+        <p:txBody>
+          <a:bodyPr/>
+          <a:lstStyle/>
+          <a:p>
+            <a:r>
+              <a:rPr lang="pt-BR" dirty="0"/>
+              <a:t>Exemplos de jogos focados em estórias: Gabriel Knight, The </a:t>
+            </a:r>
+            <a:r>
+              <a:rPr lang="pt-BR" dirty="0" err="1"/>
+              <a:t>Walking</a:t>
+            </a:r>
+            <a:r>
+              <a:rPr lang="pt-BR" dirty="0"/>
+              <a:t> Dead, Life </a:t>
+            </a:r>
+            <a:r>
+              <a:rPr lang="pt-BR" dirty="0" err="1"/>
+              <a:t>is</a:t>
+            </a:r>
+            <a:r>
+              <a:rPr lang="pt-BR" dirty="0"/>
+              <a:t> </a:t>
+            </a:r>
+            <a:r>
+              <a:rPr lang="pt-BR" dirty="0" err="1"/>
+              <a:t>Strange</a:t>
+            </a:r>
+            <a:r>
+              <a:rPr lang="pt-BR" dirty="0"/>
+              <a:t>, etc.</a:t>
+            </a:r>
+          </a:p>
+        </p:txBody>
+      </p:sp>
+      <p:sp>
+        <p:nvSpPr>
+          <p:cNvPr id="4" name="Espaço Reservado para Número de Slide 3"/>
+          <p:cNvSpPr>
+            <a:spLocks noGrp="1"/>
+          </p:cNvSpPr>
+          <p:nvPr>
+            <p:ph type="sldNum" sz="quarter" idx="5"/>
+          </p:nvPr>
+        </p:nvSpPr>
+        <p:spPr/>
+        <p:txBody>
+          <a:bodyPr/>
+          <a:lstStyle/>
+          <a:p>
+            <a:fld id="{EF334A8D-C5BE-432D-90D0-92D67DD437AB}" type="slidenum">
+              <a:rPr lang="pt-BR" smtClean="0"/>
+              <a:pPr/>
+              <a:t>23</a:t>
+            </a:fld>
+            <a:endParaRPr lang="pt-BR"/>
+          </a:p>
+        </p:txBody>
+      </p:sp>
+    </p:spTree>
+    <p:extLst>
+      <p:ext uri="{BB962C8B-B14F-4D97-AF65-F5344CB8AC3E}">
+        <p14:creationId xmlns:p14="http://schemas.microsoft.com/office/powerpoint/2010/main" val="3909725383"/>
       </p:ext>
     </p:extLst>
   </p:cSld>
@@ -3788,29 +4264,14 @@
           <a:bodyPr/>
           <a:lstStyle/>
           <a:p>
-            <a:pPr marL="0" marR="0" indent="0" algn="l" defTabSz="914400" rtl="0" eaLnBrk="1" fontAlgn="auto" latinLnBrk="0" hangingPunct="1">
-              <a:lnSpc>
-                <a:spcPct val="100000"/>
-              </a:lnSpc>
-              <a:spcBef>
-                <a:spcPts val="0"/>
-              </a:spcBef>
-              <a:spcAft>
-                <a:spcPts val="0"/>
-              </a:spcAft>
-              <a:buClrTx/>
-              <a:buSzTx/>
-              <a:buFontTx/>
-              <a:buNone/>
-              <a:tabLst/>
-              <a:defRPr/>
-            </a:pPr>
             <a:r>
               <a:rPr lang="pt-BR" dirty="0"/>
-              <a:t>Cada gênero tem necessidades diferentes.</a:t>
-            </a:r>
-          </a:p>
-          <a:p>
+              <a:t>A indústria rapidamente percebeu</a:t>
+            </a:r>
+            <a:r>
+              <a:rPr lang="pt-BR" baseline="0" dirty="0"/>
+              <a:t> os benefícios dessa separação. Apenas mudando a arte, modelagem dos mundos e regras do jogo poderia-se obter um novo jogo reutilizando muito do jogo já produzido.</a:t>
+            </a:r>
             <a:endParaRPr lang="pt-BR" dirty="0"/>
           </a:p>
         </p:txBody>
@@ -3833,7 +4294,7 @@
             <a:fld id="{EF334A8D-C5BE-432D-90D0-92D67DD437AB}" type="slidenum">
               <a:rPr lang="pt-BR" smtClean="0"/>
               <a:pPr/>
-              <a:t>26</a:t>
+              <a:t>24</a:t>
             </a:fld>
             <a:endParaRPr lang="pt-BR"/>
           </a:p>
@@ -3842,7 +4303,7 @@
     </p:spTree>
     <p:extLst>
       <p:ext uri="{BB962C8B-B14F-4D97-AF65-F5344CB8AC3E}">
-        <p14:creationId xmlns:p14="http://schemas.microsoft.com/office/powerpoint/2010/main" val="121616897"/>
+        <p14:creationId xmlns:p14="http://schemas.microsoft.com/office/powerpoint/2010/main" val="4004054679"/>
       </p:ext>
     </p:extLst>
   </p:cSld>
@@ -3946,7 +4407,7 @@
             <a:fld id="{EF334A8D-C5BE-432D-90D0-92D67DD437AB}" type="slidenum">
               <a:rPr lang="pt-BR" smtClean="0"/>
               <a:pPr/>
-              <a:t>27</a:t>
+              <a:t>26</a:t>
             </a:fld>
             <a:endParaRPr lang="pt-BR"/>
           </a:p>
@@ -4059,7 +4520,7 @@
             <a:fld id="{EF334A8D-C5BE-432D-90D0-92D67DD437AB}" type="slidenum">
               <a:rPr lang="pt-BR" smtClean="0"/>
               <a:pPr/>
-              <a:t>28</a:t>
+              <a:t>27</a:t>
             </a:fld>
             <a:endParaRPr lang="pt-BR"/>
           </a:p>
@@ -4172,7 +4633,7 @@
             <a:fld id="{EF334A8D-C5BE-432D-90D0-92D67DD437AB}" type="slidenum">
               <a:rPr lang="pt-BR" smtClean="0"/>
               <a:pPr/>
-              <a:t>29</a:t>
+              <a:t>28</a:t>
             </a:fld>
             <a:endParaRPr lang="pt-BR"/>
           </a:p>
@@ -4285,7 +4746,7 @@
             <a:fld id="{EF334A8D-C5BE-432D-90D0-92D67DD437AB}" type="slidenum">
               <a:rPr lang="pt-BR" smtClean="0"/>
               <a:pPr/>
-              <a:t>30</a:t>
+              <a:t>29</a:t>
             </a:fld>
             <a:endParaRPr lang="pt-BR"/>
           </a:p>
@@ -4353,6 +4814,119 @@
           <a:bodyPr/>
           <a:lstStyle/>
           <a:p>
+            <a:pPr marL="0" marR="0" indent="0" algn="l" defTabSz="914400" rtl="0" eaLnBrk="1" fontAlgn="auto" latinLnBrk="0" hangingPunct="1">
+              <a:lnSpc>
+                <a:spcPct val="100000"/>
+              </a:lnSpc>
+              <a:spcBef>
+                <a:spcPts val="0"/>
+              </a:spcBef>
+              <a:spcAft>
+                <a:spcPts val="0"/>
+              </a:spcAft>
+              <a:buClrTx/>
+              <a:buSzTx/>
+              <a:buFontTx/>
+              <a:buNone/>
+              <a:tabLst/>
+              <a:defRPr/>
+            </a:pPr>
+            <a:r>
+              <a:rPr lang="pt-BR" dirty="0"/>
+              <a:t>Cada gênero tem necessidades diferentes.</a:t>
+            </a:r>
+          </a:p>
+          <a:p>
+            <a:endParaRPr lang="pt-BR" dirty="0"/>
+          </a:p>
+        </p:txBody>
+      </p:sp>
+      <p:sp>
+        <p:nvSpPr>
+          <p:cNvPr id="4" name="Espaço Reservado para Número de Slide 3"/>
+          <p:cNvSpPr>
+            <a:spLocks noGrp="1"/>
+          </p:cNvSpPr>
+          <p:nvPr>
+            <p:ph type="sldNum" sz="quarter" idx="10"/>
+          </p:nvPr>
+        </p:nvSpPr>
+        <p:spPr/>
+        <p:txBody>
+          <a:bodyPr/>
+          <a:lstStyle/>
+          <a:p>
+            <a:fld id="{EF334A8D-C5BE-432D-90D0-92D67DD437AB}" type="slidenum">
+              <a:rPr lang="pt-BR" smtClean="0"/>
+              <a:pPr/>
+              <a:t>30</a:t>
+            </a:fld>
+            <a:endParaRPr lang="pt-BR"/>
+          </a:p>
+        </p:txBody>
+      </p:sp>
+    </p:spTree>
+    <p:extLst>
+      <p:ext uri="{BB962C8B-B14F-4D97-AF65-F5344CB8AC3E}">
+        <p14:creationId xmlns:p14="http://schemas.microsoft.com/office/powerpoint/2010/main" val="121616897"/>
+      </p:ext>
+    </p:extLst>
+  </p:cSld>
+  <p:clrMapOvr>
+    <a:masterClrMapping/>
+  </p:clrMapOvr>
+</p:notes>
+</file>
+
+<file path=ppt/notesSlides/notesSlide28.xml><?xml version="1.0" encoding="utf-8"?>
+<p:notes xmlns:a="http://schemas.openxmlformats.org/drawingml/2006/main" xmlns:r="http://schemas.openxmlformats.org/officeDocument/2006/relationships" xmlns:p="http://schemas.openxmlformats.org/presentationml/2006/main">
+  <p:cSld>
+    <p:spTree>
+      <p:nvGrpSpPr>
+        <p:cNvPr id="1" name=""/>
+        <p:cNvGrpSpPr/>
+        <p:nvPr/>
+      </p:nvGrpSpPr>
+      <p:grpSpPr>
+        <a:xfrm>
+          <a:off x="0" y="0"/>
+          <a:ext cx="0" cy="0"/>
+          <a:chOff x="0" y="0"/>
+          <a:chExt cx="0" cy="0"/>
+        </a:xfrm>
+      </p:grpSpPr>
+      <p:sp>
+        <p:nvSpPr>
+          <p:cNvPr id="2" name="Espaço Reservado para Imagem de Slide 1"/>
+          <p:cNvSpPr>
+            <a:spLocks noGrp="1" noRot="1" noChangeAspect="1"/>
+          </p:cNvSpPr>
+          <p:nvPr>
+            <p:ph type="sldImg"/>
+          </p:nvPr>
+        </p:nvSpPr>
+        <p:spPr>
+          <a:xfrm>
+            <a:off x="381000" y="685800"/>
+            <a:ext cx="6096000" cy="3429000"/>
+          </a:xfrm>
+        </p:spPr>
+      </p:sp>
+      <p:sp>
+        <p:nvSpPr>
+          <p:cNvPr id="3" name="Espaço Reservado para Anotações 2"/>
+          <p:cNvSpPr>
+            <a:spLocks noGrp="1"/>
+          </p:cNvSpPr>
+          <p:nvPr>
+            <p:ph type="body" idx="1"/>
+          </p:nvPr>
+        </p:nvSpPr>
+        <p:spPr/>
+        <p:txBody>
+          <a:bodyPr/>
+          <a:lstStyle/>
+          <a:p>
             <a:r>
               <a:rPr lang="pt-BR" dirty="0"/>
               <a:t>A </a:t>
@@ -4533,27 +5107,11 @@
           <a:p>
             <a:r>
               <a:rPr lang="pt-BR" dirty="0"/>
-              <a:t>Essa é</a:t>
+              <a:t>A definição que iremos trabalhar</a:t>
             </a:r>
             <a:r>
               <a:rPr lang="pt-BR" baseline="0" dirty="0"/>
-              <a:t> u</a:t>
-            </a:r>
-            <a:r>
-              <a:rPr lang="pt-BR" dirty="0"/>
-              <a:t>ma definição mais técnica do que é um </a:t>
-            </a:r>
-            <a:r>
-              <a:rPr lang="pt-BR" baseline="0" dirty="0"/>
-              <a:t>jogo de console ou computador. Ela envolve simulação, agentes e tempo real. U</a:t>
-            </a:r>
-            <a:r>
-              <a:rPr lang="pt-BR" dirty="0"/>
-              <a:t>ma simulação física pode precisar ser atualizada a 120 FPS para manter sua estabilidade. A</a:t>
-            </a:r>
-            <a:r>
-              <a:rPr lang="pt-BR" baseline="0" dirty="0"/>
-              <a:t> inteligência artificial de um personagem pode precisar ser atualizada a cada segundo para não parecer burra. Uma biblioteca de áudio pode precisar ser executada a 60FPS para manter os buffers de áudio cheios e evitar ruídos no som.</a:t>
+              <a:t> é de um jogo baseado em computador, mas sem desassociar da definição da teoria da diversão.</a:t>
             </a:r>
             <a:endParaRPr lang="pt-BR" dirty="0"/>
           </a:p>
@@ -4577,7 +5135,7 @@
             <a:fld id="{EF334A8D-C5BE-432D-90D0-92D67DD437AB}" type="slidenum">
               <a:rPr lang="pt-BR" smtClean="0"/>
               <a:pPr/>
-              <a:t>4</a:t>
+              <a:t>3</a:t>
             </a:fld>
             <a:endParaRPr lang="pt-BR"/>
           </a:p>
@@ -4586,7 +5144,7 @@
     </p:spTree>
     <p:extLst>
       <p:ext uri="{BB962C8B-B14F-4D97-AF65-F5344CB8AC3E}">
-        <p14:creationId xmlns:p14="http://schemas.microsoft.com/office/powerpoint/2010/main" val="3185516813"/>
+        <p14:creationId xmlns:p14="http://schemas.microsoft.com/office/powerpoint/2010/main" val="3352419966"/>
       </p:ext>
     </p:extLst>
   </p:cSld>
@@ -4647,11 +5205,27 @@
           <a:p>
             <a:r>
               <a:rPr lang="pt-BR" dirty="0"/>
-              <a:t>Estas são normalmente</a:t>
+              <a:t>Essa é</a:t>
             </a:r>
             <a:r>
               <a:rPr lang="pt-BR" baseline="0" dirty="0"/>
-              <a:t> as etapas necessárias para se ter um jogo</a:t>
+              <a:t> u</a:t>
+            </a:r>
+            <a:r>
+              <a:rPr lang="pt-BR" dirty="0"/>
+              <a:t>ma definição mais técnica do que é um </a:t>
+            </a:r>
+            <a:r>
+              <a:rPr lang="pt-BR" baseline="0" dirty="0"/>
+              <a:t>jogo de console ou computador. Ela envolve simulação, agentes e tempo real. U</a:t>
+            </a:r>
+            <a:r>
+              <a:rPr lang="pt-BR" dirty="0"/>
+              <a:t>ma simulação física pode precisar ser atualizada a 120 FPS para manter sua estabilidade. A</a:t>
+            </a:r>
+            <a:r>
+              <a:rPr lang="pt-BR" baseline="0" dirty="0"/>
+              <a:t> inteligência artificial de um personagem pode precisar ser atualizada a cada segundo para não parecer burra. Uma biblioteca de áudio pode precisar ser executada a 60FPS para manter os buffers de áudio cheios e evitar ruídos no som.</a:t>
             </a:r>
             <a:endParaRPr lang="pt-BR" dirty="0"/>
           </a:p>
@@ -4675,7 +5249,7 @@
             <a:fld id="{EF334A8D-C5BE-432D-90D0-92D67DD437AB}" type="slidenum">
               <a:rPr lang="pt-BR" smtClean="0"/>
               <a:pPr/>
-              <a:t>5</a:t>
+              <a:t>4</a:t>
             </a:fld>
             <a:endParaRPr lang="pt-BR"/>
           </a:p>
@@ -4684,7 +5258,7 @@
     </p:spTree>
     <p:extLst>
       <p:ext uri="{BB962C8B-B14F-4D97-AF65-F5344CB8AC3E}">
-        <p14:creationId xmlns:p14="http://schemas.microsoft.com/office/powerpoint/2010/main" val="863165350"/>
+        <p14:creationId xmlns:p14="http://schemas.microsoft.com/office/powerpoint/2010/main" val="3185516813"/>
       </p:ext>
     </p:extLst>
   </p:cSld>
@@ -4745,19 +5319,11 @@
           <a:p>
             <a:r>
               <a:rPr lang="pt-BR" dirty="0"/>
-              <a:t>Com base nas etapas para a criação</a:t>
+              <a:t>Estas são normalmente</a:t>
             </a:r>
             <a:r>
               <a:rPr lang="pt-BR" baseline="0" dirty="0"/>
-              <a:t> de um jogo, u</a:t>
-            </a:r>
-            <a:r>
-              <a:rPr lang="pt-BR" dirty="0"/>
-              <a:t>m desenvolvedor </a:t>
-            </a:r>
-            <a:r>
-              <a:rPr lang="pt-BR" baseline="0" dirty="0"/>
-              <a:t>pode se especializar em uma destas trilhas. Nos focaremos na trilha de programação, mas isso não significa que um cientista da computação deve se restringir a essa trilha.</a:t>
+              <a:t> as etapas necessárias para se ter um jogo</a:t>
             </a:r>
             <a:endParaRPr lang="pt-BR" dirty="0"/>
           </a:p>
@@ -4781,7 +5347,7 @@
             <a:fld id="{EF334A8D-C5BE-432D-90D0-92D67DD437AB}" type="slidenum">
               <a:rPr lang="pt-BR" smtClean="0"/>
               <a:pPr/>
-              <a:t>6</a:t>
+              <a:t>5</a:t>
             </a:fld>
             <a:endParaRPr lang="pt-BR"/>
           </a:p>
@@ -4790,7 +5356,7 @@
     </p:spTree>
     <p:extLst>
       <p:ext uri="{BB962C8B-B14F-4D97-AF65-F5344CB8AC3E}">
-        <p14:creationId xmlns:p14="http://schemas.microsoft.com/office/powerpoint/2010/main" val="1163511807"/>
+        <p14:creationId xmlns:p14="http://schemas.microsoft.com/office/powerpoint/2010/main" val="863165350"/>
       </p:ext>
     </p:extLst>
   </p:cSld>
@@ -4851,11 +5417,19 @@
           <a:p>
             <a:r>
               <a:rPr lang="pt-BR" dirty="0"/>
-              <a:t>Por esse motivo vemos</a:t>
+              <a:t>Com base nas etapas para a criação</a:t>
             </a:r>
             <a:r>
               <a:rPr lang="pt-BR" baseline="0" dirty="0"/>
-              <a:t> tantos jogos parecidos e usando a mesma fórmula. É mais fácil e mais barato copiar uma fórmula existente que fazer uma nova. Isso significa também que poucos desenvolvedores estudam ou conhecem os fundamentos da diversão.</a:t>
+              <a:t> de um jogo, u</a:t>
+            </a:r>
+            <a:r>
+              <a:rPr lang="pt-BR" dirty="0"/>
+              <a:t>m desenvolvedor </a:t>
+            </a:r>
+            <a:r>
+              <a:rPr lang="pt-BR" baseline="0" dirty="0"/>
+              <a:t>pode se especializar em uma destas trilhas. Nos focaremos na trilha de programação, mas isso não significa que um cientista da computação deve se restringir a essa trilha.</a:t>
             </a:r>
             <a:endParaRPr lang="pt-BR" dirty="0"/>
           </a:p>
@@ -4879,7 +5453,7 @@
             <a:fld id="{EF334A8D-C5BE-432D-90D0-92D67DD437AB}" type="slidenum">
               <a:rPr lang="pt-BR" smtClean="0"/>
               <a:pPr/>
-              <a:t>7</a:t>
+              <a:t>6</a:t>
             </a:fld>
             <a:endParaRPr lang="pt-BR"/>
           </a:p>
@@ -4888,7 +5462,7 @@
     </p:spTree>
     <p:extLst>
       <p:ext uri="{BB962C8B-B14F-4D97-AF65-F5344CB8AC3E}">
-        <p14:creationId xmlns:p14="http://schemas.microsoft.com/office/powerpoint/2010/main" val="881865676"/>
+        <p14:creationId xmlns:p14="http://schemas.microsoft.com/office/powerpoint/2010/main" val="1163511807"/>
       </p:ext>
     </p:extLst>
   </p:cSld>
@@ -4949,19 +5523,11 @@
           <a:p>
             <a:r>
               <a:rPr lang="pt-BR" dirty="0"/>
-              <a:t>Gatos</a:t>
+              <a:t>Por esse motivo vemos</a:t>
             </a:r>
             <a:r>
               <a:rPr lang="pt-BR" baseline="0" dirty="0"/>
-              <a:t> e </a:t>
-            </a:r>
-            <a:r>
-              <a:rPr lang="pt-BR" dirty="0"/>
-              <a:t>cães recém nascidos brincam grunhindo, correndo, perseguindo, atacando e rolando</a:t>
-            </a:r>
-            <a:r>
-              <a:rPr lang="pt-BR" baseline="0" dirty="0"/>
-              <a:t> com seus irmãos. Eles brincam praticando as atividades básicas de sobrevivência. Pessoas quando chegam a uma cidade nova adoram explorar a vizinhança e conhecer onde estão os estabelecimentos comerciais que vão lhes garantir a sobrevivência no local (restaurantes, supermercados, farmácia, etc.)</a:t>
+              <a:t> tantos jogos parecidos e usando a mesma fórmula. É mais fácil e mais barato copiar uma fórmula existente que fazer uma nova. Isso significa também que poucos desenvolvedores estudam ou conhecem os fundamentos da diversão.</a:t>
             </a:r>
             <a:endParaRPr lang="pt-BR" dirty="0"/>
           </a:p>
@@ -4985,7 +5551,7 @@
             <a:fld id="{EF334A8D-C5BE-432D-90D0-92D67DD437AB}" type="slidenum">
               <a:rPr lang="pt-BR" smtClean="0"/>
               <a:pPr/>
-              <a:t>8</a:t>
+              <a:t>7</a:t>
             </a:fld>
             <a:endParaRPr lang="pt-BR"/>
           </a:p>
@@ -4994,7 +5560,7 @@
     </p:spTree>
     <p:extLst>
       <p:ext uri="{BB962C8B-B14F-4D97-AF65-F5344CB8AC3E}">
-        <p14:creationId xmlns:p14="http://schemas.microsoft.com/office/powerpoint/2010/main" val="3787773457"/>
+        <p14:creationId xmlns:p14="http://schemas.microsoft.com/office/powerpoint/2010/main" val="881865676"/>
       </p:ext>
     </p:extLst>
   </p:cSld>
@@ -5005,102 +5571,6 @@
 </file>
 
 <file path=ppt/notesSlides/notesSlide8.xml><?xml version="1.0" encoding="utf-8"?>
-<p:notes xmlns:a="http://schemas.openxmlformats.org/drawingml/2006/main" xmlns:r="http://schemas.openxmlformats.org/officeDocument/2006/relationships" xmlns:p="http://schemas.openxmlformats.org/presentationml/2006/main">
-  <p:cSld>
-    <p:spTree>
-      <p:nvGrpSpPr>
-        <p:cNvPr id="1" name=""/>
-        <p:cNvGrpSpPr/>
-        <p:nvPr/>
-      </p:nvGrpSpPr>
-      <p:grpSpPr>
-        <a:xfrm>
-          <a:off x="0" y="0"/>
-          <a:ext cx="0" cy="0"/>
-          <a:chOff x="0" y="0"/>
-          <a:chExt cx="0" cy="0"/>
-        </a:xfrm>
-      </p:grpSpPr>
-      <p:sp>
-        <p:nvSpPr>
-          <p:cNvPr id="2" name="Espaço Reservado para Imagem de Slide 1"/>
-          <p:cNvSpPr>
-            <a:spLocks noGrp="1" noRot="1" noChangeAspect="1"/>
-          </p:cNvSpPr>
-          <p:nvPr>
-            <p:ph type="sldImg"/>
-          </p:nvPr>
-        </p:nvSpPr>
-        <p:spPr/>
-      </p:sp>
-      <p:sp>
-        <p:nvSpPr>
-          <p:cNvPr id="3" name="Espaço Reservado para Anotações 2"/>
-          <p:cNvSpPr>
-            <a:spLocks noGrp="1"/>
-          </p:cNvSpPr>
-          <p:nvPr>
-            <p:ph type="body" idx="1"/>
-          </p:nvPr>
-        </p:nvSpPr>
-        <p:spPr/>
-        <p:txBody>
-          <a:bodyPr/>
-          <a:lstStyle/>
-          <a:p>
-            <a:r>
-              <a:rPr lang="pt-BR" dirty="0"/>
-              <a:t>O criador do </a:t>
-            </a:r>
-            <a:r>
-              <a:rPr lang="pt-BR" dirty="0" err="1"/>
-              <a:t>PacMan</a:t>
-            </a:r>
-            <a:r>
-              <a:rPr lang="pt-BR" dirty="0"/>
-              <a:t> queria fazer um jogo atrativo também para as mulheres, em uma época em que os jogos eram focados em temas masculinos, como a guerra. Comida é um tópico de interesse de ambos os sexos.</a:t>
-            </a:r>
-          </a:p>
-        </p:txBody>
-      </p:sp>
-      <p:sp>
-        <p:nvSpPr>
-          <p:cNvPr id="4" name="Espaço Reservado para Número de Slide 3"/>
-          <p:cNvSpPr>
-            <a:spLocks noGrp="1"/>
-          </p:cNvSpPr>
-          <p:nvPr>
-            <p:ph type="sldNum" sz="quarter" idx="10"/>
-          </p:nvPr>
-        </p:nvSpPr>
-        <p:spPr/>
-        <p:txBody>
-          <a:bodyPr/>
-          <a:lstStyle/>
-          <a:p>
-            <a:fld id="{EF334A8D-C5BE-432D-90D0-92D67DD437AB}" type="slidenum">
-              <a:rPr lang="pt-BR" smtClean="0"/>
-              <a:pPr/>
-              <a:t>9</a:t>
-            </a:fld>
-            <a:endParaRPr lang="pt-BR"/>
-          </a:p>
-        </p:txBody>
-      </p:sp>
-    </p:spTree>
-    <p:extLst>
-      <p:ext uri="{BB962C8B-B14F-4D97-AF65-F5344CB8AC3E}">
-        <p14:creationId xmlns:p14="http://schemas.microsoft.com/office/powerpoint/2010/main" val="3855642716"/>
-      </p:ext>
-    </p:extLst>
-  </p:cSld>
-  <p:clrMapOvr>
-    <a:masterClrMapping/>
-  </p:clrMapOvr>
-</p:notes>
-</file>
-
-<file path=ppt/notesSlides/notesSlide9.xml><?xml version="1.0" encoding="utf-8"?>
 <p:notes xmlns:a="http://schemas.openxmlformats.org/drawingml/2006/main" xmlns:r="http://schemas.openxmlformats.org/officeDocument/2006/relationships" xmlns:p="http://schemas.openxmlformats.org/presentationml/2006/main">
   <p:cSld>
     <p:spTree>
@@ -5151,39 +5621,19 @@
           <a:p>
             <a:r>
               <a:rPr lang="pt-BR" dirty="0"/>
-              <a:t>FPS = </a:t>
-            </a:r>
-            <a:r>
-              <a:rPr lang="pt-BR" dirty="0" err="1"/>
-              <a:t>First</a:t>
+              <a:t>Gatos</a:t>
             </a:r>
             <a:r>
               <a:rPr lang="pt-BR" baseline="0" dirty="0"/>
-              <a:t> Person </a:t>
-            </a:r>
-            <a:r>
-              <a:rPr lang="pt-BR" baseline="0" dirty="0" err="1"/>
-              <a:t>Shotter</a:t>
+              <a:t> e </a:t>
+            </a:r>
+            <a:r>
+              <a:rPr lang="pt-BR" dirty="0"/>
+              <a:t>cães recém nascidos brincam grunhindo, correndo, perseguindo, atacando e rolando</a:t>
             </a:r>
             <a:r>
               <a:rPr lang="pt-BR" baseline="0" dirty="0"/>
-              <a:t>, RPG = Role </a:t>
-            </a:r>
-            <a:r>
-              <a:rPr lang="pt-BR" baseline="0" dirty="0" err="1"/>
-              <a:t>Playing</a:t>
-            </a:r>
-            <a:r>
-              <a:rPr lang="pt-BR" baseline="0" dirty="0"/>
-              <a:t> Game, RTS = Real </a:t>
-            </a:r>
-            <a:r>
-              <a:rPr lang="pt-BR" baseline="0" dirty="0" err="1"/>
-              <a:t>Strategy</a:t>
-            </a:r>
-            <a:r>
-              <a:rPr lang="pt-BR" baseline="0" dirty="0"/>
-              <a:t> Game</a:t>
+              <a:t> com seus irmãos. Eles brincam praticando as atividades básicas de sobrevivência. Pessoas quando chegam a uma cidade nova adoram explorar a vizinhança e conhecer onde estão os estabelecimentos comerciais que vão lhes garantir a sobrevivência no local (restaurantes, supermercados, farmácia, etc.)</a:t>
             </a:r>
             <a:endParaRPr lang="pt-BR" dirty="0"/>
           </a:p>
@@ -5207,7 +5657,7 @@
             <a:fld id="{EF334A8D-C5BE-432D-90D0-92D67DD437AB}" type="slidenum">
               <a:rPr lang="pt-BR" smtClean="0"/>
               <a:pPr/>
-              <a:t>10</a:t>
+              <a:t>8</a:t>
             </a:fld>
             <a:endParaRPr lang="pt-BR"/>
           </a:p>
@@ -5216,7 +5666,103 @@
     </p:spTree>
     <p:extLst>
       <p:ext uri="{BB962C8B-B14F-4D97-AF65-F5344CB8AC3E}">
-        <p14:creationId xmlns:p14="http://schemas.microsoft.com/office/powerpoint/2010/main" val="3101639942"/>
+        <p14:creationId xmlns:p14="http://schemas.microsoft.com/office/powerpoint/2010/main" val="3787773457"/>
+      </p:ext>
+    </p:extLst>
+  </p:cSld>
+  <p:clrMapOvr>
+    <a:masterClrMapping/>
+  </p:clrMapOvr>
+</p:notes>
+</file>
+
+<file path=ppt/notesSlides/notesSlide9.xml><?xml version="1.0" encoding="utf-8"?>
+<p:notes xmlns:a="http://schemas.openxmlformats.org/drawingml/2006/main" xmlns:r="http://schemas.openxmlformats.org/officeDocument/2006/relationships" xmlns:p="http://schemas.openxmlformats.org/presentationml/2006/main">
+  <p:cSld>
+    <p:spTree>
+      <p:nvGrpSpPr>
+        <p:cNvPr id="1" name=""/>
+        <p:cNvGrpSpPr/>
+        <p:nvPr/>
+      </p:nvGrpSpPr>
+      <p:grpSpPr>
+        <a:xfrm>
+          <a:off x="0" y="0"/>
+          <a:ext cx="0" cy="0"/>
+          <a:chOff x="0" y="0"/>
+          <a:chExt cx="0" cy="0"/>
+        </a:xfrm>
+      </p:grpSpPr>
+      <p:sp>
+        <p:nvSpPr>
+          <p:cNvPr id="2" name="Espaço Reservado para Imagem de Slide 1"/>
+          <p:cNvSpPr>
+            <a:spLocks noGrp="1" noRot="1" noChangeAspect="1"/>
+          </p:cNvSpPr>
+          <p:nvPr>
+            <p:ph type="sldImg"/>
+          </p:nvPr>
+        </p:nvSpPr>
+        <p:spPr/>
+      </p:sp>
+      <p:sp>
+        <p:nvSpPr>
+          <p:cNvPr id="3" name="Espaço Reservado para Anotações 2"/>
+          <p:cNvSpPr>
+            <a:spLocks noGrp="1"/>
+          </p:cNvSpPr>
+          <p:nvPr>
+            <p:ph type="body" idx="1"/>
+          </p:nvPr>
+        </p:nvSpPr>
+        <p:spPr/>
+        <p:txBody>
+          <a:bodyPr/>
+          <a:lstStyle/>
+          <a:p>
+            <a:r>
+              <a:rPr lang="pt-BR" dirty="0"/>
+              <a:t>O criador do </a:t>
+            </a:r>
+            <a:r>
+              <a:rPr lang="pt-BR" dirty="0" err="1"/>
+              <a:t>PacMan</a:t>
+            </a:r>
+            <a:r>
+              <a:rPr lang="pt-BR" dirty="0"/>
+              <a:t> queria fazer um jogo atrativo também para as mulheres, em uma época em que os jogos eram focados em temas masculinos, como a guerra. Comida é um tópico de interesse de ambos os sexos.</a:t>
+            </a:r>
+          </a:p>
+        </p:txBody>
+      </p:sp>
+      <p:sp>
+        <p:nvSpPr>
+          <p:cNvPr id="4" name="Espaço Reservado para Número de Slide 3"/>
+          <p:cNvSpPr>
+            <a:spLocks noGrp="1"/>
+          </p:cNvSpPr>
+          <p:nvPr>
+            <p:ph type="sldNum" sz="quarter" idx="10"/>
+          </p:nvPr>
+        </p:nvSpPr>
+        <p:spPr/>
+        <p:txBody>
+          <a:bodyPr/>
+          <a:lstStyle/>
+          <a:p>
+            <a:fld id="{EF334A8D-C5BE-432D-90D0-92D67DD437AB}" type="slidenum">
+              <a:rPr lang="pt-BR" smtClean="0"/>
+              <a:pPr/>
+              <a:t>9</a:t>
+            </a:fld>
+            <a:endParaRPr lang="pt-BR"/>
+          </a:p>
+        </p:txBody>
+      </p:sp>
+    </p:spTree>
+    <p:extLst>
+      <p:ext uri="{BB962C8B-B14F-4D97-AF65-F5344CB8AC3E}">
+        <p14:creationId xmlns:p14="http://schemas.microsoft.com/office/powerpoint/2010/main" val="3855642716"/>
       </p:ext>
     </p:extLst>
   </p:cSld>
@@ -5802,6 +6348,209 @@
           </a:p>
         </p:txBody>
       </p:sp>
+      <p:sp>
+        <p:nvSpPr>
+          <p:cNvPr id="13" name="Triângulo retângulo 13">
+            <a:extLst>
+              <a:ext uri="{FF2B5EF4-FFF2-40B4-BE49-F238E27FC236}">
+                <a16:creationId xmlns:a16="http://schemas.microsoft.com/office/drawing/2014/main" id="{9CF3D794-194E-0B48-B22A-6D40F2635AB6}"/>
+              </a:ext>
+            </a:extLst>
+          </p:cNvPr>
+          <p:cNvSpPr>
+            <a:spLocks/>
+          </p:cNvSpPr>
+          <p:nvPr userDrawn="1"/>
+        </p:nvSpPr>
+        <p:spPr bwMode="auto">
+          <a:xfrm rot="10800000" flipH="1">
+            <a:off x="0" y="-5"/>
+            <a:ext cx="6600056" cy="836713"/>
+          </a:xfrm>
+          <a:prstGeom prst="rtTriangle">
+            <a:avLst/>
+          </a:prstGeom>
+          <a:blipFill>
+            <a:blip r:embed="rId2">
+              <a:alphaModFix amt="50000"/>
+            </a:blip>
+            <a:tile tx="0" ty="0" sx="50000" sy="50000" flip="none" algn="t"/>
+          </a:blipFill>
+          <a:ln w="12700" cap="rnd" cmpd="thickThin" algn="ctr">
+            <a:noFill/>
+            <a:prstDash val="solid"/>
+          </a:ln>
+          <a:effectLst>
+            <a:fillOverlay blend="mult">
+              <a:gradFill flip="none" rotWithShape="1">
+                <a:gsLst>
+                  <a:gs pos="0">
+                    <a:schemeClr val="accent1">
+                      <a:shade val="20000"/>
+                      <a:satMod val="176000"/>
+                      <a:alpha val="100000"/>
+                    </a:schemeClr>
+                  </a:gs>
+                  <a:gs pos="18000">
+                    <a:schemeClr val="accent1">
+                      <a:shade val="48000"/>
+                      <a:satMod val="153000"/>
+                      <a:alpha val="100000"/>
+                    </a:schemeClr>
+                  </a:gs>
+                  <a:gs pos="43000">
+                    <a:schemeClr val="accent1">
+                      <a:tint val="86000"/>
+                      <a:satMod val="149000"/>
+                      <a:alpha val="100000"/>
+                    </a:schemeClr>
+                  </a:gs>
+                  <a:gs pos="45000">
+                    <a:schemeClr val="accent1">
+                      <a:tint val="85000"/>
+                      <a:satMod val="150000"/>
+                      <a:alpha val="100000"/>
+                    </a:schemeClr>
+                  </a:gs>
+                  <a:gs pos="50000">
+                    <a:schemeClr val="accent1">
+                      <a:tint val="86000"/>
+                      <a:satMod val="149000"/>
+                      <a:alpha val="100000"/>
+                    </a:schemeClr>
+                  </a:gs>
+                  <a:gs pos="79000">
+                    <a:schemeClr val="accent1">
+                      <a:shade val="53000"/>
+                      <a:satMod val="150000"/>
+                      <a:alpha val="100000"/>
+                    </a:schemeClr>
+                  </a:gs>
+                  <a:gs pos="100000">
+                    <a:schemeClr val="accent1">
+                      <a:shade val="25000"/>
+                      <a:satMod val="170000"/>
+                      <a:alpha val="100000"/>
+                    </a:schemeClr>
+                  </a:gs>
+                </a:gsLst>
+                <a:lin ang="450000" scaled="1"/>
+                <a:tileRect/>
+              </a:gradFill>
+            </a:fillOverlay>
+          </a:effectLst>
+        </p:spPr>
+        <p:style>
+          <a:lnRef idx="3">
+            <a:schemeClr val="lt1"/>
+          </a:lnRef>
+          <a:fillRef idx="1">
+            <a:schemeClr val="accent1"/>
+          </a:fillRef>
+          <a:effectRef idx="1">
+            <a:schemeClr val="accent1"/>
+          </a:effectRef>
+          <a:fontRef idx="minor">
+            <a:schemeClr val="lt1"/>
+          </a:fontRef>
+        </p:style>
+        <p:txBody>
+          <a:bodyPr vert="horz" wrap="square" lIns="91440" tIns="45720" rIns="91440" bIns="45720" anchor="ctr" compatLnSpc="1"/>
+          <a:lstStyle/>
+          <a:p>
+            <a:pPr algn="ctr" eaLnBrk="1" latinLnBrk="0" hangingPunct="1"/>
+            <a:endParaRPr kumimoji="0" lang="en-US" sz="1800"/>
+          </a:p>
+        </p:txBody>
+      </p:sp>
+      <p:sp>
+        <p:nvSpPr>
+          <p:cNvPr id="14" name="Forma livre 12">
+            <a:extLst>
+              <a:ext uri="{FF2B5EF4-FFF2-40B4-BE49-F238E27FC236}">
+                <a16:creationId xmlns:a16="http://schemas.microsoft.com/office/drawing/2014/main" id="{C06930A2-8B68-504E-8DC6-B433F1113532}"/>
+              </a:ext>
+            </a:extLst>
+          </p:cNvPr>
+          <p:cNvSpPr>
+            <a:spLocks/>
+          </p:cNvSpPr>
+          <p:nvPr userDrawn="1"/>
+        </p:nvSpPr>
+        <p:spPr bwMode="auto">
+          <a:xfrm flipV="1">
+            <a:off x="-2" y="0"/>
+            <a:ext cx="12192002" cy="892452"/>
+          </a:xfrm>
+          <a:custGeom>
+            <a:avLst>
+              <a:gd name="A1" fmla="val 0"/>
+              <a:gd name="A2" fmla="val 0"/>
+              <a:gd name="A3" fmla="val 0"/>
+              <a:gd name="A4" fmla="val 0"/>
+              <a:gd name="A5" fmla="val 0"/>
+              <a:gd name="A6" fmla="val 0"/>
+              <a:gd name="A7" fmla="val 0"/>
+              <a:gd name="A8" fmla="val 0"/>
+            </a:avLst>
+            <a:gdLst/>
+            <a:ahLst/>
+            <a:cxnLst>
+              <a:cxn ang="0">
+                <a:pos x="0" y="0"/>
+              </a:cxn>
+              <a:cxn ang="0">
+                <a:pos x="5760" y="0"/>
+              </a:cxn>
+              <a:cxn ang="0">
+                <a:pos x="5760" y="528"/>
+              </a:cxn>
+              <a:cxn ang="0">
+                <a:pos x="48" y="0"/>
+              </a:cxn>
+            </a:cxnLst>
+            <a:rect l="0" t="0" r="0" b="0"/>
+            <a:pathLst>
+              <a:path w="7485" h="337">
+                <a:moveTo>
+                  <a:pt x="0" y="2"/>
+                </a:moveTo>
+                <a:lnTo>
+                  <a:pt x="7485" y="337"/>
+                </a:lnTo>
+                <a:lnTo>
+                  <a:pt x="5558" y="337"/>
+                </a:lnTo>
+                <a:lnTo>
+                  <a:pt x="1" y="0"/>
+                </a:lnTo>
+              </a:path>
+            </a:pathLst>
+          </a:custGeom>
+          <a:solidFill>
+            <a:schemeClr val="accent1">
+              <a:tint val="65000"/>
+              <a:satMod val="115000"/>
+              <a:alpha val="40000"/>
+            </a:schemeClr>
+          </a:solidFill>
+          <a:ln w="9525" cap="flat" cmpd="sng" algn="ctr">
+            <a:noFill/>
+            <a:prstDash val="solid"/>
+            <a:round/>
+            <a:headEnd type="none" w="med" len="med"/>
+            <a:tailEnd type="none" w="med" len="med"/>
+          </a:ln>
+          <a:effectLst/>
+        </p:spPr>
+        <p:txBody>
+          <a:bodyPr vert="horz" wrap="square" lIns="91440" tIns="45720" rIns="91440" bIns="45720" anchor="t" compatLnSpc="1"/>
+          <a:lstStyle/>
+          <a:p>
+            <a:endParaRPr kumimoji="0" lang="en-US" sz="1800"/>
+          </a:p>
+        </p:txBody>
+      </p:sp>
     </p:spTree>
   </p:cSld>
   <p:clrMapOvr>
@@ -5925,7 +6674,7 @@
             <a:fld id="{B41ABA4E-CD72-497B-97AA-7213B3980F60}" type="datetimeFigureOut">
               <a:rPr lang="en-US" smtClean="0"/>
               <a:pPr/>
-              <a:t>7/6/2021</a:t>
+              <a:t>7/14/2021</a:t>
             </a:fld>
             <a:endParaRPr lang="en-US" dirty="0"/>
           </a:p>
@@ -6102,7 +6851,7 @@
             <a:fld id="{B41ABA4E-CD72-497B-97AA-7213B3980F60}" type="datetimeFigureOut">
               <a:rPr lang="en-US" smtClean="0"/>
               <a:pPr/>
-              <a:t>7/6/2021</a:t>
+              <a:t>7/14/2021</a:t>
             </a:fld>
             <a:endParaRPr lang="en-US" dirty="0"/>
           </a:p>
@@ -6298,7 +7047,7 @@
             <a:fld id="{B41ABA4E-CD72-497B-97AA-7213B3980F60}" type="datetimeFigureOut">
               <a:rPr lang="en-US" smtClean="0"/>
               <a:pPr/>
-              <a:t>7/6/2021</a:t>
+              <a:t>7/14/2021</a:t>
             </a:fld>
             <a:endParaRPr lang="en-US" dirty="0"/>
           </a:p>
@@ -6559,7 +7308,7 @@
             <a:fld id="{B41ABA4E-CD72-497B-97AA-7213B3980F60}" type="datetimeFigureOut">
               <a:rPr lang="en-US" smtClean="0"/>
               <a:pPr/>
-              <a:t>7/6/2021</a:t>
+              <a:t>7/14/2021</a:t>
             </a:fld>
             <a:endParaRPr lang="en-US" dirty="0"/>
           </a:p>
@@ -6960,7 +7709,7 @@
             <a:fld id="{B41ABA4E-CD72-497B-97AA-7213B3980F60}" type="datetimeFigureOut">
               <a:rPr lang="en-US" smtClean="0"/>
               <a:pPr/>
-              <a:t>7/6/2021</a:t>
+              <a:t>7/14/2021</a:t>
             </a:fld>
             <a:endParaRPr lang="en-US" dirty="0"/>
           </a:p>
@@ -7400,7 +8149,7 @@
             <a:fld id="{B41ABA4E-CD72-497B-97AA-7213B3980F60}" type="datetimeFigureOut">
               <a:rPr lang="en-US" smtClean="0"/>
               <a:pPr/>
-              <a:t>7/6/2021</a:t>
+              <a:t>7/14/2021</a:t>
             </a:fld>
             <a:endParaRPr lang="en-US" dirty="0"/>
           </a:p>
@@ -7497,7 +8246,7 @@
             <a:fld id="{B41ABA4E-CD72-497B-97AA-7213B3980F60}" type="datetimeFigureOut">
               <a:rPr lang="en-US" smtClean="0"/>
               <a:pPr/>
-              <a:t>7/6/2021</a:t>
+              <a:t>7/14/2021</a:t>
             </a:fld>
             <a:endParaRPr lang="en-US" dirty="0"/>
           </a:p>
@@ -7612,7 +8361,7 @@
             <a:fld id="{B41ABA4E-CD72-497B-97AA-7213B3980F60}" type="datetimeFigureOut">
               <a:rPr lang="en-US" smtClean="0"/>
               <a:pPr/>
-              <a:t>7/6/2021</a:t>
+              <a:t>7/14/2021</a:t>
             </a:fld>
             <a:endParaRPr lang="en-US" dirty="0"/>
           </a:p>
@@ -7882,7 +8631,7 @@
             <a:fld id="{B41ABA4E-CD72-497B-97AA-7213B3980F60}" type="datetimeFigureOut">
               <a:rPr lang="en-US" smtClean="0"/>
               <a:pPr/>
-              <a:t>7/6/2021</a:t>
+              <a:t>7/14/2021</a:t>
             </a:fld>
             <a:endParaRPr lang="en-US" dirty="0"/>
           </a:p>
@@ -8085,7 +8834,7 @@
             <a:fld id="{B41ABA4E-CD72-497B-97AA-7213B3980F60}" type="datetimeFigureOut">
               <a:rPr lang="en-US" smtClean="0"/>
               <a:pPr/>
-              <a:t>7/6/2021</a:t>
+              <a:t>7/14/2021</a:t>
             </a:fld>
             <a:endParaRPr lang="en-US" dirty="0"/>
           </a:p>
@@ -8833,12 +9582,232 @@
           </a:p>
         </p:txBody>
       </p:sp>
+      <p:sp>
+        <p:nvSpPr>
+          <p:cNvPr id="9" name="Espaço Reservado para Título 8"/>
+          <p:cNvSpPr>
+            <a:spLocks noGrp="1"/>
+          </p:cNvSpPr>
+          <p:nvPr userDrawn="1">
+            <p:ph type="title"/>
+          </p:nvPr>
+        </p:nvSpPr>
+        <p:spPr>
+          <a:xfrm>
+            <a:off x="609600" y="274638"/>
+            <a:ext cx="10972800" cy="1143000"/>
+          </a:xfrm>
+          <a:prstGeom prst="rect">
+            <a:avLst/>
+          </a:prstGeom>
+        </p:spPr>
+        <p:txBody>
+          <a:bodyPr vert="horz" anchor="ctr">
+            <a:normAutofit/>
+            <a:scene3d>
+              <a:camera prst="orthographicFront"/>
+              <a:lightRig rig="soft" dir="t"/>
+            </a:scene3d>
+            <a:sp3d prstMaterial="softEdge">
+              <a:bevelT w="25400" h="25400"/>
+            </a:sp3d>
+          </a:bodyPr>
+          <a:lstStyle/>
+          <a:p>
+            <a:r>
+              <a:rPr kumimoji="0" lang="pt-BR"/>
+              <a:t>Clique para editar o título mestre</a:t>
+            </a:r>
+            <a:endParaRPr kumimoji="0" lang="en-US"/>
+          </a:p>
+        </p:txBody>
+      </p:sp>
+      <p:sp>
+        <p:nvSpPr>
+          <p:cNvPr id="30" name="Espaço Reservado para Texto 29"/>
+          <p:cNvSpPr>
+            <a:spLocks noGrp="1"/>
+          </p:cNvSpPr>
+          <p:nvPr userDrawn="1">
+            <p:ph type="body" idx="1"/>
+          </p:nvPr>
+        </p:nvSpPr>
+        <p:spPr>
+          <a:xfrm>
+            <a:off x="609600" y="1481329"/>
+            <a:ext cx="10972800" cy="4525963"/>
+          </a:xfrm>
+          <a:prstGeom prst="rect">
+            <a:avLst/>
+          </a:prstGeom>
+        </p:spPr>
+        <p:txBody>
+          <a:bodyPr vert="horz">
+            <a:normAutofit/>
+          </a:bodyPr>
+          <a:lstStyle/>
+          <a:p>
+            <a:pPr lvl="0" eaLnBrk="1" latinLnBrk="0" hangingPunct="1"/>
+            <a:r>
+              <a:rPr kumimoji="0" lang="pt-BR"/>
+              <a:t>Clique para editar o texto mestre</a:t>
+            </a:r>
+          </a:p>
+          <a:p>
+            <a:pPr lvl="1" eaLnBrk="1" latinLnBrk="0" hangingPunct="1"/>
+            <a:r>
+              <a:rPr kumimoji="0" lang="pt-BR"/>
+              <a:t>Segundo nível</a:t>
+            </a:r>
+          </a:p>
+          <a:p>
+            <a:pPr lvl="2" eaLnBrk="1" latinLnBrk="0" hangingPunct="1"/>
+            <a:r>
+              <a:rPr kumimoji="0" lang="pt-BR"/>
+              <a:t>Terceiro nível</a:t>
+            </a:r>
+          </a:p>
+          <a:p>
+            <a:pPr lvl="3" eaLnBrk="1" latinLnBrk="0" hangingPunct="1"/>
+            <a:r>
+              <a:rPr kumimoji="0" lang="pt-BR"/>
+              <a:t>Quarto nível</a:t>
+            </a:r>
+          </a:p>
+          <a:p>
+            <a:pPr lvl="4" eaLnBrk="1" latinLnBrk="0" hangingPunct="1"/>
+            <a:r>
+              <a:rPr kumimoji="0" lang="pt-BR"/>
+              <a:t>Quinto nível</a:t>
+            </a:r>
+            <a:endParaRPr kumimoji="0" lang="en-US"/>
+          </a:p>
+        </p:txBody>
+      </p:sp>
+      <p:sp>
+        <p:nvSpPr>
+          <p:cNvPr id="10" name="Espaço Reservado para Data 9"/>
+          <p:cNvSpPr>
+            <a:spLocks noGrp="1"/>
+          </p:cNvSpPr>
+          <p:nvPr userDrawn="1">
+            <p:ph type="dt" sz="half" idx="2"/>
+          </p:nvPr>
+        </p:nvSpPr>
+        <p:spPr>
+          <a:xfrm>
+            <a:off x="8969376" y="6407944"/>
+            <a:ext cx="2560320" cy="365760"/>
+          </a:xfrm>
+          <a:prstGeom prst="rect">
+            <a:avLst/>
+          </a:prstGeom>
+        </p:spPr>
+        <p:txBody>
+          <a:bodyPr vert="horz" anchor="b"/>
+          <a:lstStyle>
+            <a:lvl1pPr algn="l" eaLnBrk="1" latinLnBrk="0" hangingPunct="1">
+              <a:defRPr kumimoji="0" sz="1000">
+                <a:solidFill>
+                  <a:schemeClr val="tx1"/>
+                </a:solidFill>
+              </a:defRPr>
+            </a:lvl1pPr>
+            <a:extLst/>
+          </a:lstStyle>
+          <a:p>
+            <a:fld id="{B41ABA4E-CD72-497B-97AA-7213B3980F60}" type="datetimeFigureOut">
+              <a:rPr lang="en-US" smtClean="0"/>
+              <a:pPr/>
+              <a:t>7/14/2021</a:t>
+            </a:fld>
+            <a:endParaRPr lang="en-US" dirty="0"/>
+          </a:p>
+        </p:txBody>
+      </p:sp>
+      <p:sp>
+        <p:nvSpPr>
+          <p:cNvPr id="22" name="Espaço Reservado para Rodapé 21"/>
+          <p:cNvSpPr>
+            <a:spLocks noGrp="1"/>
+          </p:cNvSpPr>
+          <p:nvPr userDrawn="1">
+            <p:ph type="ftr" sz="quarter" idx="3"/>
+          </p:nvPr>
+        </p:nvSpPr>
+        <p:spPr>
+          <a:xfrm>
+            <a:off x="5840097" y="6407945"/>
+            <a:ext cx="3134241" cy="365125"/>
+          </a:xfrm>
+          <a:prstGeom prst="rect">
+            <a:avLst/>
+          </a:prstGeom>
+        </p:spPr>
+        <p:txBody>
+          <a:bodyPr vert="horz" anchor="b"/>
+          <a:lstStyle>
+            <a:lvl1pPr algn="r" eaLnBrk="1" latinLnBrk="0" hangingPunct="1">
+              <a:defRPr kumimoji="0" sz="1000">
+                <a:solidFill>
+                  <a:schemeClr val="tx1"/>
+                </a:solidFill>
+              </a:defRPr>
+            </a:lvl1pPr>
+            <a:extLst/>
+          </a:lstStyle>
+          <a:p>
+            <a:endParaRPr kumimoji="0" lang="en-US" dirty="0"/>
+          </a:p>
+        </p:txBody>
+      </p:sp>
+      <p:sp>
+        <p:nvSpPr>
+          <p:cNvPr id="18" name="Espaço Reservado para Número de Slide 17"/>
+          <p:cNvSpPr>
+            <a:spLocks noGrp="1"/>
+          </p:cNvSpPr>
+          <p:nvPr userDrawn="1">
+            <p:ph type="sldNum" sz="quarter" idx="4"/>
+          </p:nvPr>
+        </p:nvSpPr>
+        <p:spPr>
+          <a:xfrm>
+            <a:off x="11529696" y="6407945"/>
+            <a:ext cx="487680" cy="365125"/>
+          </a:xfrm>
+          <a:prstGeom prst="rect">
+            <a:avLst/>
+          </a:prstGeom>
+        </p:spPr>
+        <p:txBody>
+          <a:bodyPr vert="horz" anchor="b"/>
+          <a:lstStyle>
+            <a:lvl1pPr algn="r" eaLnBrk="1" latinLnBrk="0" hangingPunct="1">
+              <a:defRPr kumimoji="0" sz="1000" b="0">
+                <a:solidFill>
+                  <a:schemeClr val="tx1"/>
+                </a:solidFill>
+              </a:defRPr>
+            </a:lvl1pPr>
+            <a:extLst/>
+          </a:lstStyle>
+          <a:p>
+            <a:fld id="{D2E57653-3E58-4892-A7ED-712530ACC680}" type="slidenum">
+              <a:rPr kumimoji="0" lang="en-US" smtClean="0"/>
+              <a:pPr/>
+              <a:t>‹nº›</a:t>
+            </a:fld>
+            <a:endParaRPr kumimoji="0" lang="en-US" dirty="0"/>
+          </a:p>
+        </p:txBody>
+      </p:sp>
       <p:grpSp>
         <p:nvGrpSpPr>
-          <p:cNvPr id="8" name="Agrupar 7">
+          <p:cNvPr id="15" name="Agrupar 14">
             <a:extLst>
               <a:ext uri="{FF2B5EF4-FFF2-40B4-BE49-F238E27FC236}">
-                <a16:creationId xmlns:a16="http://schemas.microsoft.com/office/drawing/2014/main" id="{4562553E-F5D4-432E-B5BE-4474E320B598}"/>
+                <a16:creationId xmlns:a16="http://schemas.microsoft.com/office/drawing/2014/main" id="{E563939D-B587-6C4C-80CC-9AA6B9FB583C}"/>
               </a:ext>
             </a:extLst>
           </p:cNvPr>
@@ -8847,95 +9816,21 @@
         </p:nvGrpSpPr>
         <p:grpSpPr>
           <a:xfrm>
-            <a:off x="-8056" y="5974521"/>
-            <a:ext cx="5744016" cy="883479"/>
-            <a:chOff x="-8056" y="5974521"/>
-            <a:chExt cx="5744016" cy="883479"/>
+            <a:off x="0" y="6007292"/>
+            <a:ext cx="5591944" cy="850708"/>
+            <a:chOff x="0" y="6317566"/>
+            <a:chExt cx="4759907" cy="540434"/>
           </a:xfrm>
         </p:grpSpPr>
         <p:sp>
           <p:nvSpPr>
-            <p:cNvPr id="12" name="Forma livre 11"/>
-            <p:cNvSpPr>
-              <a:spLocks/>
-            </p:cNvSpPr>
-            <p:nvPr userDrawn="1"/>
-          </p:nvSpPr>
-          <p:spPr bwMode="auto">
-            <a:xfrm>
-              <a:off x="647623" y="5974521"/>
-              <a:ext cx="4920601" cy="883479"/>
-            </a:xfrm>
-            <a:custGeom>
-              <a:avLst>
-                <a:gd name="A1" fmla="val 0"/>
-                <a:gd name="A2" fmla="val 0"/>
-                <a:gd name="A3" fmla="val 0"/>
-                <a:gd name="A4" fmla="val 0"/>
-                <a:gd name="A5" fmla="val 0"/>
-                <a:gd name="A6" fmla="val 0"/>
-                <a:gd name="A7" fmla="val 0"/>
-                <a:gd name="A8" fmla="val 0"/>
-              </a:avLst>
-              <a:gdLst/>
-              <a:ahLst/>
-              <a:cxnLst>
-                <a:cxn ang="0">
-                  <a:pos x="0" y="0"/>
-                </a:cxn>
-                <a:cxn ang="0">
-                  <a:pos x="5760" y="0"/>
-                </a:cxn>
-                <a:cxn ang="0">
-                  <a:pos x="5760" y="528"/>
-                </a:cxn>
-                <a:cxn ang="0">
-                  <a:pos x="48" y="0"/>
-                </a:cxn>
-              </a:cxnLst>
-              <a:rect l="0" t="0" r="0" b="0"/>
-              <a:pathLst>
-                <a:path w="5591" h="588">
-                  <a:moveTo>
-                    <a:pt x="0" y="0"/>
-                  </a:moveTo>
-                  <a:lnTo>
-                    <a:pt x="5591" y="585"/>
-                  </a:lnTo>
-                  <a:lnTo>
-                    <a:pt x="4415" y="588"/>
-                  </a:lnTo>
-                  <a:lnTo>
-                    <a:pt x="12" y="4"/>
-                  </a:lnTo>
-                </a:path>
-              </a:pathLst>
-            </a:custGeom>
-            <a:solidFill>
-              <a:srgbClr val="000000">
-                <a:alpha val="100000"/>
-              </a:srgbClr>
-            </a:solidFill>
-            <a:ln w="9525" cap="flat" cmpd="sng" algn="ctr">
-              <a:noFill/>
-              <a:prstDash val="solid"/>
-              <a:round/>
-              <a:headEnd type="none" w="med" len="med"/>
-              <a:tailEnd type="none" w="med" len="med"/>
-            </a:ln>
-            <a:effectLst/>
-          </p:spPr>
-          <p:txBody>
-            <a:bodyPr vert="horz" wrap="square" lIns="91440" tIns="45720" rIns="91440" bIns="45720" anchor="t" compatLnSpc="1"/>
-            <a:lstStyle/>
-            <a:p>
-              <a:endParaRPr kumimoji="0" lang="en-US" sz="1800"/>
-            </a:p>
-          </p:txBody>
-        </p:sp>
-        <p:sp>
-          <p:nvSpPr>
-            <p:cNvPr id="13" name="Forma livre 12"/>
+            <p:cNvPr id="16" name="Forma livre 12">
+              <a:extLst>
+                <a:ext uri="{FF2B5EF4-FFF2-40B4-BE49-F238E27FC236}">
+                  <a16:creationId xmlns:a16="http://schemas.microsoft.com/office/drawing/2014/main" id="{C85B54CA-D567-7342-A08A-AAE8198C5DDC}"/>
+                </a:ext>
+              </a:extLst>
+            </p:cNvPr>
             <p:cNvSpPr>
               <a:spLocks/>
             </p:cNvSpPr>
@@ -8943,8 +9838,8 @@
           </p:nvSpPr>
           <p:spPr bwMode="auto">
             <a:xfrm>
-              <a:off x="524917" y="6327571"/>
-              <a:ext cx="5211043" cy="530429"/>
+              <a:off x="673754" y="6391353"/>
+              <a:ext cx="4086153" cy="460538"/>
             </a:xfrm>
             <a:custGeom>
               <a:avLst>
@@ -9017,7 +9912,13 @@
         </p:sp>
         <p:sp>
           <p:nvSpPr>
-            <p:cNvPr id="14" name="Triângulo retângulo 13"/>
+            <p:cNvPr id="17" name="Forma livre 11">
+              <a:extLst>
+                <a:ext uri="{FF2B5EF4-FFF2-40B4-BE49-F238E27FC236}">
+                  <a16:creationId xmlns:a16="http://schemas.microsoft.com/office/drawing/2014/main" id="{E3DE26D8-3788-744E-B1E9-FCC6566781BD}"/>
+                </a:ext>
+              </a:extLst>
+            </p:cNvPr>
             <p:cNvSpPr>
               <a:spLocks/>
             </p:cNvSpPr>
@@ -9025,8 +9926,94 @@
           </p:nvSpPr>
           <p:spPr bwMode="auto">
             <a:xfrm>
-              <a:off x="-8056" y="6237311"/>
-              <a:ext cx="3588536" cy="620689"/>
+              <a:off x="655680" y="6404539"/>
+              <a:ext cx="3052195" cy="447352"/>
+            </a:xfrm>
+            <a:custGeom>
+              <a:avLst>
+                <a:gd name="A1" fmla="val 0"/>
+                <a:gd name="A2" fmla="val 0"/>
+                <a:gd name="A3" fmla="val 0"/>
+                <a:gd name="A4" fmla="val 0"/>
+                <a:gd name="A5" fmla="val 0"/>
+                <a:gd name="A6" fmla="val 0"/>
+                <a:gd name="A7" fmla="val 0"/>
+                <a:gd name="A8" fmla="val 0"/>
+              </a:avLst>
+              <a:gdLst/>
+              <a:ahLst/>
+              <a:cxnLst>
+                <a:cxn ang="0">
+                  <a:pos x="0" y="0"/>
+                </a:cxn>
+                <a:cxn ang="0">
+                  <a:pos x="5760" y="0"/>
+                </a:cxn>
+                <a:cxn ang="0">
+                  <a:pos x="5760" y="528"/>
+                </a:cxn>
+                <a:cxn ang="0">
+                  <a:pos x="48" y="0"/>
+                </a:cxn>
+              </a:cxnLst>
+              <a:rect l="0" t="0" r="0" b="0"/>
+              <a:pathLst>
+                <a:path w="5591" h="588">
+                  <a:moveTo>
+                    <a:pt x="0" y="0"/>
+                  </a:moveTo>
+                  <a:lnTo>
+                    <a:pt x="5591" y="585"/>
+                  </a:lnTo>
+                  <a:lnTo>
+                    <a:pt x="4415" y="588"/>
+                  </a:lnTo>
+                  <a:lnTo>
+                    <a:pt x="12" y="4"/>
+                  </a:lnTo>
+                </a:path>
+              </a:pathLst>
+            </a:custGeom>
+            <a:solidFill>
+              <a:srgbClr val="000000">
+                <a:alpha val="100000"/>
+              </a:srgbClr>
+            </a:solidFill>
+            <a:ln w="9525" cap="flat" cmpd="sng" algn="ctr">
+              <a:noFill/>
+              <a:prstDash val="solid"/>
+              <a:round/>
+              <a:headEnd type="none" w="med" len="med"/>
+              <a:tailEnd type="none" w="med" len="med"/>
+            </a:ln>
+            <a:effectLst/>
+          </p:spPr>
+          <p:txBody>
+            <a:bodyPr vert="horz" wrap="square" lIns="91440" tIns="45720" rIns="91440" bIns="45720" anchor="t" compatLnSpc="1"/>
+            <a:lstStyle/>
+            <a:p>
+              <a:endParaRPr kumimoji="0" lang="en-US" sz="1800"/>
+            </a:p>
+          </p:txBody>
+        </p:sp>
+        <p:sp>
+          <p:nvSpPr>
+            <p:cNvPr id="19" name="Triângulo retângulo 13">
+              <a:extLst>
+                <a:ext uri="{FF2B5EF4-FFF2-40B4-BE49-F238E27FC236}">
+                  <a16:creationId xmlns:a16="http://schemas.microsoft.com/office/drawing/2014/main" id="{0D9BBDB7-69EA-8C4B-BDEF-16F453718B5C}"/>
+                </a:ext>
+              </a:extLst>
+            </p:cNvPr>
+            <p:cNvSpPr>
+              <a:spLocks/>
+            </p:cNvSpPr>
+            <p:nvPr/>
+          </p:nvSpPr>
+          <p:spPr bwMode="auto">
+            <a:xfrm>
+              <a:off x="0" y="6317566"/>
+              <a:ext cx="2813891" cy="540434"/>
             </a:xfrm>
             <a:prstGeom prst="rtTriangle">
               <a:avLst/>
@@ -9125,226 +10112,6 @@
           </p:txBody>
         </p:sp>
       </p:grpSp>
-      <p:sp>
-        <p:nvSpPr>
-          <p:cNvPr id="9" name="Espaço Reservado para Título 8"/>
-          <p:cNvSpPr>
-            <a:spLocks noGrp="1"/>
-          </p:cNvSpPr>
-          <p:nvPr userDrawn="1">
-            <p:ph type="title"/>
-          </p:nvPr>
-        </p:nvSpPr>
-        <p:spPr>
-          <a:xfrm>
-            <a:off x="609600" y="274638"/>
-            <a:ext cx="10972800" cy="1143000"/>
-          </a:xfrm>
-          <a:prstGeom prst="rect">
-            <a:avLst/>
-          </a:prstGeom>
-        </p:spPr>
-        <p:txBody>
-          <a:bodyPr vert="horz" anchor="ctr">
-            <a:normAutofit/>
-            <a:scene3d>
-              <a:camera prst="orthographicFront"/>
-              <a:lightRig rig="soft" dir="t"/>
-            </a:scene3d>
-            <a:sp3d prstMaterial="softEdge">
-              <a:bevelT w="25400" h="25400"/>
-            </a:sp3d>
-          </a:bodyPr>
-          <a:lstStyle/>
-          <a:p>
-            <a:r>
-              <a:rPr kumimoji="0" lang="pt-BR"/>
-              <a:t>Clique para editar o título mestre</a:t>
-            </a:r>
-            <a:endParaRPr kumimoji="0" lang="en-US"/>
-          </a:p>
-        </p:txBody>
-      </p:sp>
-      <p:sp>
-        <p:nvSpPr>
-          <p:cNvPr id="30" name="Espaço Reservado para Texto 29"/>
-          <p:cNvSpPr>
-            <a:spLocks noGrp="1"/>
-          </p:cNvSpPr>
-          <p:nvPr userDrawn="1">
-            <p:ph type="body" idx="1"/>
-          </p:nvPr>
-        </p:nvSpPr>
-        <p:spPr>
-          <a:xfrm>
-            <a:off x="609600" y="1481329"/>
-            <a:ext cx="10972800" cy="4525963"/>
-          </a:xfrm>
-          <a:prstGeom prst="rect">
-            <a:avLst/>
-          </a:prstGeom>
-        </p:spPr>
-        <p:txBody>
-          <a:bodyPr vert="horz">
-            <a:normAutofit/>
-          </a:bodyPr>
-          <a:lstStyle/>
-          <a:p>
-            <a:pPr lvl="0" eaLnBrk="1" latinLnBrk="0" hangingPunct="1"/>
-            <a:r>
-              <a:rPr kumimoji="0" lang="pt-BR"/>
-              <a:t>Clique para editar o texto mestre</a:t>
-            </a:r>
-          </a:p>
-          <a:p>
-            <a:pPr lvl="1" eaLnBrk="1" latinLnBrk="0" hangingPunct="1"/>
-            <a:r>
-              <a:rPr kumimoji="0" lang="pt-BR"/>
-              <a:t>Segundo nível</a:t>
-            </a:r>
-          </a:p>
-          <a:p>
-            <a:pPr lvl="2" eaLnBrk="1" latinLnBrk="0" hangingPunct="1"/>
-            <a:r>
-              <a:rPr kumimoji="0" lang="pt-BR"/>
-              <a:t>Terceiro nível</a:t>
-            </a:r>
-          </a:p>
-          <a:p>
-            <a:pPr lvl="3" eaLnBrk="1" latinLnBrk="0" hangingPunct="1"/>
-            <a:r>
-              <a:rPr kumimoji="0" lang="pt-BR"/>
-              <a:t>Quarto nível</a:t>
-            </a:r>
-          </a:p>
-          <a:p>
-            <a:pPr lvl="4" eaLnBrk="1" latinLnBrk="0" hangingPunct="1"/>
-            <a:r>
-              <a:rPr kumimoji="0" lang="pt-BR"/>
-              <a:t>Quinto nível</a:t>
-            </a:r>
-            <a:endParaRPr kumimoji="0" lang="en-US"/>
-          </a:p>
-        </p:txBody>
-      </p:sp>
-      <p:sp>
-        <p:nvSpPr>
-          <p:cNvPr id="10" name="Espaço Reservado para Data 9"/>
-          <p:cNvSpPr>
-            <a:spLocks noGrp="1"/>
-          </p:cNvSpPr>
-          <p:nvPr userDrawn="1">
-            <p:ph type="dt" sz="half" idx="2"/>
-          </p:nvPr>
-        </p:nvSpPr>
-        <p:spPr>
-          <a:xfrm>
-            <a:off x="8969376" y="6407944"/>
-            <a:ext cx="2560320" cy="365760"/>
-          </a:xfrm>
-          <a:prstGeom prst="rect">
-            <a:avLst/>
-          </a:prstGeom>
-        </p:spPr>
-        <p:txBody>
-          <a:bodyPr vert="horz" anchor="b"/>
-          <a:lstStyle>
-            <a:lvl1pPr algn="l" eaLnBrk="1" latinLnBrk="0" hangingPunct="1">
-              <a:defRPr kumimoji="0" sz="1000">
-                <a:solidFill>
-                  <a:schemeClr val="tx1"/>
-                </a:solidFill>
-              </a:defRPr>
-            </a:lvl1pPr>
-            <a:extLst/>
-          </a:lstStyle>
-          <a:p>
-            <a:fld id="{B41ABA4E-CD72-497B-97AA-7213B3980F60}" type="datetimeFigureOut">
-              <a:rPr lang="en-US" smtClean="0"/>
-              <a:pPr/>
-              <a:t>7/6/2021</a:t>
-            </a:fld>
-            <a:endParaRPr lang="en-US" dirty="0"/>
-          </a:p>
-        </p:txBody>
-      </p:sp>
-      <p:sp>
-        <p:nvSpPr>
-          <p:cNvPr id="22" name="Espaço Reservado para Rodapé 21"/>
-          <p:cNvSpPr>
-            <a:spLocks noGrp="1"/>
-          </p:cNvSpPr>
-          <p:nvPr userDrawn="1">
-            <p:ph type="ftr" sz="quarter" idx="3"/>
-          </p:nvPr>
-        </p:nvSpPr>
-        <p:spPr>
-          <a:xfrm>
-            <a:off x="5840097" y="6407945"/>
-            <a:ext cx="3134241" cy="365125"/>
-          </a:xfrm>
-          <a:prstGeom prst="rect">
-            <a:avLst/>
-          </a:prstGeom>
-        </p:spPr>
-        <p:txBody>
-          <a:bodyPr vert="horz" anchor="b"/>
-          <a:lstStyle>
-            <a:lvl1pPr algn="r" eaLnBrk="1" latinLnBrk="0" hangingPunct="1">
-              <a:defRPr kumimoji="0" sz="1000">
-                <a:solidFill>
-                  <a:schemeClr val="tx1"/>
-                </a:solidFill>
-              </a:defRPr>
-            </a:lvl1pPr>
-            <a:extLst/>
-          </a:lstStyle>
-          <a:p>
-            <a:endParaRPr kumimoji="0" lang="en-US" dirty="0"/>
-          </a:p>
-        </p:txBody>
-      </p:sp>
-      <p:sp>
-        <p:nvSpPr>
-          <p:cNvPr id="18" name="Espaço Reservado para Número de Slide 17"/>
-          <p:cNvSpPr>
-            <a:spLocks noGrp="1"/>
-          </p:cNvSpPr>
-          <p:nvPr userDrawn="1">
-            <p:ph type="sldNum" sz="quarter" idx="4"/>
-          </p:nvPr>
-        </p:nvSpPr>
-        <p:spPr>
-          <a:xfrm>
-            <a:off x="11529696" y="6407945"/>
-            <a:ext cx="487680" cy="365125"/>
-          </a:xfrm>
-          <a:prstGeom prst="rect">
-            <a:avLst/>
-          </a:prstGeom>
-        </p:spPr>
-        <p:txBody>
-          <a:bodyPr vert="horz" anchor="b"/>
-          <a:lstStyle>
-            <a:lvl1pPr algn="r" eaLnBrk="1" latinLnBrk="0" hangingPunct="1">
-              <a:defRPr kumimoji="0" sz="1000" b="0">
-                <a:solidFill>
-                  <a:schemeClr val="tx1"/>
-                </a:solidFill>
-              </a:defRPr>
-            </a:lvl1pPr>
-            <a:extLst/>
-          </a:lstStyle>
-          <a:p>
-            <a:fld id="{D2E57653-3E58-4892-A7ED-712530ACC680}" type="slidenum">
-              <a:rPr kumimoji="0" lang="en-US" smtClean="0"/>
-              <a:pPr/>
-              <a:t>‹nº›</a:t>
-            </a:fld>
-            <a:endParaRPr kumimoji="0" lang="en-US" dirty="0"/>
-          </a:p>
-        </p:txBody>
-      </p:sp>
     </p:spTree>
   </p:cSld>
   <p:clrMap bg1="lt1" tx1="dk1" bg2="lt2" tx2="dk2" accent1="accent1" accent2="accent2" accent3="accent3" accent4="accent4" accent5="accent5" accent6="accent6" hlink="hlink" folHlink="folHlink"/>
@@ -9682,11 +10449,13 @@
         </p:nvSpPr>
         <p:spPr/>
         <p:txBody>
-          <a:bodyPr/>
+          <a:bodyPr>
+            <a:normAutofit/>
+          </a:bodyPr>
           <a:lstStyle/>
           <a:p>
             <a:r>
-              <a:rPr lang="pt-BR" dirty="0"/>
+              <a:rPr lang="pt-BR" sz="6600" dirty="0"/>
               <a:t>Introdução</a:t>
             </a:r>
           </a:p>
@@ -9704,11 +10473,13 @@
         </p:nvSpPr>
         <p:spPr/>
         <p:txBody>
-          <a:bodyPr lIns="108000" tIns="72000"/>
+          <a:bodyPr lIns="108000" tIns="72000">
+            <a:normAutofit/>
+          </a:bodyPr>
           <a:lstStyle/>
           <a:p>
             <a:r>
-              <a:rPr lang="pt-BR" dirty="0">
+              <a:rPr lang="pt-BR" sz="3600" dirty="0">
                 <a:solidFill>
                   <a:schemeClr val="accent1">
                     <a:lumMod val="50000"/>
@@ -10162,6 +10933,9 @@
   <p:clrMapOvr>
     <a:masterClrMapping/>
   </p:clrMapOvr>
+  <p:transition spd="slow">
+    <p:wipe/>
+  </p:transition>
 </p:sld>
 </file>
 
@@ -10304,6 +11078,9 @@
   <p:clrMapOvr>
     <a:masterClrMapping/>
   </p:clrMapOvr>
+  <p:transition spd="slow">
+    <p:wipe/>
+  </p:transition>
 </p:sld>
 </file>
 
@@ -10553,6 +11330,9 @@
   <p:clrMapOvr>
     <a:masterClrMapping/>
   </p:clrMapOvr>
+  <p:transition spd="slow">
+    <p:wipe/>
+  </p:transition>
 </p:sld>
 </file>
 
@@ -10687,6 +11467,9 @@
   <p:clrMapOvr>
     <a:masterClrMapping/>
   </p:clrMapOvr>
+  <p:transition spd="slow">
+    <p:wipe/>
+  </p:transition>
 </p:sld>
 </file>
 
@@ -10986,6 +11769,9 @@
   <p:clrMapOvr>
     <a:masterClrMapping/>
   </p:clrMapOvr>
+  <p:transition spd="slow">
+    <p:wipe/>
+  </p:transition>
 </p:sld>
 </file>
 
@@ -11128,6 +11914,9 @@
   <p:clrMapOvr>
     <a:masterClrMapping/>
   </p:clrMapOvr>
+  <p:transition spd="slow">
+    <p:wipe/>
+  </p:transition>
 </p:sld>
 </file>
 
@@ -11329,6 +12118,9 @@
   <p:clrMapOvr>
     <a:masterClrMapping/>
   </p:clrMapOvr>
+  <p:transition spd="slow">
+    <p:wipe/>
+  </p:transition>
 </p:sld>
 </file>
 
@@ -11531,6 +12323,9 @@
   <p:clrMapOvr>
     <a:masterClrMapping/>
   </p:clrMapOvr>
+  <p:transition spd="slow">
+    <p:wipe/>
+  </p:transition>
 </p:sld>
 </file>
 
@@ -11725,6 +12520,9 @@
   <p:clrMapOvr>
     <a:masterClrMapping/>
   </p:clrMapOvr>
+  <p:transition spd="slow">
+    <p:wipe/>
+  </p:transition>
 </p:sld>
 </file>
 
@@ -11900,9 +12698,7 @@
             </a:solidFill>
             <a:ln w="12700">
               <a:solidFill>
-                <a:schemeClr val="bg1">
-                  <a:lumMod val="75000"/>
-                </a:schemeClr>
+                <a:schemeClr val="accent1"/>
               </a:solidFill>
             </a:ln>
           </p:spPr>
@@ -11950,9 +12746,7 @@
             </a:solidFill>
             <a:ln w="12700">
               <a:solidFill>
-                <a:schemeClr val="bg1">
-                  <a:lumMod val="75000"/>
-                </a:schemeClr>
+                <a:schemeClr val="accent1"/>
               </a:solidFill>
             </a:ln>
           </p:spPr>
@@ -12120,9 +12914,7 @@
             </a:solidFill>
             <a:ln w="12700">
               <a:solidFill>
-                <a:schemeClr val="bg1">
-                  <a:lumMod val="75000"/>
-                </a:schemeClr>
+                <a:schemeClr val="accent1"/>
               </a:solidFill>
             </a:ln>
           </p:spPr>
@@ -12210,9 +13002,7 @@
             </a:solidFill>
             <a:ln w="12700">
               <a:solidFill>
-                <a:schemeClr val="bg1">
-                  <a:lumMod val="75000"/>
-                </a:schemeClr>
+                <a:schemeClr val="accent1"/>
               </a:solidFill>
             </a:ln>
           </p:spPr>
@@ -12340,9 +13130,7 @@
             </a:solidFill>
             <a:ln w="12700">
               <a:solidFill>
-                <a:schemeClr val="bg1">
-                  <a:lumMod val="75000"/>
-                </a:schemeClr>
+                <a:schemeClr val="accent1"/>
               </a:solidFill>
             </a:ln>
           </p:spPr>
@@ -12429,9 +13217,7 @@
             </a:solidFill>
             <a:ln w="12700">
               <a:solidFill>
-                <a:schemeClr val="bg1">
-                  <a:lumMod val="75000"/>
-                </a:schemeClr>
+                <a:schemeClr val="accent1"/>
               </a:solidFill>
             </a:ln>
           </p:spPr>
@@ -12479,9 +13265,7 @@
             </a:solidFill>
             <a:ln w="12700">
               <a:solidFill>
-                <a:schemeClr val="bg1">
-                  <a:lumMod val="75000"/>
-                </a:schemeClr>
+                <a:schemeClr val="accent1"/>
               </a:solidFill>
             </a:ln>
           </p:spPr>
@@ -12609,9 +13393,7 @@
             </a:solidFill>
             <a:ln w="12700">
               <a:solidFill>
-                <a:schemeClr val="bg1">
-                  <a:lumMod val="75000"/>
-                </a:schemeClr>
+                <a:schemeClr val="accent1"/>
               </a:solidFill>
             </a:ln>
           </p:spPr>
@@ -12659,9 +13441,7 @@
             </a:solidFill>
             <a:ln w="12700">
               <a:solidFill>
-                <a:schemeClr val="bg1">
-                  <a:lumMod val="75000"/>
-                </a:schemeClr>
+                <a:schemeClr val="accent1"/>
               </a:solidFill>
             </a:ln>
           </p:spPr>
@@ -12747,9 +13527,7 @@
             </a:solidFill>
             <a:ln w="12700">
               <a:solidFill>
-                <a:schemeClr val="bg1">
-                  <a:lumMod val="75000"/>
-                </a:schemeClr>
+                <a:schemeClr val="accent1"/>
               </a:solidFill>
             </a:ln>
           </p:spPr>
@@ -12877,9 +13655,7 @@
             </a:solidFill>
             <a:ln w="12700">
               <a:solidFill>
-                <a:schemeClr val="bg1">
-                  <a:lumMod val="75000"/>
-                </a:schemeClr>
+                <a:schemeClr val="accent1"/>
               </a:solidFill>
             </a:ln>
           </p:spPr>
@@ -13034,6 +13810,9 @@
   <p:clrMapOvr>
     <a:masterClrMapping/>
   </p:clrMapOvr>
+  <p:transition spd="slow">
+    <p:wipe/>
+  </p:transition>
 </p:sld>
 </file>
 
@@ -13476,6 +14255,9 @@
   <p:clrMapOvr>
     <a:masterClrMapping/>
   </p:clrMapOvr>
+  <p:transition spd="slow">
+    <p:wipe/>
+  </p:transition>
 </p:sld>
 </file>
 
@@ -18213,6 +18995,9 @@
   <p:clrMapOvr>
     <a:masterClrMapping/>
   </p:clrMapOvr>
+  <p:transition spd="slow">
+    <p:wipe/>
+  </p:transition>
 </p:sld>
 </file>
 
@@ -19064,7 +19849,7 @@
                 </a:path>
               </a:pathLst>
             </a:custGeom>
-            <a:ln>
+            <a:ln w="19050">
               <a:tailEnd type="triangle"/>
             </a:ln>
           </p:spPr>
@@ -19102,6 +19887,9 @@
   <p:clrMapOvr>
     <a:masterClrMapping/>
   </p:clrMapOvr>
+  <p:transition spd="slow">
+    <p:wipe/>
+  </p:transition>
 </p:sld>
 </file>
 
@@ -24276,6 +25064,9 @@
   <p:clrMapOvr>
     <a:masterClrMapping/>
   </p:clrMapOvr>
+  <p:transition spd="slow">
+    <p:wipe/>
+  </p:transition>
 </p:sld>
 </file>
 
@@ -24403,6 +25194,9 @@
   <p:clrMapOvr>
     <a:masterClrMapping/>
   </p:clrMapOvr>
+  <p:transition spd="slow">
+    <p:wipe/>
+  </p:transition>
 </p:sld>
 </file>
 
@@ -24657,6 +25451,9 @@
   <p:clrMapOvr>
     <a:masterClrMapping/>
   </p:clrMapOvr>
+  <p:transition spd="slow">
+    <p:wipe/>
+  </p:transition>
 </p:sld>
 </file>
 
@@ -24889,6 +25686,9 @@
   <p:clrMapOvr>
     <a:masterClrMapping/>
   </p:clrMapOvr>
+  <p:transition spd="slow">
+    <p:wipe/>
+  </p:transition>
 </p:sld>
 </file>
 
@@ -25257,6 +26057,9 @@
   <p:clrMapOvr>
     <a:masterClrMapping/>
   </p:clrMapOvr>
+  <p:transition spd="slow">
+    <p:wipe/>
+  </p:transition>
 </p:sld>
 </file>
 
@@ -25507,6 +26310,9 @@
   <p:clrMapOvr>
     <a:masterClrMapping/>
   </p:clrMapOvr>
+  <p:transition spd="slow">
+    <p:wipe/>
+  </p:transition>
 </p:sld>
 </file>
 
@@ -25774,6 +26580,9 @@
   <p:clrMapOvr>
     <a:masterClrMapping/>
   </p:clrMapOvr>
+  <p:transition spd="slow">
+    <p:wipe/>
+  </p:transition>
 </p:sld>
 </file>
 
@@ -26038,6 +26847,9 @@
   <p:clrMapOvr>
     <a:masterClrMapping/>
   </p:clrMapOvr>
+  <p:transition spd="slow">
+    <p:wipe/>
+  </p:transition>
 </p:sld>
 </file>
 
@@ -26342,6 +27154,9 @@
   <p:clrMapOvr>
     <a:masterClrMapping/>
   </p:clrMapOvr>
+  <p:transition spd="slow">
+    <p:wipe/>
+  </p:transition>
 </p:sld>
 </file>
 
@@ -26656,6 +27471,9 @@
   <p:clrMapOvr>
     <a:masterClrMapping/>
   </p:clrMapOvr>
+  <p:transition spd="slow">
+    <p:wipe/>
+  </p:transition>
 </p:sld>
 </file>
 
@@ -27441,6 +28259,9 @@
   <p:clrMapOvr>
     <a:masterClrMapping/>
   </p:clrMapOvr>
+  <p:transition spd="slow">
+    <p:wipe/>
+  </p:transition>
 </p:sld>
 </file>
 
@@ -27584,6 +28405,9 @@
   <p:clrMapOvr>
     <a:masterClrMapping/>
   </p:clrMapOvr>
+  <p:transition spd="slow">
+    <p:wipe/>
+  </p:transition>
 </p:sld>
 </file>
 
@@ -27757,6 +28581,9 @@
   <p:clrMapOvr>
     <a:masterClrMapping/>
   </p:clrMapOvr>
+  <p:transition spd="slow">
+    <p:wipe/>
+  </p:transition>
 </p:sld>
 </file>
 
@@ -28210,6 +29037,9 @@
   <p:clrMapOvr>
     <a:masterClrMapping/>
   </p:clrMapOvr>
+  <p:transition spd="slow">
+    <p:wipe/>
+  </p:transition>
 </p:sld>
 </file>
 
@@ -28451,6 +29281,9 @@
   <p:clrMapOvr>
     <a:masterClrMapping/>
   </p:clrMapOvr>
+  <p:transition spd="slow">
+    <p:wipe/>
+  </p:transition>
 </p:sld>
 </file>
 
@@ -29161,6 +29994,9 @@
   <p:clrMapOvr>
     <a:masterClrMapping/>
   </p:clrMapOvr>
+  <p:transition spd="slow">
+    <p:wipe/>
+  </p:transition>
 </p:sld>
 </file>
 
@@ -29319,6 +30155,9 @@
   <p:clrMapOvr>
     <a:masterClrMapping/>
   </p:clrMapOvr>
+  <p:transition spd="slow">
+    <p:wipe/>
+  </p:transition>
 </p:sld>
 </file>
 
@@ -29472,6 +30311,9 @@
   <p:clrMapOvr>
     <a:masterClrMapping/>
   </p:clrMapOvr>
+  <p:transition spd="slow">
+    <p:wipe/>
+  </p:transition>
 </p:sld>
 </file>
 
@@ -29599,6 +30441,15 @@
           <p:blipFill>
             <a:blip r:embed="rId3">
               <a:extLst>
+                <a:ext uri="{BEBA8EAE-BF5A-486C-A8C5-ECC9F3942E4B}">
+                  <a14:imgProps xmlns:a14="http://schemas.microsoft.com/office/drawing/2010/main">
+                    <a14:imgLayer r:embed="rId4">
+                      <a14:imgEffect>
+                        <a14:brightnessContrast bright="20000" contrast="-20000"/>
+                      </a14:imgEffect>
+                    </a14:imgLayer>
+                  </a14:imgProps>
+                </a:ext>
                 <a:ext uri="{28A0092B-C50C-407E-A947-70E740481C1C}">
                   <a14:useLocalDpi xmlns:a14="http://schemas.microsoft.com/office/drawing/2010/main" val="0"/>
                 </a:ext>
@@ -29721,7 +30572,7 @@
             <p:nvPr/>
           </p:nvPicPr>
           <p:blipFill>
-            <a:blip r:embed="rId4">
+            <a:blip r:embed="rId5">
               <a:extLst>
                 <a:ext uri="{28A0092B-C50C-407E-A947-70E740481C1C}">
                   <a14:useLocalDpi xmlns:a14="http://schemas.microsoft.com/office/drawing/2010/main" val="0"/>
@@ -29753,6 +30604,9 @@
   <p:clrMapOvr>
     <a:masterClrMapping/>
   </p:clrMapOvr>
+  <p:transition spd="slow">
+    <p:wipe/>
+  </p:transition>
 </p:sld>
 </file>
 

</xml_diff>